<commit_message>
more codes on serialization and ppt
</commit_message>
<xml_diff>
--- a/notes/Serialization in java.pptx
+++ b/notes/Serialization in java.pptx
@@ -33,10 +33,14 @@
     <p:sldId id="287" r:id="rId27"/>
     <p:sldId id="288" r:id="rId28"/>
     <p:sldId id="278" r:id="rId29"/>
-    <p:sldId id="279" r:id="rId30"/>
-    <p:sldId id="280" r:id="rId31"/>
-    <p:sldId id="281" r:id="rId32"/>
-    <p:sldId id="267" r:id="rId33"/>
+    <p:sldId id="293" r:id="rId30"/>
+    <p:sldId id="289" r:id="rId31"/>
+    <p:sldId id="290" r:id="rId32"/>
+    <p:sldId id="291" r:id="rId33"/>
+    <p:sldId id="292" r:id="rId34"/>
+    <p:sldId id="280" r:id="rId35"/>
+    <p:sldId id="281" r:id="rId36"/>
+    <p:sldId id="267" r:id="rId37"/>
   </p:sldIdLst>
   <p:sldSz cx="12192000" cy="6858000"/>
   <p:notesSz cx="6858000" cy="9144000"/>
@@ -1079,6 +1083,123 @@
 </inkml:ink>
 </file>
 
+<file path=ppt/ink/ink27.xml><?xml version="1.0" encoding="utf-8"?>
+<inkml:ink xmlns:inkml="http://www.w3.org/2003/InkML">
+  <inkml:definitions>
+    <inkml:context xml:id="ctx0">
+      <inkml:inkSource xml:id="inkSrc0">
+        <inkml:traceFormat>
+          <inkml:channel name="X" type="integer" max="29376" units="cm"/>
+          <inkml:channel name="Y" type="integer" max="16524" units="cm"/>
+          <inkml:channel name="F" type="integer" max="4095" units="dev"/>
+          <inkml:channel name="T" type="integer" max="2.14748E9" units="dev"/>
+        </inkml:traceFormat>
+        <inkml:channelProperties>
+          <inkml:channelProperty channel="X" name="resolution" value="1000.20428" units="1/cm"/>
+          <inkml:channelProperty channel="Y" name="resolution" value="1000.24213" units="1/cm"/>
+          <inkml:channelProperty channel="F" name="resolution" value="0" units="1/dev"/>
+          <inkml:channelProperty channel="T" name="resolution" value="1" units="1/dev"/>
+        </inkml:channelProperties>
+      </inkml:inkSource>
+      <inkml:timestamp xml:id="ts0" timeString="2020-02-01T11:42:24.707"/>
+    </inkml:context>
+    <inkml:brush xml:id="br0">
+      <inkml:brushProperty name="width" value="0.05292" units="cm"/>
+      <inkml:brushProperty name="height" value="0.05292" units="cm"/>
+      <inkml:brushProperty name="color" value="#FF0000"/>
+    </inkml:brush>
+  </inkml:definitions>
+  <inkml:trace contextRef="#ctx0" brushRef="#br0">31813 261 695 0,'-39'-28'132'0,"-8"3"68"16,2 8-211-16,-7 5-5 16,5 6-1-16,-14 0 2 15,0 0 6-15,-17 1 2 16,0 1 6-16,-11 6 3 15,11 0 1-15,-11 2 0 16,12 5-1-16,-12 6 0 16,9 0-1-16,-6 14-1 15,12 9-2-15,-16 6 0 16,10-2-1-16,-14 16-1 16,4 2 1-16,-3 11-3 15,20 1-5-15,-6 25 1 16,19-16-1-16,6 15-4 15,11-17-3-15,7 21-6 16,19-17-1-16,9 18-2 0,8-16 3 16,14 18 7-16,6-17 11 15,14 13-1-15,5-9 3 16,15 9 1-16,2-12-1 16,16 8 1-16,4-13 1 15,20 13 0-15,0-14 2 0,18 4 0 16,-5-18 1-16,23 2 0 15,-8-24 0-15,30-5 2 16,-3-11-1-16,26-8 1 16,-12-14 1-16,29-10 0 15,-20-8 1-15,25-12 3 16,-19-7 2-16,17-8 7 16,-24-4 6-16,14-12 10 15,-29-4 5-15,15-18 5 16,-24-7-7-16,13-17-4 15,-22 2-9-15,-15-45-7 16,-37-2-3-16,-22-13 19 16,-66 10 15-16,0-57 15 15,0 49 12-15,0 38-12 16,0 17-23-16,0-7-24 16,0 48-16-16,-60-12-13 0,-18-21 11 15,-55-17-5 1,-41 8-26-16,-58 18-158 0,-7 21-80 15,-95 15-63-15</inkml:trace>
+  <inkml:trace contextRef="#ctx0" brushRef="#br0" timeOffset="994.106">12363 14276 1125 0,'30'0'74'0,"-3"-23"187"15,7-15-337 1,28-28-2-16,10-17 75 0,32-24 1 16,5-8 1-16,33-27 0 15,-2 6 2-15,28-31-2 16,-8 5 1-16,29-22 0 15,-18 12 1-15,27-19-1 16,-22 20 2-16,22-19-1 16,-26 27 0-16,17-18 0 15,-31 23 0-15,12-3 0 16,-34 26 0-16,5-2-1 16,-35 34-4-16,-5 10-29 15,-33 29-28-15,-10 16-61 16,-28 24-33-16,-15 15-102 0,-30 22-10 15</inkml:trace>
+  <inkml:trace contextRef="#ctx0" brushRef="#br0" timeOffset="1506.938">12762 14933 1105 0,'1'44'228'0,"-2"-27"19"16,-19-20-320-16,41-9-30 16,12-9-9-16,29-22 36 15,14-17 73-15,38-39-1 16,5-14 7-16,38-37-1 15,-2-4-2-15,31-32 0 16,-6 15 1-16,27-33-1 16,-18 22 1-16,24-26 0 0,-21 26-1 15,16-15 3-15,-31 25 3 16,14-15 19-16,-27 32 9 16,9-12 21-1,-36 27 6-15,0 14 7 0,-30 30-17 16,-14 13 4-16,-32 30-9 15,-11 13 13-15,-24 16-3 16,-10 8 15-16,-10 10 1 16,-6 3 5-16,-1 3-13 0,0 0-1 15,0 0-15-15,-1 0-11 16,1 0-18-16,0 0-8 16,1 0-7-16,-1 0-8 15,0 0-11-15,0 0-42 16,1 0-36-16,0 0-179 15,0 0-163-15,1-1-29 16</inkml:trace>
+  <inkml:trace contextRef="#ctx0" brushRef="#br0" timeOffset="5225.159">30051 16868 432 0,'4'-11'195'15,"-5"3"16"-15,-1-1-84 16,4 0-61-16,-4 0 0 15,0 4-26-15,-2-2-4 16,1 2-15-16,-9-5-8 16,1 3-6-16,-6-4-3 15,1 0-8-15,-7-3 4 16,0 5 2-16,-8-4 8 16,1 4 3-16,-11-1 4 15,1 6 0-15,-13-4 2 16,5 4-10-16,-10-3 17 15,2 0-7-15,-10-6 22 16,7 3 3-16,-15-6 0 16,5 1-16-16,-8-5 2 15,4 3-21-15,-13-2 13 0,10 4 9 16,-13-1 1 0,11 5-1-16,-13-5 3 0,8 1-15 15,-13-4-6-15,9 1-1 16,-15-5-2-16,10 1 0 15,-12-4 1-15,12 3 4 16,-12-1-2-16,13 3 1 16,-16-1-2-16,6 5-4 0,-19 1-8 15,9 1 0-15,-15 1 1 16,13 4-2-16,-17 2-3 16,17-2 1-16,-22 6-2 15,8 5-1-15,-17-1 3 16,23 1 6-16,-16 3-2 15,18-1 0-15,-7-1-1 16,17 4-1-16,-23 0-4 16,15 8 1-16,-11 1 0 15,12 1-2-15,-10 7-1 16,18 1 0-16,-8 5-2 16,17 2 0-16,-14 8-1 15,13-1 0-15,-5 7 1 16,16-4 1-16,0 6-1 15,22-9-4-15,4 7-15 16,17-7 0-16,2 2-1 0,12-6 3 16,0 7-4-16,12-6 8 15,4 4-6-15,6-7-3 16,7 1-13-16,7-8 14 16,10 6 3-16,5-6 7 15,10 5-5-15,3 4 11 0,9 0-2 16,2-5 2-16,11 8 0 15,2-5 8-15,14 2 1 16,0-3 3 0,17-1 0-16,-7-12 2 0,18-1-1 15,-9-7 2-15,16-1-1 16,-12-4 2-16,16 2 0 16,-15-2 0-16,18 2-1 15,-16-2 1-15,16-2 3 16,-11-3 1-16,16-2 4 15,-14-5-2-15,15 0 2 16,-13 0-4-16,10 3-3 16,-15 1-2-16,10 3 0 15,-18 2-1-15,10-2 1 16,-16-2 1-16,10 2 1 16,-16-2 0-16,12-2 0 0,-14 0-1 15,10-2 0-15,-16 1-1 16,10 0-1-16,-9 2 1 15,6 1 0-15,-15 2-1 16,6 2 1-16,-10-2 0 16,3 2 0-16,-10 0-1 15,11 5 2-15,-9-1 0 16,5 4 0-16,-9-1 0 16,8 3 0-16,-8-2-1 15,8 3-1-15,-2-1 0 16,12 4 0-16,-5-3-1 15,7 7 1-15,-8 0 1 0,6 2-2 16,-14-2 1-16,6 6-1 16,-9-7 2-16,7 0-1 15,-5-5 1-15,5-1-1 16,-6-7 1-16,7-1 0 16,-5-5 0-16,1 1 0 15,-4-3 0-15,2 2 0 16,-7 0 0-16,5-3 2 15,-4-2 1-15,5-8 2 16,-6-1 7-16,5-10 5 16,-7 1-2-16,3-5 2 15,-6 0 3-15,5-5 2 16,-8 2-4-16,5-5 0 16,-9 4-1-16,-1 1-3 0,-10 5 2 15,-3-1 21-15,-7 4 5 16,-1-4 9-16,-4-1-2 15,-1 5 17-15,-5 5-13 16,-4-3 6-16,-1 4-8 16,-8-6 9-16,-3-4-20 0,-8-8-9 15,-3 1-15-15,-14-5-1 16,-4 6-11-16,-14-4-16 16,-2 7-16-16,-16 2-20 15,-10 14-384-15,-35 5 106 16</inkml:trace>
+  <inkml:trace contextRef="#ctx0" brushRef="#br0" timeOffset="7911.447">26937 1309 504 0,'-43'-10'138'0,"-5"1"30"15,5 4-150-15,-11 2-3 16,-3 10-17-16,-16 7-1 16,-1-2 2-16,-18 7 2 15,7 2 2-15,-11 2 1 16,8-5-1-16,-11 7 1 16,15-3-2-16,-6 5 1 15,15-9 0-15,-2 2 4 16,14-4 2-16,-10 0-1 15,9 0-2-15,-4 7-1 16,10 5-4-16,2 7-3 16,12 3-1-16,3 3-2 15,11 3 0-15,5-2-3 16,8-2 0-16,9 0-4 0,7-4 0 16,7 3 1-16,4-1-2 15,11 1 1-15,2-2 2 16,16 8 1-16,4-7 3 15,21 6 2-15,4-4 2 16,26 3 0-16,-4-5 2 16,19-2-1-16,-6-8 1 15,20 0 1-15,-10-5 1 16,22 2-1-16,-9-2-1 16,13 3 0-16,-16-3 0 15,15 2-1-15,-18-4 1 0,18-1 2 16,-7-7 7-16,27-5 0 15,-15-4 1-15,13-7 2 16,-13-3-1-16,15 0-3 16,-23-2-1-16,33-3 18 15,-12 4-4-15,11-1 5 16,-16 2-4-16,16 1 2 16,-25 4-17-16,28-4 1 15,-15 0-5-15,17-8-1 16,-17-1-1-16,11-4-1 15,-31 1-2-15,8-3 0 16,-24 4 3-16,3-3 0 16,-24 4 2-16,1-1 0 15,-22 8-1-15,1-3 0 0,-18 4-1 16,2 6-1-16,-10 0 0 16,1-1 2-16,-13 5-1 15,-1-6 4-15,-16-1 3 16,-1-1 9-16,-7-4 14 15,-2-4 27-15,-7 4 6 16,-3-8 6-16,-4-4-6 16,-8-6-15-16,-6 1-29 0,-10-10-10 15,-4 5-9-15,-16-6-2 16,-5 5-1-16,-18-8 1 16,-3 7 1-16,-19-8 2 15,2 4 9-15,-29-8 1 16,2-1 1-16,-17-8-1 15,2 6-2-15,-21-4-8 16,21 6-2-16,-33 3-2 16,-4 8-2-16,-42 3-1 15,7 2 1-15,-55 3 0 16,29 8 2-16,-24 1 2 16,35 7 0-16,-41 3 0 15,42 7 0-15,-25 2-1 16,31 1 0-16,-22 4-1 15,41 6 1-15,-16 3-1 16,28 3-1-16,-17 7-33 0,27 3-36 16,-21 11-211-16,21 5 25 15</inkml:trace>
+  <inkml:trace contextRef="#ctx0" brushRef="#br0" timeOffset="10071.351">25091 17852 742 0,'-3'-17'197'0,"-15"-7"58"15,-7 1-191-15,-3-2-19 16,3 3 8-16,-6-1 8 16,2 8-6-16,-6 3-9 15,3 1-20-15,-9 4-14 16,1 4-7-16,-6 1-2 16,0 1-6-16,-8 2-6 15,2 2-1-15,-9 4 1 16,1 3-3-16,-9 9 3 15,2 1 5-15,-13 8 3 16,7 3-2-16,-8 3 1 16,12 0 1-16,1 2 0 15,18-7-2-15,-2 8-4 16,13 0-3-16,-1 9-4 0,9-2-1 16,-2 12-2-16,13 2 3 15,2 17 1-15,11 1 3 16,10 17 1-16,7-11-2 15,17 18 3-15,8-8 0 16,15 7-10-16,2-16-3 16,13-4-8-16,2-32-1 0,19-15-1 15,-1-32 11-15,3 0 4 16,-13 0 9-16,1 0 3 16,-14 0 1-16,8 0 0 15,2 0 1-15,18-29 1 16,-9-6 1-16,13-21 0 15,-10-13 1-15,13-11 0 16,-13 17-1-16,11-15-1 16,-17 13 1-16,1-8 2 15,-15 5 0-15,-2-14 8 16,-13 16 8-16,-8-3 30 16,-16 17 22-16,-11-3 47 15,-14 14 15-15,-16-10 32 16,-10 4-29-16,-19-17-17 15,-7 4-46-15,-19-6-15 16,-6 8-36-16,-27-8-2 0,3 15-5 16,-20-2-16-16,0 13-25 15,-21 2-77-15,18 17-71 16,-30 5-264-16,17 10 5 16</inkml:trace>
+</inkml:ink>
+</file>
+
+<file path=ppt/ink/ink28.xml><?xml version="1.0" encoding="utf-8"?>
+<inkml:ink xmlns:inkml="http://www.w3.org/2003/InkML">
+  <inkml:definitions>
+    <inkml:context xml:id="ctx0">
+      <inkml:inkSource xml:id="inkSrc0">
+        <inkml:traceFormat>
+          <inkml:channel name="X" type="integer" max="29376" units="cm"/>
+          <inkml:channel name="Y" type="integer" max="16524" units="cm"/>
+          <inkml:channel name="F" type="integer" max="4095" units="dev"/>
+          <inkml:channel name="T" type="integer" max="2.14748E9" units="dev"/>
+        </inkml:traceFormat>
+        <inkml:channelProperties>
+          <inkml:channelProperty channel="X" name="resolution" value="1000.20428" units="1/cm"/>
+          <inkml:channelProperty channel="Y" name="resolution" value="1000.24213" units="1/cm"/>
+          <inkml:channelProperty channel="F" name="resolution" value="0" units="1/dev"/>
+          <inkml:channelProperty channel="T" name="resolution" value="1" units="1/dev"/>
+        </inkml:channelProperties>
+      </inkml:inkSource>
+      <inkml:timestamp xml:id="ts0" timeString="2020-02-01T11:42:48.019"/>
+    </inkml:context>
+    <inkml:brush xml:id="br0">
+      <inkml:brushProperty name="width" value="0.05292" units="cm"/>
+      <inkml:brushProperty name="height" value="0.05292" units="cm"/>
+      <inkml:brushProperty name="color" value="#FF0000"/>
+    </inkml:brush>
+  </inkml:definitions>
+  <inkml:trace contextRef="#ctx0" brushRef="#br0">10229 6810 813 0,'-11'-22'176'0,"-5"2"76"15,4 6-239-15,9 5-12 16,0 7-8-16,3 2-7 0,0 0-13 16,0 0 0-16,0 0-1 15,0 0 6-15,0 0 6 16,2 0 12-16,18 4 0 15,47-9 2-15,-16-18 1 16,2-11 0-16,13-12-1 16,-3-2 0-16,17-9-1 15,-9 7-1-15,24-7 0 16,-1 7 1-16,24-13 2 16,-3 4-1-16,25-17-1 15,-14 1-1-15,17-8 4 16,-12 8-1-16,7-8 2 15,-27 17 1-15,2-2 5 0,-26 11 3 16,-6-1 16 0,-25 14 5-16,-3 3 6 0,-16 12-2 15,-7 9 8-15,-10 7-12 16,-6 5-1-16,-6 3-4 16,-2 3 3-16,-4 0-4 15,-2 2 16-15,-1 0 2 16,1 0 4-16,0-2-3 0,-1 2-5 15,1 0-21 1,-2 0-5-16,1 0-6 0,0 0-9 16,0 0-21-16,0 0-70 15,0 0-122-15,-2 2-119 16,-9 3-63-16</inkml:trace>
+  <inkml:trace contextRef="#ctx0" brushRef="#br0" timeOffset="1992.274">10179 7811 252 0,'-36'31'56'16,"-2"2"23"-16,14-4-73 15,1 2-4-15,9-7-1 16,1 2 1-16,8-9-4 16,4-2-9-16,4-8-1 15,6-5 3-15,5-6 2 0,10-11 6 16,5-7 13-16,15-11 3 16,4-5 3-1,22-13 5-15,1 1-3 0,17-12-2 16,-1 3-4-16,20-14-2 15,-8 6-8-15,17-12-1 16,-8 9 2-16,14-9 0 16,-11 17 0-16,6-7 4 15,-16 12 0-15,6-4 4 16,-20 12 0-16,0-3 10 16,-20 14 5-16,-4 4 14 15,-20 12 4-15,-9 6 15 16,-15 7-3-16,-6 2-2 15,-9 2-14-15,0 4-9 16,-2 0-17-16,-2 1-20 0,0 0-34 16,0 0-64-16,0 0-65 15,1 0-26-15,3 0-66 16</inkml:trace>
+  <inkml:trace contextRef="#ctx0" brushRef="#br0" timeOffset="3165.916">10488 9470 774 0,'-5'18'290'0,"-4"-13"8"16,1-10-171-16,5 4-149 15,5 1-9-15,-2-1-7 16,0 1-19-16,0 0 3 15,0-1 1-15,0-1 13 16,1 1 10-16,0 0 20 16,10-6 6-16,12-5 3 15,45-32-1-15,-29 17 1 0,17-10-3 16,6-1 0-16,18-9 0 16,1 2 1-16,14-8 0 15,1 5 0-15,20-11-2 16,-5 4 0-16,19-14-4 15,-2 4-1-15,16-10 1 16,-17 8 1-16,14-3 3 16,-21 10 2-16,2-8 2 15,-25 10 1-15,2-2 1 16,-22 6 0-16,-3 4 1 16,-13 18-2-16,8 0-31 15,-7 9-61-15,24-3-123 16,-2-1-11-16</inkml:trace>
+  <inkml:trace contextRef="#ctx0" brushRef="#br0" timeOffset="5820.818">16919 10474 838 0,'-9'7'161'0,"-2"-8"89"16,4-1-249-16,3 0-3 16,3 3 5-16,0-2 1 15,0 0-1-15,0 0-1 16,0 0-2-16,1 0-4 15,0-1-4-15,0 2-3 16,0 0-1-16,0-1-2 16,0 0 4-16,1 0 3 0,10-6 2 15,25-2 0-15,42-52 1 16,-21 26-2-16,3 4-3 16,24-4 1-16,1 2 0 15,28-9-1-15,-2 4 4 16,18-5 3-16,-14 5 0 15,9-4 4-15,-25 4 1 16,5-8 3-16,-19 7-1 0,10-11 1 16,-15 4-2-16,12-2 1 15,-12 8-3-15,4 2 0 16,-20 12 1-16,-6 2-1 16,-18 9-1-16,-8 5 2 15,-16 6-1-15,-2-1-6 16,-7 5-27-16,4 4-144 15,3 3-61-15,-1 1-53 16</inkml:trace>
+  <inkml:trace contextRef="#ctx0" brushRef="#br0" timeOffset="7571.509">13504 11612 381 0,'-12'-3'148'0,"5"1"16"16,2 1-96-16,3 0-52 15,0 0-14-15,0-1-29 16,-1 1-4-16,1 0 5 16,1 0 6-16,1 0 14 15,0 0 4-15,1 0 3 16,20-4 2-16,42-11 4 16,-20 3 7-16,4-3 0 15,12-6 3-15,0 1-3 16,5-5-2-16,-6 2-7 0,3-4-1 15,-8 4-1-15,1-3 3 16,-10 3 4-16,-3 2 7 16,-9 4 0-16,-8 4 15 15,-12 5 9-15,-1 3 21 16,-8 4 3-16,-2 2 8 16,-1 1-12-16,0-1-12 15,-1-1-26-15,1-1-16 16,0 2-26-16,0 0-117 15,0 0-40-15,0 0-71 16,1 0-98-16</inkml:trace>
+  <inkml:trace contextRef="#ctx0" brushRef="#br0" timeOffset="11535.569">15528 12649 757 0,'8'3'260'0,"-4"-3"14"15,-4-2-189-15,0 2-78 16,0 0-20-16,0 0-1 16,0 0 4-16,-2 0-2 15,2 0 2-15,0 0 0 0,0 0 6 16,0 0-1-16,0 0 2 16,0 0-3-16,0 0 0 15,0 0-6-15,0 0-2 16,0 0-1-16,2 0 4 15,-1-1-1-15,25-3 8 16,51-14-1-16,-29 3 1 16,21-12 1-16,6-6 3 15,19-12-3-15,2-3 4 16,19-15-1-16,-10 3 0 0,20-11-2 16,-18 8 2-16,9-9-2 15,-21 14 3-15,-2-2 0 16,-25 15 0-16,-5-1 5 15,-20 15 5-15,-7 3 9 16,-14 12 3-16,-8 1 8 16,-8 9 0-16,-4 4 1 15,-2 1-7-15,0 1-1 16,0 0-8-16,0 0-9 16,-1 0-34-16,1 0-239 15,0 0-23-15,-1 1-100 16</inkml:trace>
+  <inkml:trace contextRef="#ctx0" brushRef="#br0" timeOffset="18476.128">15997 12254 748 0,'28'96'205'0,"-40"-79"43"16,2-16-194-16,2 0-69 16,7 1-5-16,0 0-4 15,1-4-1-15,0 2 0 16,0 0 8-16,0 0 6 16,0 0 10-16,0 0 2 0,0 0 1 15,0 2 1-15,0-1-1 16,1 6-2-16,3 4-1 15,6 6-1-15,25 32 0 16,-10-32-1-16,-1-1 1 16,10-3 2-16,1-7 3 15,9-2 0-15,-3-5 1 16,15-5 2-16,-3 0 2 16,19-11 9-16,5-4 5 0,21-16 8 15,3-9 3-15,28-26 8 16,-3-6-7-16,25-23 1 15,-7 0-5-15,26-25-3 16,-13 7-8-16,30-11 1 16,-21 8-4-16,24-13 1 15,-23 24-1-15,7-3 4 16,-31 17-7-16,20-5 42 16,-41 18 3-16,-4 3-2 15,-28 19-6-15,-7 6 3 16,-42 26-43-16,-3 10-6 15,-18 9-2-15,-5 3 1 16,-10 5-7-16,-1 0-55 0,-3 3-70 16,-1 0-236-1,1 0 0-15</inkml:trace>
+  <inkml:trace contextRef="#ctx0" brushRef="#br0" timeOffset="21513.042">12918 14104 924 0,'-17'5'280'0,"19"-8"47"16,-14 2-230-16,8 0-99 15,3 0-12-15,-1 1-9 16,1-1-9-16,1 1-1 0,0 0-2 15,0 0 14-15,0 0 4 16,0 0 7-16,0 0-5 16,0-1 6-16,0 0 1 15,1-1 2-15,3 1 0 16,21-3 6-16,43-8-3 16,-32 8 0-16,9-2-1 15,0 0 0-15,9 3-1 16,-2 0 1-16,8 3-2 15,-6 0 2-15,12 0 0 16,-6-2 3-16,10-3-2 16,-2 1 1-16,9-2 0 15,-11 0 2-15,1 0 1 16,-14 1 6-16,-5-2 5 16,-15 1 3-16,-4 0 11 15,-10 2 5-15,-5 0 2 16,-6 3-1-16,-3 1 9 15,-4-1-9-15,-1 1-3 0,0 0-5 16,0 0-5-16,0 0-11 16,0 0-6-16,0 0-14 15,0 0-75-15,0 0-33 16,0 0-113-16,1 0-98 16,21 2-26-16</inkml:trace>
+  <inkml:trace contextRef="#ctx0" brushRef="#br0" timeOffset="22832.673">16191 13975 1109 0,'-9'-7'214'0,"-1"-1"116"31,1 5-327-31,5-1-22 0,2 3 5 0,2 1-10 16,0 0-4-16,0 0-6 16,0 0 6-16,0 0 1 15,0 0 11-15,0 0 3 16,2 0 7-16,8 0 2 16,15 0 5-16,51-2-3 15,-33-8-1-15,18-1 0 16,3-1-2-16,17-1 0 15,-2-4 2-15,21 1 0 16,-6 0 2-16,21-2-1 16,-10-1 3-16,22 1-3 0,-9-1 8 15,30-1 7-15,-11-2-4 16,23-1-7-16,-17 4 1 16,14 0-7-16,-34 5-8 15,25 1 8-15,-20 5 6 16,15 0 0-16,-12 3 0 15,23 5 0-15,-29 4-3 16,14 3 1-16,-21 2-1 16,5 2 3-16,-24 1 4 0,2 0 12 15,-19-4 10-15,0-1 20 16,-19-6 8-16,-3-1 11 16,-16-4-8-16,-5 1-3 15,-15-1-13-15,-5 2 7 16,-10 1-7-16,-3-1 5 15,-4 2-4-15,-1 0-1 16,-2-2-13-16,0 1 2 16,1 1-5-16,0 0 4 15,0 0-4-15,0 0 0 16,0 0-5-16,0 0-2 16,0 0-5-16,0 0 2 15,0 0-3-15,0 0 4 16,0 0-1-16,0 0 2 15,0 0-1-15,0 0-2 16,0 0-5-16,0 0-4 0,0 0-5 16,0 0-2-16,0 0 0 15,0 0-2-15,0 0 2 16,0 0 0-16,0 0 1 16,0 0-1-16,0 0 2 15,0 0-1-15,0 0 0 16,0 0 0-16,0 0 1 15,0 0 0-15,0 0 1 0,0 0 0 16,0 0 1-16,0 0 4 16,-1 0 1-16,1 0 3 15,0-1 1-15,0 1 0 16,0 0-1-16,0 0-2 16,0 0-2-16,0 0 0 15,0 0-3-15,0 0 0 16,0 0-2-16,0 0 1 15,0 0 0-15,0 0-1 16,0 0 0-16,0 0 0 16,-1 0-1-16,1 0 0 15,-1 0-1-15,1 0 0 16,0 0 0-16,0 0-1 16,0 0 0-16,0 0-1 15,0 0 0-15,0 0-3 0,0 0-7 16,0 0-32-16,0 0-20 15,-2 0-68-15,2 0-40 16,-1-1-330-16,-1 0 62 16</inkml:trace>
+  <inkml:trace contextRef="#ctx0" brushRef="#br0" timeOffset="23731.882">19052 12308 1560 0,'13'12'203'0,"-10"-8"113"0,-3-5-504 16,2 3-84-16,-2-2 38 16,0 1 46-16,1 1 74 15,23 20 43-15,36 37 71 16,-29-25 1-16,0-2-1 15,3 6 0-15,-2-7 1 16,9 4 0-16,1-9 2 16,11 7 0-16,-1-3 0 15,17 10 0-15,0 3-2 0,20 11-1 16,2 0 0-16,22 11 0 16,-7-8 0-16,21 0-17 15,-13-16-25-15,13-13-30 16,-17-20-4-16,7-19-3 15,-21-16 28-15,-2-17 90 16,-25-1 64-16,-8-8 39 16,-21 7 26-16,-12-2 24 15,-16 12-59-15,-7 0-16 16,-7 10-33-16,-6-1-24 16,-2 9-35-16,-8 3-15 15,-8 3-28-15,-16 3-21 16,-7 5-1-16,-15 8 2 15,1 3 8-15,-5 9 10 16,13 6 22-16,-7 13 1 16,10 0 2-16,-8 17 1 0,7 7 3 15,-8 12 8-15,12 2 0 16,1 19 0-16,9-6 0 16,1 8-11-16,11-10 4 15,3 8 2-15,5-13-1 16,7 7-2-16,4-18 8 15,1 13-2-15,2-13 1 0,2 10 0 16,0-5 2-16,-1 17-2 16,-3-14-10-16,-1 7-3 15,-3-15 0-15,-1-7 3 16,0-19 8-16,2-9 20 16,3-14 9-16,1-8 10 15,4-5 0-15,0-5-5 16,3-1-19-16,-2 0-6 15,-1 0-11-15,1 0-5 16,1 0-15-16,-1 0-57 16,0-1-53-16,0 0-314 15,-2 0 34-15</inkml:trace>
+  <inkml:trace contextRef="#ctx0" brushRef="#br0" timeOffset="26218.192">11266 15119 827 0,'6'16'243'0,"-3"-8"30"31,-3-8-241-31,0 0-88 0,0 0-14 0,0 0-6 16,0 0 13-16,0 0 26 16,0 0 22-16,1 0 8 15,10 2 7-15,15 5 2 16,36 6 0-16,-26-17 2 16,0-3 1-16,11-6 4 15,0-6 0-15,13-6 0 16,1 3-2-16,14-8-1 0,-7 5-4 15,7-5 0-15,-10 4-1 16,6-4 2-16,-11 5-1 16,7-6 2-16,-6 3 6 15,4-4 11-15,-11 4 2 16,-1-4 5-16,-14 4-2 16,-3 4-2-16,-14 4-12 15,-5 7-2-15,-8 4-4 16,-3 6 0-16,-5 2-2 0,-1 2-19 15,0-2-28-15,0 1-153 16,0 0-23-16,0 0-41 16,0 1-127-16</inkml:trace>
+  <inkml:trace contextRef="#ctx0" brushRef="#br0" timeOffset="26599.17">11967 15288 1144 0,'-3'2'262'0,"3"-4"83"16,2 4-334-16,-2-2-47 0,0-1-1 15,1 0 7-15,25-6 12 16,54-25 8-16,-29 5 9 15,14-5 1-15,2-5-2 16,9-8 2-16,-5 0-2 16,8-5 3-16,-12 2-1 15,8-1 2-15,-14 5-1 16,2 5 2-16,-16 11-1 16,-7 5 2-16,-16 6-2 15,-5 9 5-15,-14 3 4 0,-1 0 7 16,-5 4 1-16,1 1 1 15,-2 0-7-15,2 0-61 16,0 0-62-16,2-1-239 16,28-9 5-16</inkml:trace>
+  <inkml:trace contextRef="#ctx0" brushRef="#br0" timeOffset="32029.922">15142 16164 740 0,'-4'5'219'15,"2"-4"38"-15,-1 0-198 16,-1 0-54-16,2 1-10 16,-1-1 4-16,1 0 6 15,0 0 10-15,0 0 5 16,-1 0 1-16,1 1-4 0,1-2-7 16,0 0-9-16,-1 0-2 15,1 0-1-15,1 0 0 16,1-2 1-16,23-1 0 15,39-17 0-15,-26 6 0 16,0 3 0-16,9-3-2 16,2 4 1-16,15-2-1 15,-1 2 0-15,16 1 1 16,-7-2 1-16,14 1 1 16,-10 1 0-16,11-2 0 15,-9 0 1-15,13-1-1 16,-14 1 1-16,12-2 0 15,-12 0-1-15,9-1 2 16,-7 4 2-16,9 1 1 16,-13 2 0-16,10 5-1 15,-9 3-2-15,13 1-1 16,-3 0-1-16,13 1 1 0,-4-3 0 16,13-1-2-16,-10-2 6 15,5 2-1-15,-16 0-1 16,-2 3-1-16,-19 1 2 15,-2 5-5-15,-18-1 1 16,3 3 1-16,-9-1 1 0,0 0 12 16,-6-1 9-16,-3 1 11 15,-7-5 5-15,-1 1 21 16,-7-1 0-16,-6-3 11 16,-2 1 0-16,-5-1 11 15,-1-1-14-15,-2 0-3 16,0 0-18-16,1 0-8 15,0 0-16-15,0 0-5 16,0 0-9-16,0 0-2 16,0 0-2-16,0 0-2 15,0 0-1-15,0 0-4 16,0 0-13-16,0 0-87 16,0 0-86-16,1 0-237 15,9 0-34-15</inkml:trace>
+  <inkml:trace contextRef="#ctx0" brushRef="#br0" timeOffset="40373.283">15780 17639 794 0,'3'11'266'0,"-7"-6"22"15,1-7-194-15,-1-2-86 16,3 3-11-16,1 0-4 0,-1 1 1 16,1 0-10-1,0 0-9-15,0 0-8 0,0 0 2 16,0 0 4-16,1 0 9 16,5 0 13-16,16 2 12 15,40-2 3-15,-34-8 1 16,12-6 1-16,4 2-2 0,19-10-3 15,2 2-2-15,16-5-3 16,-1 4-2 0,22-5 0-16,-5 2 2 0,18-8-2 15,-6 0 2-15,21-10 5 16,-17 0 2-16,12-8 5 16,-18 9 4-16,4-4 13 15,-24 9 0-15,-2 0 13 16,-24 7 1-16,-5 1 7 15,-21 10-10-15,-7 3 1 16,-13 5-11-16,-7 3-3 16,-4 6-11-16,-4 0-12 15,2 0-45-15,-2-1-315 16,1 1 79-16</inkml:trace>
+</inkml:ink>
+</file>
+
+<file path=ppt/ink/ink29.xml><?xml version="1.0" encoding="utf-8"?>
+<inkml:ink xmlns:inkml="http://www.w3.org/2003/InkML">
+  <inkml:definitions>
+    <inkml:context xml:id="ctx0">
+      <inkml:inkSource xml:id="inkSrc0">
+        <inkml:traceFormat>
+          <inkml:channel name="X" type="integer" max="29376" units="cm"/>
+          <inkml:channel name="Y" type="integer" max="16524" units="cm"/>
+          <inkml:channel name="F" type="integer" max="4095" units="dev"/>
+          <inkml:channel name="T" type="integer" max="2.14748E9" units="dev"/>
+        </inkml:traceFormat>
+        <inkml:channelProperties>
+          <inkml:channelProperty channel="X" name="resolution" value="1000.20428" units="1/cm"/>
+          <inkml:channelProperty channel="Y" name="resolution" value="1000.24213" units="1/cm"/>
+          <inkml:channelProperty channel="F" name="resolution" value="0" units="1/dev"/>
+          <inkml:channelProperty channel="T" name="resolution" value="1" units="1/dev"/>
+        </inkml:channelProperties>
+      </inkml:inkSource>
+      <inkml:timestamp xml:id="ts0" timeString="2020-02-01T11:43:36.478"/>
+    </inkml:context>
+    <inkml:brush xml:id="br0">
+      <inkml:brushProperty name="width" value="0.05292" units="cm"/>
+      <inkml:brushProperty name="height" value="0.05292" units="cm"/>
+      <inkml:brushProperty name="color" value="#FF0000"/>
+    </inkml:brush>
+  </inkml:definitions>
+  <inkml:trace contextRef="#ctx0" brushRef="#br0">22419 7039 767 0,'1'17'222'15,"2"-7"10"-15,-3-10-200 16,8-1-64-1,7 0-14-15,12-5 22 0,4-1 19 16,9-2 1-16,3-3 1 16,9-3 0-16,1 3 0 15,10-5 2-15,-3 2-1 16,14-1 0-16,-7 2 1 0,8 1 0 16,-7 0 0-16,10 0 1 15,-7 4 1-15,5 0-1 16,-7 2 1-16,12-1 1 15,-12 2-2-15,15 1 0 16,-7 3 1-16,8 1-2 16,-12 2 1-16,10 1 0 15,-16 1 0-15,7 1 0 16,-9 2 1-16,6 0-1 16,-14 1 0-16,11 1 1 15,-8-1 2-15,3-1 1 16,-8-2 5-16,0 0 11 15,-17-3 4-15,-2 1 8 16,-12 0 0-16,-1-2 0 16,-6 0-10-16,-1 3-4 15,-6-2-7-15,-1-1-2 0,-3 1-2 16,-1 0 3-16,-4-1 1 16,-1 0 2-16,0 0-2 15,0 0 0-15,0 0-3 16,0 0-4-16,0 0-3 0,0 0-40 15,0 0-77-15,0 0-169 16,0 0-8-16</inkml:trace>
+  <inkml:trace contextRef="#ctx0" brushRef="#br0" timeOffset="1948.725">11294 7797 114 0,'13'-45'150'0,"-10"36"-15"15,-7 4 0-15,2 3-62 16,2 2-29-16,-1-1-4 16,1 1-28-16,0 0 15 15,0 0 4-15,0 0 5 16,0 0-3-16,0 0-6 15,-1 0-19-15,1 0-8 16,0 0-4-16,0 0 0 16,0 0 1-16,0 0 2 15,0-2 2-15,1 1 0 16,13-2 1-16,17-6 1 16,39-12-2-16,-26 6-3 15,1 1 0-15,12-2 1 0,0 1-1 16,12-1 1-16,-2 1 2 15,9-4 0-15,-9 1 0 16,7-6 1 0,-12-2-1-16,4-3 2 0,-12 4 11 15,1 2 24-15,-16 6 4 0,-6 4 7 16,-16 5 15 0,-4 5 27-16,-10 0-14 15,1 3 13-15,-4 1-7 0,0-1-11 16,0 0-35-16,0-1-11 15,0 1-13-15,0 0-3 16,0 0-4-16,0 0 1 16,0 0-4-16,0 0 0 15,-2 0-1-15,2 0-20 16,-1 0-38-16,1 0-140 16,0 0-12-16,1-1-109 15,11-1-90-15</inkml:trace>
+  <inkml:trace contextRef="#ctx0" brushRef="#br0" timeOffset="3229.014">12211 8780 387 0,'0'-8'148'15,"-3"1"30"-15,-2 3-94 16,3 1-35-16,1 2-7 0,1 1-26 16,0 0-13-1,-1 0-6-15,1 0 1 0,0 0 1 16,0 0 2-16,0 0-1 15,0 0-2-15,0 0-3 16,0 0-1-16,0-1 1 16,1 0 2-16,16-3 4 15,22-7 4-15,43-16 0 16,-17 3 0-16,0 0-2 16,17-4 0-16,-1 2-3 15,15-5-1-15,-8 3 1 0,18-7 0 16,-11 3-1-16,7-6 1 15,-15 3 1-15,-2 0 37 16,-24 6 16-16,-10 2 30 16,-22 8 11-16,-8 5 30 15,-13 7-23-15,-6 4-1 16,-2 1-23-16,0 4-6 16,-1-2-29-16,1 0-11 15,0 0-17-15,0 0-24 16,0 0-138-16,0 1-203 15,2 10 3-15</inkml:trace>
+  <inkml:trace contextRef="#ctx0" brushRef="#br0" timeOffset="6746.072">13620 10024 726 0,'6'-2'144'0,"-5"2"68"15,1-1-212-15,-2 1-16 16,0 0 6-16,0 0 1 16,1 0 4-16,3 0 2 15,9 3 3-15,8 3 1 16,38 9 3-16,-24-17 2 15,-1-4 2-15,10-5 6 16,-2 5-1-16,6-6-1 16,-6 3-2-16,13-2-3 15,-2 6-6-15,16-6 4 16,0 3 5-16,24-4 2 16,-4 3 1-16,22-5-1 0,-8 1-2 15,14-2-6-15,-13 1-2 16,9-1 3-16,-21 3-1 15,3 1 3-15,-19 2 2 16,5-3 17-16,-18 4 2 16,3-1 0-16,-11 2-2 15,-1 0-1-15,-16 4-17 16,-9 1 23-16,-14 1 24 0,-4 0 29 16,-10 2 7-16,0-1 3 15,-2 0-25-15,1 0-25 16,0 0-31-16,-1 0-47 15,-1 0-95-15,2 0-165 16,2 0-74-16,29 1-117 16</inkml:trace>
+  <inkml:trace contextRef="#ctx0" brushRef="#br0" timeOffset="12845.226">10806 11257 641 0,'6'4'239'15,"-4"-1"-1"-15,-7-5-171 16,5 2-66-16,0 0-45 15,0 0-7-15,0 0 0 16,0 0 2-16,0 0 16 16,0 0 8-16,0 0 15 15,0 0 2-15,0 0 2 0,0-1-1 16,1 0 2-16,8 0 3 16,15-1 1-16,43-6-1 15,-32 2-1-15,13-6 0 16,1 1-2-16,22-9 2 15,6-2 2-15,20-7 1 16,-3 1 0-16,10-5 1 16,-13 6 0-16,5 0 0 15,-18 8-1-15,5-3 3 16,-14 3-1-16,4 0 0 16,-12-3 1-16,4-4 0 15,-11 6-2-15,-2-2 19 16,-12 5 2-16,-4 6 7 15,-18 1 12-15,-4 5 42 16,-8 4-2-16,-4-1 17 16,-2 2-2-16,0 0-8 0,0 0-42 15,0 0-15-15,0 0-22 16,0 0-8-16,0 0-9 16,-1 0-48-16,1 0-29 15,0 0-101-15,1 0-96 16,9 1-18-16,16 0-82 15</inkml:trace>
+  <inkml:trace contextRef="#ctx0" brushRef="#br0" timeOffset="13983.278">9454 11323 970 0,'-6'3'207'0,"-2"-4"90"15,0-3-286-15,3 4-23 16,5 0-7-16,0 0-15 16,0 0-4-16,0 0 0 15,0 0 10-15,1 0 6 16,16 6 9-16,13 7 5 16,37 26 0-16,-25-6-2 15,-1 6 4-15,16 20 2 16,0 1 2-16,17 20 0 15,1-1 2-15,19 11 0 0,-5-13-1 16,24 3-1-16,-11-22 1 16,15-12-7-16,-13-22 1 15,7-15-2-15,-22-17 1 16,1-13 1-16,-26-6 7 0,-5-9 2 16,-21 4 6-16,-8-2 9 15,-15 2 12-15,-3 2 30 16,-10 7 14-16,-2-1 7 15,-6 2-5-15,-4 2-5 16,-1 6-24-16,-5-2-12 16,-2 7-14-16,-6 6-12 15,-3 4-11-15,-10 3-19 16,1 9-8-16,-9 7-4 16,4 4 7-16,-5 6 3 15,5 1 11-15,-2 7 5 16,6-3 6-16,-1 7-1 15,8 2-1-15,-3 10 0 16,8-2-1-16,-3 14-2 16,9-6 1-16,-4 7 1 15,4-5 1-15,2 7 1 0,3-12 2 16,-4 6 0-16,3-11 1 16,1 1 1-16,2-13-1 15,3-5 2-15,3-16 1 16,4-2 3-16,1-15 2 15,0-2 3-15,1 2 0 16,0-2 1-16,0 0-2 16,-1 0 0-16,1 0-2 15,-2-1 1-15,2 0 1 16,0 0 0-16,0 1-1 0,0 0-3 16,0 0-4-16,0 0-6 15,0 0-7-15,0-1-32 16,-1-1-31-16,1 1-170 15,0 0-79-15,0 0-56 16</inkml:trace>
+  <inkml:trace contextRef="#ctx0" brushRef="#br0" timeOffset="16588.023">14940 14102 1081 0,'-1'8'273'0,"0"-2"56"16,1-7-306-16,1-1-91 15,-1 2-22-15,0 0-11 16,0 0 14-16,0 0 14 16,0 0 33-16,1 0 18 15,9-1 22-15,12 0 4 16,34-4-3-16,-31 3 0 16,-2-2-1-16,4 2 1 15,-2 1-1-15,7 4 1 16,-2-2-1-16,11 4 0 15,-2 1-1-15,13 1 0 16,-3-2 0-16,13 1-1 16,-3-1 1-16,14 0 0 15,-11-2 1-15,5 3 0 0,-8-4 2 16,4 2-2-16,-11-4 0 16,10 0 1-16,-5-1-1 15,7 0 1-15,-5-1 2 16,7 2-1-16,-11-1 1 15,9 1 0-15,-9 1-1 16,13 2 7-16,-3-1 4 16,11-1 4-16,0 2 0 15,17-2 2-15,-6-1-6 16,16-4-1-16,-6 0-2 0,7-2 4 16,-15-1 0-16,8 0 1 15,-18 1-2-15,9 2 1 16,-18 1-3-16,15 1 2 15,-10 2-2-15,13-1 0 16,-6 1-1-16,13-2 1 16,-14-3 0-16,11-3 0 15,-13-2 1-15,8-4 1 16,-9 0 0-16,6-1 4 16,-12 1 0-16,13 1 6 15,-14 4-2-15,7 0-1 16,-4 1-6-16,10 1 0 15,-14-1-8-15,11-1 1 16,-8 1 0-16,4-2 9 16,-12 2 6-16,1-1 10 15,-19 4 1-15,-8 1 4 16,-17-1-6-16,-8 2 7 0,-8 3-3 16,-4-1 4-16,-2-2-1 15,0 3-1-15,0 0-14 16,0 0 0-16,0 0-4 15,0 0 4-15,0 0 0 0,0 0 3 16,0 0-4 0,0 0-2-16,0 0-5 0,-1 0-4 15,0 0-5-15,1 0-7 16,0 0-5-16,-2 0-16 16,2 0-14-16,0 0-60 15,0 0-49-15,0 0-302 16,0 0 38-16</inkml:trace>
+  <inkml:trace contextRef="#ctx0" brushRef="#br0" timeOffset="20424.087">12658 15439 597 0,'6'-3'188'16,"-6"3"8"-16,0 1-145 15,0-1-105-15,0-1-30 16,0 1 16-16,0 0 9 16,0-1 13-16,0 1 13 0,1 0 37 15,1 0 3-15,-1 0 1 16,-1 0-1-16,1 0-2 15,0 0 7-15,0 0 0 16,7 0 4-16,11 0 1 16,41 2 1-16,-37-2-9 15,4 2-2-15,0 2 3 0,2-1 12 16,-3-3 13-16,5 2 14 16,-2-3 0-16,7-3-1 15,-3-2-12-15,4 1-12 16,-3-2-13-16,1 2-1 15,-5 2-5-15,4 0-1 16,-7 2-2-16,6 1 3 16,-4 1 1-16,4-1 3 15,-3-1 0-15,6 1 3 16,-6-3-2-16,4 3-1 16,-3 0 0-16,5 2 3 15,-2-1-3-15,7 2 1 16,-2-3-2-16,9 5-1 15,-2 1-3-15,6-1 0 16,-9 1-3-16,9 0 1 0,-7-3-2 16,5 0 1-1,-4-2 0-15,8-1 21 0,-5 1 3 16,9-1 6-16,-6 1 0 16,5 0 2-16,-5 2-21 15,7-1-1-15,-7 1-6 16,11 1-2-16,-5 0-1 15,9 1 0-15,-7 0-2 0,14-2 1 16,-5-1 0 0,13-2-2-16,-5-2 0 0,16 0 1 15,-10-3-1 1,15-1 1-16,-10 4 0 0,16 0 0 16,-12-1 0-16,12 2 1 15,-14 2-2-15,13-3 2 16,-14-2-1-16,14-2 2 15,-8-3-2-15,12-2 2 16,-11 3-2-16,10 0 1 16,-14 1-1-16,6 5 0 15,-17 3 0-15,5 1 0 16,-17 3 1-16,6 4 0 16,-15-1 0-16,0-1 2 15,-16 1 7-15,-6-2 20 0,-19-4 10 16,-2 2 32-16,-13-4 16 15,0 1 19 1,-4-1-14-16,0 0-3 0,0 0-32 16,0 0-17-16,-1 0-27 15,1 0-45-15,0-1-54 16,1 1-331-16,12 3 56 16</inkml:trace>
+  <inkml:trace contextRef="#ctx0" brushRef="#br0" timeOffset="24671.516">10349 16628 951 0,'-12'-1'166'0,"-6"-5"117"15,3 0-276 1,5 2-18-16,7 1 17 0,1 3 0 15,1 1-9-15,1-2 0 16,0 0 6-16,0 1 3 16,0 0 1-16,0 0-3 15,0-1-2-15,1 0-4 16,12-5-1-16,23-11-1 16,39-18 2-16,-19 10 0 15,5-4 2-15,15-11-1 16,0 2 1-16,20-11 0 15,-9 5 0-15,11-5-1 16,-12 8 1-16,10-7 1 16,-16 9-1-16,6-4 0 15,-17 7 0-15,2-1 1 16,-15 10 3-16,0-4 4 0,-7 5 3 16,-4 1 0-16,-11 8 0 15,-3 1-1-15,-11 5-4 16,-5 5 0-16,-8 3-1 15,-4 1-2-15,0 2-3 16,-3 0-16-16,-2 0-24 16,2 0-79-16,0 0-25 15,0 0-40-15,0 1-20 16,2 0-54-16,1 6 51 0</inkml:trace>
+  <inkml:trace contextRef="#ctx0" brushRef="#br0" timeOffset="25139.243">9973 17316 1154 0,'10'2'216'15,"-6"0"51"-15,-3-2-347 16,9-3-13-16,4-1 8 15,13-4 11-15,4-6 66 0,18-7 9 16,1-2 0-16,22-5 2 16,-1-5 0-16,18-13-1 15,-4 2 1-15,20-9-2 16,-9-1-1-16,11-7-2 16,-12 10 3-16,3-6 0 15,-23 11 0-15,-3-1 1 16,-19 12 1-16,-2 2-2 15,-13 8 0-15,1 4-9 16,-9 7-24-16,8 11-122 16,-2 7-110-16,13 12-28 15</inkml:trace>
+</inkml:ink>
+</file>
+
 <file path=ppt/ink/ink3.xml><?xml version="1.0" encoding="utf-8"?>
 <inkml:ink xmlns:inkml="http://www.w3.org/2003/InkML">
   <inkml:definitions>
@@ -1123,6 +1244,126 @@
   <inkml:trace contextRef="#ctx0" brushRef="#br0" timeOffset="42611.696">15603 15334 343 0,'-6'-5'185'0,"0"0"-25"16,-2 3-46-16,4-2-130 16,-1 3-5-16,4 3 5 15,0-3-1-15,0 0 9 16,-1 1 17-16,1 0 6 15,1 0-2-15,0 0-3 16,0 0-11-16,0 0-11 16,0 0-1-16,0-1 2 0,0 0 2 15,1 0 6-15,1-1 3 16,13-2 0-16,3 0-1 16,35-1 0-16,-29 2-1 15,-1 0 1-15,7-5 0 16,-1-1 1-16,8-2-1 15,-2 5 1-15,7-5-1 16,-1 3 1-16,5-1-1 16,-7-1 0-16,9-2-1 15,-6 8 1-15,2-2 1 16,-6 5 0-16,7-1 0 16,-5 1 1-16,13-1-1 15,-1-2 0-15,14 2-1 16,-4-4 1-16,12 0 0 0,-7 0 1 15,10 4 0 1,-11-1 0-16,7 5-1 0,-8 0 0 16,5 4 0-16,-16-6 0 15,5 5 9-15,-15-5 13 16,0 1 22-16,-11-2 8 16,4 2 7-16,-9-1-6 15,1 0-10-15,-10 1-21 16,-3-2-8-16,-4 3-6 15,-3-2-1-15,-4 1-2 0,-1 0 0 16,-1 1-2-16,-3-2 0 16,0 0-1-16,0 0-3 15,0 0-4-15,0 0-35 16,0 0-24-16,0 0-149 16,1 0 2-16,7 1-71 15</inkml:trace>
   <inkml:trace contextRef="#ctx0" brushRef="#br0" timeOffset="44692.246">10339 16424 318 0,'7'1'145'16,"-8"0"-17"-16,2-2-68 15,-1 0-91-15,0 0 3 0,0-1 5 16,1 1 5 0,0 0 17-16,4 0 1 0,4 0-1 15,5-1 0-15,1 0 1 16,38-2-1-16,-34 1 2 15,8-1 1-15,-2-2 1 16,9-2-1-16,0-2 0 16,7-4-1-16,-1 3-1 15,7-4-1-15,-3 0 0 0,9-2 1 16,-6 2 1-16,6-3 2 16,-8-1 0-16,4 3 1 15,-12-1-1-15,1 0 0 16,-7 0-2-16,1 1 1 15,-9 1 2-15,1 5 7 16,-6-2 8-16,-7 5 15 16,-4 4 13-16,-2 0 26 15,-4 0 0-15,-1 3-1 16,0 0-15-16,0 0-13 16,0 0-27-16,0 0-9 15,0 0-7-15,0 0-1 16,0 0 0-16,0 0-2 15,0 0-2-15,-1 0-23 16,1 0-34-16,0 0-46 0,0 0-32 16,0-1-64-16,1 0-12 15</inkml:trace>
   <inkml:trace contextRef="#ctx0" brushRef="#br0" timeOffset="45189.145">10233 17237 384 0,'10'-7'76'0,"-1"-4"39"15,10-1-88-15,5-2-56 16,13-6 27-16,0-3 1 16,8-10 1-16,-2 2-1 15,1-4 1-15,-8 4 1 0,1 2-1 16,-9 9 1-16,-5 3-1 15,-8 7-3-15,-4 3-38 16,-5 4-65-16,1 8-8 16,-2 2-58-16</inkml:trace>
+</inkml:ink>
+</file>
+
+<file path=ppt/ink/ink30.xml><?xml version="1.0" encoding="utf-8"?>
+<inkml:ink xmlns:inkml="http://www.w3.org/2003/InkML">
+  <inkml:definitions>
+    <inkml:context xml:id="ctx0">
+      <inkml:inkSource xml:id="inkSrc0">
+        <inkml:traceFormat>
+          <inkml:channel name="X" type="integer" max="29376" units="cm"/>
+          <inkml:channel name="Y" type="integer" max="16524" units="cm"/>
+          <inkml:channel name="F" type="integer" max="4095" units="dev"/>
+          <inkml:channel name="T" type="integer" max="2.14748E9" units="dev"/>
+        </inkml:traceFormat>
+        <inkml:channelProperties>
+          <inkml:channelProperty channel="X" name="resolution" value="1000.20428" units="1/cm"/>
+          <inkml:channelProperty channel="Y" name="resolution" value="1000.24213" units="1/cm"/>
+          <inkml:channelProperty channel="F" name="resolution" value="0" units="1/dev"/>
+          <inkml:channelProperty channel="T" name="resolution" value="1" units="1/dev"/>
+        </inkml:channelProperties>
+      </inkml:inkSource>
+      <inkml:timestamp xml:id="ts0" timeString="2020-02-01T11:44:06.754"/>
+    </inkml:context>
+    <inkml:brush xml:id="br0">
+      <inkml:brushProperty name="width" value="0.05292" units="cm"/>
+      <inkml:brushProperty name="height" value="0.05292" units="cm"/>
+      <inkml:brushProperty name="color" value="#FF0000"/>
+    </inkml:brush>
+  </inkml:definitions>
+  <inkml:trace contextRef="#ctx0" brushRef="#br0">18769 7376 289 0,'1'0'131'0,"-1"0"-8"16,0-3-60-16,-1 1-50 16,1 2-8-16,0 0 2 15,0-1 2-15,0 1 8 16,0 0 2-16,0 0 1 16,0 0-3-16,0 0-3 15,0 0-9-15,0 0-5 0,0 0-1 16,0 0 1-16,0 0 3 15,0 0 2-15,0 0 0 16,0 0 3-16,0 0 0 16,4-1-2-16,22 0-1 15,49 1-2-15,-30 1-3 16,10 3-3-16,-3-2 2 16,15 0-1-16,-3-2 2 15,15-1-1-15,1-2 1 0,16-5 0 16,0-3 0-16,17-3 0 15,-7 0 0-15,15-1-1 16,-7 4 1-16,15-1 1 16,-13 4 0-16,12-2 1 15,-15 2 0-15,11-5 5 16,-23 3 3-16,8-3 12 16,-22 2 4-16,2-2 22 15,-20 4 7-15,-5-4 13 16,-22 4-7-16,-5-2 3 15,-17 5-18-15,-6 2-8 16,-10 2-16-16,1 2-7 16,-4-1-34-16,-1 1-128 15,1 0-107-15,9 0-32 16</inkml:trace>
+  <inkml:trace contextRef="#ctx0" brushRef="#br0" timeOffset="3850.778">13688 8448 768 0,'12'29'291'15,"-8"-17"-13"-15,-6-15-154 16,2 4-180-16,1-1-9 0,-1-1 27 16,0 1 6-16,0 0 11 15,0 0 5-15,1 0 11 16,5 0 2-16,12 0 0 16,42-3-2-16,-31-5 2 15,11-3-1-15,2 0 2 0,18-5-1 16,2 0 2-16,17-5 0 15,-4 1 0-15,18-4 0 16,-7 1 0-16,23-5-1 16,-10 2 1-16,27-4 0 15,-11-1 2-15,21-3-2 16,-20 4 2-16,11-7-1 16,-27 4 1-16,1-2 1 15,-31 7 4-15,-7-1 11 16,-22 10 5-16,-10 5 2 15,-15 7 1-15,-6 4 6 16,-6 2-9-16,-3 1 1 16,-1 0-2-16,0 0 0 0,0 0-6 15,0 0-2-15,-1 0-5 16,1 0 2-16,0 0-2 16,0 0 0-16,0 0-2 15,0 0-3-15,-1 0-14 16,1 0-51-16,-1 0-39 15,1 0-98-15,0-1-41 16,0 0-45-16,1-2-44 0</inkml:trace>
+  <inkml:trace contextRef="#ctx0" brushRef="#br0" timeOffset="6799.768">11877 9678 572 0,'8'5'129'16,"-5"-4"-11"-16,2 0-127 16,1 0-106-16,-6-1 6 15,1 0 79-15,0 0 22 16,5 3 7-16,7 2 1 16,-1 2 0-16,40 26 1 15,-33-25-1-15,6 1 1 16,3-2 2-16,8-1 1 15,2-3 1-15,9 2 1 16,-4-2-1-16,10 2 1 16,-9-2 7-16,9 2 17 15,-3-2 6-15,13 1 0 16,-2-1 0-16,20 0-9 16,-5 1-19-16,14 2-5 15,-8 1-1-15,9 1-2 16,-14 1 1-16,6-2 1 15,-11 0 0-15,-2-4 1 0,-13 0 24 16,2-3 6-16,-10-1 0 16,-3-2 2-16,-7 2 2 15,-5 0-6-15,-14 0 9 16,-3 1 34-16,-9 0 11 16,-5 0 14-16,-2 0-13 15,-1 0-10-15,0 0-31 16,0 0-7-16,0 0-10 15,-1 0 23-15,1 0 6 0,-1 0 18 16,1 0 0-16,-1-1 5 16,1 1-26-16,0-2-13 15,-1 2-20-15,1-1-27 16,0 1-35-16,0-1-54 16,0 1-35-16,0-1-96 15,0 0-159-15,1-1 18 16</inkml:trace>
+  <inkml:trace contextRef="#ctx0" brushRef="#br0" timeOffset="8632.654">17932 9877 875 0,'3'9'128'0,"-3"-8"93"16,1-1-260-16,-1 0-27 15,0 0 17-15,0 0 6 16,0 0 10-16,0 0 3 16,0 0 16-16,0 0 5 15,1 0 8-15,4 0 3 16,20 2 0-16,42-1 0 15,-31-7 0-15,16-3 0 0,3 1-1 16,23-4 0-16,5 0-1 16,23-3 1-16,-4-1-1 15,23-1-1-15,-10 5 1 16,18 0 1-16,-14 3-2 16,19 7 3-16,-14 3 17 15,20-1 15-15,-7 3 4 16,27 0 4-16,-13-1-1 15,24 1-15-15,-19 0-14 16,14 1 7-16,-26-1 0 16,15 4 3-16,-30-2 1 0,13 3 10 15,-24 0-6-15,6-1 6 16,-27-2 8-16,3 1 25 16,-25-5 0-16,-4-1 15 15,-18-1 3-15,-2-3 4 16,-19 0-23-16,-5 0-6 15,-12 0-17-15,-7 3-4 16,-7 0-15-16,0 1-2 16,-1 0-1-16,-1 0-1 31,0 0-4-31,1 0 0 0,0 0-1 0,-1 0 2 16,0 0-2-16,1 0 0 15,0 0-3-15,0 0-1 16,0 0-4-16,0 0-2 15,0 0-1-15,0 0 0 0,0 0-1 16,0 0 0-16,0 0 0 16,0-1 0-16,0 1 0 15,0 0 0-15,0 0 0 16,0 0-1-16,0 0 0 16,0 0-1-16,0 0 1 15,0 0-1-15,0 0 1 0,0 0-1 16,0 0 0-16,0 0 0 15,0 0 0-15,0 0 0 16,0 0 0-16,0 0 0 16,0 0 0-16,0 0 0 15,0 0 1-15,0 0-1 16,0 0 1-16,0 0 1 16,0 0 0-16,0 0 1 15,0 0-1-15,0 0 0 16,0 0-1-16,0 0-1 15,0 0 0-15,0 0 1 16,0 0-1-16,0 0 0 16,0 0 0-16,0 0 1 15,0 0-1-15,0 0 0 16,0 0 1-16,0 0-1 0,0 0 1 16,0 0 0-16,0 0 0 15,0 0 0-15,0 0 0 16,0 0 0-16,0 0 1 15,0 0 0-15,0 0 0 16,0 0 0-16,0 0 0 16,0 0-1-16,0 0 1 15,0 0-1-15,0 0 0 0,0 0 0 16,0 0-1 0,0 0 0-16,0 0 1 0,0 0 1 15,0 0 0-15,0 0 5 16,0 0 2-16,0 0 5 15,0 0 1-15,0 0 0 16,0 0-4-16,0 0-2 16,0 0-5-16,0 0-2 15,0 0-1-15,0 0 0 16,0 0-1-16,0 0 1 16,0 0 0-16,0 0 2 15,0 0 0-15,0 0 2 16,0 0 0-16,0 0 0 15,0 0-2-15,0 0-1 16,0 0-3-16,0 0-21 16,0 0-22-16,0 0-74 0,0 0-33 15,0-2-319-15,0 0 43 16</inkml:trace>
+  <inkml:trace contextRef="#ctx0" brushRef="#br0" timeOffset="9897.402">22346 8266 919 0,'16'-5'311'0,"-10"2"-6"0,-4 1-199 15,2 2-182-15,-4-1-1 16,1-1 49-1,14 1 10-15,13-1 12 0,46-3 0 16,-33 6 1 0,13 3 2-16,0 2-3 0,12 9-1 15,-10 7-1-15,7 13 1 16,-9 11-2-16,8 18 3 16,-11 3 2-16,13 19 4 15,-4 1-1-15,11 12 2 16,-8-6-1-16,12 7 2 15,-7-14-2-15,12 5 0 16,-9-15 0-16,16 3 0 16,-10-10 0-16,8-4 1 15,-13-15-1-15,9-5 2 16,-16-19 0-16,9-13 4 0,-7-7 0 16,10-10 4-16,-6-6 0 15,16-7 0-15,-10 0-4 16,6-11 7-16,-14 0 8 15,-4-7 13-15,-20 2 11 16,-7-7 5-16,-14 5-5 16,-7 0-1-16,-10 7-18 15,-6 1-16-15,-8 9-10 16,-19-3-18-16,-9 5-17 0,-21 4-6 16,-13 4 4-16,-19 10 3 15,7 9 14-15,-11 12 6 16,13 7 6-16,-8 19 3 15,13 6 1-15,-11 20 0 16,14-1 0-16,-16 21 0 16,10-6 0-16,-10 19 1 15,8-10 1-15,-10 15 0 16,18-15 1-16,-6 5 2 16,18-24-2-16,-1 1 3 15,11-20-1-15,0-6 0 16,13-18 0-16,-2-5 4 15,9-13-2-15,-1-4 4 16,6-7 1-16,-2-1 7 16,7-4 2-16,2 2 10 15,5-4 2-15,5 2 11 0,2 1-4 16,2-2-2-16,3-1-10 16,-1 0-4-16,0 0-12 15,1 0-1-15,-1-1 0 16,-1 1 5-16,2 0 0 15,0-1 8-15,0 0 1 0,0 1 5 16,0 0-4-16,0-1 0 16,0 1-8-16,0 0-6 15,-1 0-18-15,1 0-54 16,0 0-323-16,-2 0 80 16</inkml:trace>
+  <inkml:trace contextRef="#ctx0" brushRef="#br0" timeOffset="14229.96">11181 11088 457 0,'-2'-1'198'15,"1"0"-21"-15,0 0-97 0,0 0-150 16,0 1-2-16,1 0 17 16,0 1 3-16,1 0 25 15,5 2 20-15,11 9 4 16,39 16 2-16,-35-27 2 16,5-1 2-16,-2 0 1 15,6 2-1-15,-1 2 0 0,6 0 0 16,5 3-1-16,13 1-1 15,4-3-2-15,25-5 3 16,2-6-1-16,25-9 0 16,-5-7 5-16,23-14 20 15,-14-3 10-15,13-15 17 16,-20-1 6-16,9-8 5 16,-22 8-16-16,-1-6-6 15,-20 13-10-15,0 3 21 16,-23 11 2-16,-8 6 17 15,-16 10 13-15,-8 4 34 16,-11 8-13-16,-1 3 9 16,-5 2-14-16,0 1-14 15,0 0-39-15,0 0-13 16,0 0-19-16,0-1-3 0,0 1-9 16,-1 0 1-16,0 0-1 15,-1 0 2-15,1-1-2 16,1 1-1-16,0 0-11 15,0 0-40-15,0 0-34 16,0 0-161-16,0 0-146 16,1-2-26-16</inkml:trace>
+  <inkml:trace contextRef="#ctx0" brushRef="#br0" timeOffset="20671.853">16793 12474 875 0,'-15'-13'188'0,"3"9"84"15,1-1-250-15,7 2-15 16,4 4-1-16,-1 0-1 15,0-2-4-15,1 1-6 0,0 0-3 16,0 0 2-16,-1 0-2 16,1 0 2-16,0 0-4 15,0 0 0-15,0 0-5 16,0-1 1-16,0 0 1 16,0-1 4-16,1 1-1 15,18-6 6-15,49-11 1 16,-33 12-3-16,12-3 0 15,3 1 2-15,13 3-2 16,-4-4 0-16,14-8 3 16,-4-2 0-16,20-15 2 15,-5-8 1-15,18-11 1 16,-2 0 0-16,15-11 0 16,-11 7 0-16,9-4-1 15,-12 8 2-15,10-9-1 0,-17 10-1 16,12-7 2-16,-16 9-1 15,6-4 1-15,-13 8 23 16,8-5 32-16,-18 12-2 16,0-1-3-16,-13 13-1 15,-5 5-22-15,-19 11-33 16,-4 3 4-16,-13 4 4 16,-6-3 6-16,-6 3 12 15,-4 3 21-15,-2-1 8 16,-1 2 10-16,0 0-2 0,0 0-8 15,0 0-21-15,0 0-8 16,-1 0-11-16,1 0-3 16,0 0-3-16,0 0 1 15,0 0-1-15,0 0 0 16,0 0-1-16,0 0-1 16,0 0 0-16,0 0-2 15,0 0 0-15,0 0 0 16,0 0-1-16,0 0 0 15,0 0 0-15,0 0 0 16,0 0 0-16,0 0 0 16,0 0 0-16,0 0-1 15,0 0 1-15,0 0-1 16,0 0 0-16,0 0 1 16,0 0 0-16,0 0 1 0,0 0 0 15,-1 0 0-15,1 0 1 16,0 0-1-16,0 0-1 15,0 0 0-15,0 0 0 16,0 0-1-16,0 0 0 16,0 0 0-16,0 0 1 15,0 0-2-15,0 0 2 0,0 0 0 16,0 0-1-16,0 0 0 16,0 0 0-16,0 0 0 15,0 0 0-15,0 0 1 16,-1-1 0-16,0 1 0 15,1 0 1-15,0 0-1 16,0 0 0-16,0 0 0 16,0 0 1-16,0 0-1 15,0 0 0-15,0 0 0 16,0 0 0-16,0 0 0 16,0 0 0-16,0 0-1 15,0 0 1-15,0 0-1 16,0 0 0-16,0 0 0 15,0 0-1-15,0 0 0 16,0 0 1-16,0 0-1 16,0 0 0-16,0 0 1 0,0 0-1 15,0 0 1-15,0 0 1 16,0 0 0-16,0 0 0 16,0 0 0-16,0 0 0 15,0 0 1-15,0-1 0 16,0 1-1-16,0 0 1 15,0 0-1-15,0 0 0 0,0 0-1 16,0 0 1-16,0 0-1 16,0 0 0-16,0 0 1 15,0 0 1 1,0 0-1-16,0 0 1 0,0 0 0 16,0 0 0-16,0 0-1 15,0 0 0-15,0 0 0 16,0 0 1-16,0 0-1 15,0 0 0-15,0 0 1 16,0 0 0-16,0 0 0 16,0 0-1-16,0 0-2 15,0 0-3-15,0 0-17 16,0 0-20-16,0 0-57 16,0 0-55-16,0 0-101 15,1 1-101-15,38 5-32 16</inkml:trace>
+  <inkml:trace contextRef="#ctx0" brushRef="#br0" timeOffset="27177.925">20148 13975 687 0,'-4'-1'260'0,"3"-1"-12"16,1 3-183-16,0-2-82 16,0-1-32-16,0 2-1 15,-1-1 18-15,0 0 12 16,1 0 14-16,0 0 3 16,-2 0 3-16,1 0 0 15,0-1 2-15,0 1 1 16,0 1 3-16,0-1 0 15,0 0-1-15,1 0-2 16,0 0-1-16,0-1-4 16,0 1 0-16,1 0 0 15,15-6 0-15,15-4 1 0,36-12-1 16,-25 10 1-16,0 3 1 16,6-2-2-16,-4-2 0 15,7 4 2-15,-7 3 0 16,12-3 3-16,-4-2 1 15,10 4-2-15,-1-2 1 16,14-3-1-16,-7 3-3 16,17 0 0-16,-6 1 1 15,16-2-1-15,-11-1 1 0,7 1 0 16,-13 1 0-16,5 2 1 16,-18 5 1-16,9-1-1 15,-11 3-1-15,7 0-1 16,-10 3 1-16,15 1 1 15,-7 1 0-15,12 2 0 16,-6-3 2-16,12 3 2 16,-14-3 0-16,1 0 4 15,-8 2-1-15,1 0-1 16,-13-2-2-16,7 2-2 16,-7 1-1-16,2-2-2 15,-7-1 1-15,7-1 0 16,-7 2 0-16,4-1 1 15,-4 3-1-15,8 3 4 0,-2 2 1 16,6-2 3-16,-4 1 1 16,8 3 1-16,-7-5-2 15,7-2-1-15,-7 0-3 16,9 0-1-16,-6-4-2 16,9 0 0-16,-4 3 0 15,5-3-1-15,-5 0 0 16,8-1-1-16,-7 3 0 15,10-3-1-15,-9-2 1 16,6 0 0-16,-13-1 0 0,9 1 1 16,-13-3 1-16,8 3 0 15,-9-2 0-15,11 0-1 16,-11-3 1-16,9 6-2 16,-11-2 1-16,7-2-2 15,-11 3 1-15,8 2 0 16,-7 0 0-16,6-1-1 15,-6 2 1-15,6 0 0 16,-8-2 1-16,9-1 1 16,-7 1 1-16,10 2 1 15,-1-1 0-15,10 5-1 16,-4-3 0-16,13 8-3 16,-6-4 0-16,8 1-1 15,-6 1 1-15,7-1 0 0,-13-4 2 16,8 1-1-1,-15 1 1-15,5-4-1 16,-10-1 1-16,11 3-1 0,-8-2 1 16,15 1-1-16,-3-2 2 15,10 2-2-15,-12-2 1 16,10-1-1-16,-13-1 0 16,6-1-1-16,-10-2 2 0,8 2-2 15,-6 1 2-15,6-1 1 16,-5 0 1-16,7 4 3 15,-6-2 1-15,6 1-2 16,-7 2 0-16,10 3-1 16,-8-4-3-16,13 2 0 15,-10-3 1-15,5 0 13 16,-13 0 7-16,4 0 6 16,-14 2 6-16,5 1 4 15,-6 0-13-15,11 2-5 16,-1-3-8-16,9-1-5 15,-6-1-4-15,11-1 0 16,-14-1-3-16,1 1 16 16,-14 0 4-16,-3 0 5 15,-16 0 4-15,-3 0 2 16,-5 0-16-16,0 0-6 16,-8 1-12-16,-1-2-55 0,-6 1-50 15,2-1-236-15,-1-2 12 16</inkml:trace>
+  <inkml:trace contextRef="#ctx0" brushRef="#br0" timeOffset="29767.966">11147 15014 594 0,'4'1'202'0,"-2"0"-4"16,-2-1-159-16,0 0-66 16,0-1-14-16,1 0 5 15,0 0 18-15,19-2 11 16,34-7 7-16,-28 7 0 16,1 0 1-16,11 3-1 15,-5 3 0-15,10 1 0 16,-1 0 0-16,7 0 0 0,-3 0 0 15,13-3 0-15,-2 0 0 16,12-2 2-16,-4 0-2 16,15-2 3-16,-6 1-1 15,15 1 0-15,-9 1-2 16,19 1 1-16,-10 1 0 16,17 2-1-16,-10 0 0 15,15 0-1-15,-15-1 1 0,20 0 0 16,-16-1 0-16,14 0 1 15,-16-1 0-15,9 4 1 16,-14 0-1-16,9 3 0 16,-12 0-1-16,14 1 0 15,-6 0-1-15,18-2 2 16,-6-5-1-16,19 0 1 16,-9-4 1-16,18-3-2 15,-14-3 1-15,10-3-1 16,-15 1 1-16,13-3 0 15,-16 4 0-15,13 0 0 16,-10 1 0-16,17-3-1 16,-12 2 1-16,16-4 16 15,-13-2 4-15,18-1 2 0,-22 0 1 16,13-5 14-16,-20 4-6 16,8-4 6-16,-20 5 0 15,4 1 7-15,-22 5-8 16,1-2-6-16,-19 8-6 15,0-1 5-15,-17-2 0 16,-7 5 2-16,-15 1-3 16,-7-2-1-16,-13 2-9 0,1 5-6 15,2-5-69-15,25 10-239 16,15 5 58-16</inkml:trace>
+  <inkml:trace contextRef="#ctx0" brushRef="#br0" timeOffset="38636.972">17426 16405 329 0,'9'-5'177'16,"-1"-1"-24"-1,-9 7-76-15,1-2-33 0,1 2-32 16,-1-1 13-16,-1 0 5 16,1 0 2-16,0-1-6 15,0 1-6-15,0 0-11 0,0-1-8 16,0 1-5-16,0 0-1 16,0 0 2-16,0 0 4 15,0 0 3-15,1-2 5 16,0 2 2-16,16 0 0 15,6 0-2-15,44 0 0 16,-36 0-4-16,12-1 1 16,0 0 0-16,9-2 1 15,-4-2-1-15,13-2 0 16,-6-4 0-16,10 3-2 16,-8 2 0-16,7-3 2 15,-7 6 6-15,9 0 1 16,-6-1 2-16,15-5 7 15,0 0 8-15,15-10 5 16,-5 0 1-16,20-8 3 16,-8-4-7-16,9-8-12 0,-9 3-10 15,9-11-4-15,-14 2-3 16,9-2-1-16,-13 6 1 16,12-1-1-16,-15 5 2 15,12 0 11-15,-17 4 0 16,9-3 1-16,-14 6 0 15,2 2 12-15,-18 3-6 0,0 1 4 16,-17 6 1-16,-3 1 2 16,-15 4-9-16,-3 4 5 15,-10 6 2-15,-3 0 11 16,-4 2 6-16,-3 1 7 16,-1-1-9-16,0 0 5 15,-1 1-7-15,1 0-1 16,0 0-11-16,-1-1 1 15,1 1-10-15,0 0-8 16,-2 0-8-16,2 0-4 16,0 0-9-16,0 0-47 15,0 0-54-15,0 0-284 16,5-1 32-16</inkml:trace>
+  <inkml:trace contextRef="#ctx0" brushRef="#br0" timeOffset="49674.036">23213 17731 690 0,'8'-1'300'0,"-7"-2"-10"0,-1 7-130 16,0-5-147-1,0 0-7-15,0 0-1 0,0 1-7 16,0 0-8-16,0 0-13 16,0 0-8-16,0 0 0 15,0-1 5-15,1-1 2 16,16 2 13-16,14 3 8 16,36 4 0-16,-27-1-1 15,1 5 2-15,9-5-1 16,-2-4 1-16,13-4 1 15,2-8-1-15,14-15 1 16,-2-5 0-16,17-23 0 16,-2-3 0-16,18-22 1 15,-5 2-2-15,22-15-1 0,-9 14 1 16,20-14 0 0,-18 15 1-16,12-10 2 0,-17 8 1 15,11-6 1-15,-20 17 1 16,8-7 0-16,-16 13 2 15,3 0 1-15,-21 11 1 16,-1 3-2-16,-17 13 0 16,-4 4-1-16,-18 11-2 15,-5 2-1-15,-11 3 0 0,-1 5-2 16,-5 2-1 0,5 0-132-16,1 1-62 0,9 5-72 15,-5-2-126 1</inkml:trace>
+</inkml:ink>
+</file>
+
+<file path=ppt/ink/ink31.xml><?xml version="1.0" encoding="utf-8"?>
+<inkml:ink xmlns:inkml="http://www.w3.org/2003/InkML">
+  <inkml:definitions>
+    <inkml:context xml:id="ctx0">
+      <inkml:inkSource xml:id="inkSrc0">
+        <inkml:traceFormat>
+          <inkml:channel name="X" type="integer" max="29376" units="cm"/>
+          <inkml:channel name="Y" type="integer" max="16524" units="cm"/>
+          <inkml:channel name="F" type="integer" max="4095" units="dev"/>
+          <inkml:channel name="T" type="integer" max="2.14748E9" units="dev"/>
+        </inkml:traceFormat>
+        <inkml:channelProperties>
+          <inkml:channelProperty channel="X" name="resolution" value="1000.20428" units="1/cm"/>
+          <inkml:channelProperty channel="Y" name="resolution" value="1000.24213" units="1/cm"/>
+          <inkml:channelProperty channel="F" name="resolution" value="0" units="1/dev"/>
+          <inkml:channelProperty channel="T" name="resolution" value="1" units="1/dev"/>
+        </inkml:channelProperties>
+      </inkml:inkSource>
+      <inkml:timestamp xml:id="ts0" timeString="2020-02-01T11:45:01.930"/>
+    </inkml:context>
+    <inkml:brush xml:id="br0">
+      <inkml:brushProperty name="width" value="0.05292" units="cm"/>
+      <inkml:brushProperty name="height" value="0.05292" units="cm"/>
+      <inkml:brushProperty name="color" value="#FF0000"/>
+    </inkml:brush>
+  </inkml:definitions>
+  <inkml:trace contextRef="#ctx0" brushRef="#br0">15067 7365 899 0,'2'5'48'16,"-1"-2"112"-16,-1-2-254 16,0-1-35-16,0 0 56 15,0 0 56-15,0 0 16 16,0 0 1-16,1 0 2 0,1 0-1 16,6 0 2-16,12 1 2 15,39-3 2-15,-24-6 0 16,1-1 0-16,12-2-2 15,-3-1-2-15,11 0-3 16,-1 1 1-16,15-2-1 16,-2 2 0-16,17-4 0 15,-3-1 0-15,16-4 1 16,-7 2-1-16,14-2-1 16,-13 5 2-16,12 2-1 15,-15 0 0-15,8 4-1 16,-13 1 0-16,7 1 0 15,-12 2-1-15,16 0 2 16,-10-1 1-16,17 0-1 16,-9-2 2-16,17-5-2 15,-11 5 0-15,15 2-2 0,-16 2 2 16,13 2-1-16,-15 8 2 16,11 0-3-16,-15 4 3 15,14 2-1-15,-12-2 2 16,15-2-3-16,-10 1 1 15,16-6 1-15,-8-2 0 16,18-2-2-16,-11-4 3 0,13-1-2 16,-15 1 1-1,9-7 2-15,-15 6 0 0,7 2-1 16,-20 0 0-16,14 2-1 16,-14 3-1-16,16-1 1 15,-10-1 1-15,20-4 0 16,-9-2 2-16,15 2-2 15,-16-5-1-15,13 6 0 16,-16 0 1-16,8 1-1 16,-16 1 0-16,13 0-1 15,-17 0 1-15,20 0 0 16,-9-3 2-16,13-3-1 16,-9-1 2-16,17-4-1 15,-15 2 1-15,3 2-2 16,-14 3-1-16,8 3 1 15,-15 5 0-15,6 2-2 0,-8 0 1 16,12 4 1-16,-12-4-1 16,17 3 0-16,-7-2 1 15,10-2-1-15,-12 1 2 16,13-2 1-16,-21-3 3 16,9 3 14-16,-13-2 3 15,1 1 38-15,-17-1-2 16,14 4-3-16,-10-1-14 0,16 4-1 15,-8-2-40-15,8 1 1 16,-16-2 0 0,1 0 1-16,-19-5 1 0,-1 2 3 15,-14-2 5-15,-3-1 9 16,-13 0-1-16,-2 0-1 16,-5-2 0-16,14 7-273 15,13 4-15-15,16-17-86 16</inkml:trace>
+  <inkml:trace contextRef="#ctx0" brushRef="#br0" timeOffset="3854.354">16186 8763 306 0,'35'-4'52'16,"-14"-4"33"-16,1 2-85 0,4 1-13 15,3 1 10-15,-1 2 3 16,3 1 0-16,-5 1 0 16,4-1 1-16,-1 1 0 15,3-1 1-15,-1 1 1 16,5-4 2-16,-1 2 0 0,5-2 2 15,-2-1-1 1,7-2 2-16,-3 1-3 0,9-1 1 16,-2 0-1-16,8 3-1 15,-3 1-1-15,8 1 0 16,-7 2-3-16,14 2 1 16,-5 1 0-16,13-1 0 15,-4-1 0-15,14 0 0 16,-5-1 2-16,11-1 1 15,-11-1 0-15,12-1 3 16,-12-2 4-16,5-3 3 16,-5 1 2-16,13-3 7 15,-10-1 0-15,13 2 3 16,-8 1-5-16,9 0-1 16,-14 1-8-16,12 0 0 15,-12 3-6-15,12 0 0 0,-10 0-1 16,15 1-1-16,-8-1 0 15,12-3-1-15,-11 3-1 16,14-5 1-16,-15-3 0 16,16-1 0-16,-11-3 1 15,13-2 0-15,-8-1 0 16,17 1-1-16,-13-1 0 16,13 3-1-16,-11 2-1 15,12 2 1-15,-15 0 1 16,9 2 2-16,-16 1 5 0,8-2 16 15,-17 0 8-15,1-3 24 16,-17 1 11-16,-1-2 25 16,-24 0-4-16,-5 1-2 15,-16 5-24-15,4-1-32 16,-2 4-89-16,29 4-209 16,3 1 19-16</inkml:trace>
+</inkml:ink>
+</file>
+
+<file path=ppt/ink/ink32.xml><?xml version="1.0" encoding="utf-8"?>
+<inkml:ink xmlns:inkml="http://www.w3.org/2003/InkML">
+  <inkml:definitions>
+    <inkml:context xml:id="ctx0">
+      <inkml:inkSource xml:id="inkSrc0">
+        <inkml:traceFormat>
+          <inkml:channel name="X" type="integer" max="29376" units="cm"/>
+          <inkml:channel name="Y" type="integer" max="16524" units="cm"/>
+          <inkml:channel name="F" type="integer" max="4095" units="dev"/>
+          <inkml:channel name="T" type="integer" max="2.14748E9" units="dev"/>
+        </inkml:traceFormat>
+        <inkml:channelProperties>
+          <inkml:channelProperty channel="X" name="resolution" value="1000.20428" units="1/cm"/>
+          <inkml:channelProperty channel="Y" name="resolution" value="1000.24213" units="1/cm"/>
+          <inkml:channelProperty channel="F" name="resolution" value="0" units="1/dev"/>
+          <inkml:channelProperty channel="T" name="resolution" value="1" units="1/dev"/>
+        </inkml:channelProperties>
+      </inkml:inkSource>
+      <inkml:timestamp xml:id="ts0" timeString="2020-02-01T11:45:49.758"/>
+    </inkml:context>
+    <inkml:brush xml:id="br0">
+      <inkml:brushProperty name="width" value="0.05292" units="cm"/>
+      <inkml:brushProperty name="height" value="0.05292" units="cm"/>
+      <inkml:brushProperty name="color" value="#FF0000"/>
+    </inkml:brush>
+  </inkml:definitions>
+  <inkml:trace contextRef="#ctx0" brushRef="#br0">8720 5330 378 0,'-31'-11'227'0,"-3"-6"-35"16,5 6-51-16,-2-4-126 16,2 2-11-16,-8 4 1 15,-2 2-4-15,-11 3 47 0,2 1 12 16,-10 0 19-16,7-1 7 16,-7-2 19-16,8-4-39 15,-10-1 7 1,6-1-10-16,-11-1-7 0,7 1-13 15,-9 4-5-15,9 1-16 16,-3 3-9-16,12 0-5 16,-7 6-3-16,5-4-4 15,-6 5-1-15,2 0-1 16,-9 8-3-16,9 0 1 0,-5 5-3 16,9-1 2-16,-9 8-2 15,7-4 1-15,-9 4 0 16,5 3 0-16,-7 10-3 15,8 1 0-15,-4 10-1 16,11-2 2-16,-1 6 1 16,11-7 2-16,-1 3 0 15,10-9 1-15,-3-1-1 16,7-6 0-16,-1 6-5 16,5 0 1-16,-2 15-3 15,3 5 0-15,2 17-4 16,6-4 5-16,2 10-5 15,5-12 3-15,4-2-4 16,5-14 0-16,2-3-2 16,4-10 3-16,5 5 1 15,2-2 3-15,7 10 3 16,0-5 2-16,7 10 0 16,-2-4 1-16,5 5-1 0,-2-9 0 15,7 6 0-15,-4-12-1 16,9 3-2-16,-3-9 3 15,8 2 0-15,-3-9 1 16,9 3 0-16,-1-7 3 0,8 3-3 16,-4-4 2-16,7 5-4 15,-4-2 3-15,11 7-5 16,-4-5 3-16,16 2-3 16,-4-5 2-16,16-3-1 15,-5-5 5-15,19-5-3 16,-7-5 3-16,16-6 2 15,-6-2 0-15,16-2 1 16,-17 0 0-16,10-3 1 16,-19 2-1-16,11-1-3 15,-18 0 2-15,9 0 0 16,-16-1-1-16,10 2 0 16,-15-1 0-16,8 0-4 15,-11 1 2-15,7 1-1 16,-13-1 1-16,12-1 2 15,-14 1 3-15,17-5 5 0,-9 0 0 16,6-1-1-16,-11-1 3 16,6-3 0-16,-18 5-6 15,10-3-2-15,-10 5 1 16,3 2-5-16,-8 2 0 16,6 0 1-16,-11 2 1 15,9-3 2-15,-3-2 2 16,13-4-1-16,-5 0 1 0,4-4-2 15,-6 1 1 1,4-2 0-16,-14 4-2 0,6-1 2 16,-4 4 1-16,7 1-1 15,-4 2 0-15,6 2 0 16,-8-2 0-16,3-1-1 16,-11-1 0-16,7-4 1 15,-10 1-1-15,5-1 1 16,-6 3-1-16,5 0 1 15,-7 4-1-15,2-5 1 16,-6 3-1-16,2-4 1 16,-5-4-1-16,6-6 1 15,-3-2 0-15,5-7 1 16,-6 3 1-16,-1-2-1 0,-9 7 0 16,-1 2 0-1,-8 2 0-15,3-4 1 0,-1 2 1 16,0-6-1-16,-2-1 1 15,0-4 1-15,-5 0 0 16,-3-8 3-16,-3 4 1 16,-4-5 5-16,-5 2 2 15,-5-6 7-15,-5 5 6 16,-11-6 9-16,-2 1-2 16,-12-5-1-16,-4 6-7 15,-8-7-6-15,1 6-3 16,-10-5 2-16,6 9-3 0,-10-4 32 15,8 9-3-15,-17-5-10 16,1 8-6-16,-14-6 0 16,6 8-26-16,-13-7-7 15,15 3 5-15,-14-6 1 16,11 0-1-16,-13-7-6 16,7 4 8-16,-12-4-4 15,8 6 2-15,-12-4 0 16,7 9-1-16,-13-4 0 15,14 5-1-15,-14-5-4 16,11 7-1-16,-9-4-1 16,9 6 1-16,-15-4-3 15,11 5 4-15,-12 1 0 16,12 3 0-16,-10 0-1 16,8 5 3-16,-10 2 2 15,16 5 1-15,-11-2-2 0,14 1 1 16,-9 4-1-16,16 4-2 15,-11-4-1-15,10 4 1 16,-7 5-6-16,10 3-4 16,-10 2-23-16,10 2-42 0,-11 10-291 15,10 4 66-15</inkml:trace>
+  <inkml:trace contextRef="#ctx0" brushRef="#br0" timeOffset="2918.343">11850 8245 68 0,'0'-1'163'16,"-1"0"-36"-1,0-1 1-15,1 1-7 0,0-1-53 16,-1 1-22-16,1 0-20 16,0 0-13-16,1-1-13 15,13-17 1-15,53-48-1 16,-23 21 4-16,3 0 1 15,12-10 5-15,1 0 0 16,13-6 4-16,-1 8-1 0,12-8 0 16,-9 6-6-16,14-7 1 15,-9 5-4-15,13-11-1 16,-13 7 0-16,11-4 2 16,-15 10-3-16,1-4 2 15,-17 15-1-15,-4 4 0 16,-16 12-1-16,-7 8 0 15,-14 10-1-15,-6 2 1 16,-8 8 1-16,-5-1 4 16,-2 0 0-16,1 2-6 15,0 0-34-15,-1 2-59 16,-18 10-9-16,-65 48-23 16,26-21-18-16,-16 16-2 15,2-1 58-15,-16 16-31 0</inkml:trace>
+  <inkml:trace contextRef="#ctx0" brushRef="#br0" timeOffset="3317.796">12133 7932 35 0,'-66'42'102'15,"3"-5"24"-15,13-7 13 16,1-6 14-16,9-10-32 16,2 2-24-16,9-3-58 0,5-6-17 15,10-2-24 1,5-1-25-16,8-6-11 0,1 0-19 15,2 1-2-15,-2-1 5 16,1 1 25-16,8-1 16 16,19-10 18-16,46-29 3 15,-30 10-3-15,12-12 4 16,2-2-2-16,18-7 4 16,3 3-1-16,15-7 0 15,-6 9-3-15,16-6 2 16,-12 6-3-16,14-12 6 15,-12 4 2-15,15-11 31 16,-17 7 7-16,6-8 18 16,-16 15 2-16,2-2 9 15,-22 14-27-15,2-1 1 0,-18 12-17 16,-5-3-4 0,-11 10-12-16,-4 1-2 0,-10 8-10 15,-4 3-5-15,-1 5-4 16,4-2-42-16,7 4-205 15,8-16 54-15</inkml:trace>
+  <inkml:trace contextRef="#ctx0" brushRef="#br0" timeOffset="6035.487">12476 9278 773 0,'-10'-1'187'0,"2"-1"63"15,6 1-223-15,0 0-21 0,1 1-5 16,1-2-4-16,0 2-2 16,0 0 0-16,0 0 0 15,0 0-4-15,0 0-6 16,0-1 0-16,0 0 0 0,1-1 1 16,16-22 4-16,48-51 3 15,-29 34 1-15,11-8 1 16,3 0 1-1,17-12 0-15,0-1 1 0,23-25 2 16,2 9-1-16,27-25 1 16,-2 3 1-16,26-22 1 15,-8 15-1-15,14-25 1 16,-21 20 0-16,9-7-2 16,-22 22-1-16,0 1 1 15,-19 22 0-15,1-4 1 16,-20 14 3-16,0-1 2 15,-17 9-2-15,0 6 1 16,-15 16 0-16,-6 9 0 16,-15 10 3-16,-5 5 19 15,-7 4 10-15,-5 2 12 16,-6 2 2-16,3 1 2 0,-4 0-19 16,0 1-9-16,0 0-14 15,-1 0-3-15,0 0-6 16,1 0 1-16,-1 0-2 15,1 0 1-15,0 0-1 16,0 0 2-16,0 0 0 16,0 0 2-16,0 0 1 15,0 0 1-15,0 0-1 16,0 0 3-16,0 0-3 16,0 0 2-16,0 0-2 0,0 0 2 15,0 0-1-15,-1 0 3 16,1 0 0-16,0 0 2 15,0 0-3-15,0 0 1 16,0 0-5-16,0-1-1 16,0 1-4-16,0 0-4 15,0 0-13-15,0 0-38 16,0 0-27-16,0 0-102 16,0 0-76-16,-1 0-31 15,-1 0-76-15</inkml:trace>
+  <inkml:trace contextRef="#ctx0" brushRef="#br0" timeOffset="7146.803">12307 11009 604 0,'15'12'29'16,"-12"-12"73"-16,15 3-167 15,0-6-28-15,11-5 29 16,7-2 66-16,9-10 3 16,0-7 1-16,13-15 5 15,1 0 0-15,14-17 8 16,-6-2 4-16,14-11 15 16,-9 6 6-16,12-12 20 15,-10 8 1-15,11-11 10 16,-14 8-9-16,6-5-1 15,-16 15-22-15,1 2-7 16,-15 14-16-16,2 2-6 0,-15 12-8 16,3 3 0-1,-9 8-2-15,3-1-3 0,-4 10-21 16,18-3-207 0,2-2 60-16</inkml:trace>
+  <inkml:trace contextRef="#ctx0" brushRef="#br0" timeOffset="29038.816">13671 12597 765 0,'7'2'125'0,"-9"-4"83"16,5 2-235-16,-3 0 1 15,1 0 11-15,9 0 6 16,19-1 5-16,50-11 4 16,-35-3-1-16,19-19 0 0,1-6 0 15,27-24 0-15,0-7 1 16,25-26 0-16,-7 1 0 16,24-14 0-16,-19 8-2 15,16-13-1-15,-13 18-1 16,16-8 2-16,-17 12-2 15,11-10 3-15,-19 19 1 16,9-4 4-16,-24 15 4 16,2 0 22-16,-20 26 0 15,-2 5 5-15,-23 15-4 0,-7 6-3 16,-14 9-10-16,-7 2 29 16,-10 3 7-16,-2 5 12 15,-5 2 3-15,-2 1-5 16,-2 2-26-16,-1-3-9 15,0 0-10-15,0 0-3 16,0 0-7-16,0 0-1 16,0 0-3-16,0 0-1 15,0 0 0-15,0 0-1 16,0-1 1-16,0 0-1 16,0 1 0-16,0 0-2 15,-1 0 0-15,1 0-3 16,-1 0 2-16,1 0-1 15,0-1 1-15,0 1 0 16,0 0 1-16,0 0 0 0,0 0 0 16,0 0-1-16,0 0 1 15,0 0 1-15,0 0 0 16,0 0 1-16,0 0 0 16,0 0 2-16,0 0 0 15,0 0 0-15,0 0-2 16,0 0-1-16,0 0-1 0,0 0-2 15,0 0 1-15,0 0-1 16,0 0 2-16,0 0-1 16,0 0 1-16,0 0 0 15,0 0 0-15,0 0-1 16,0 0 0-16,0 0-2 16,0 0 0-16,0 0 0 15,0 0 1-15,0 0 0 16,0 0 3-16,0 0 0 15,0 0 1-15,0 0-1 16,0 0 0-16,0 0-1 16,0 0-3-16,0 0-8 15,0 0-11-15,0 0-33 16,0 0-30-16,0 0-106 16,0 0-20-16,0 0-103 15,1 0-45-15</inkml:trace>
+  <inkml:trace contextRef="#ctx0" brushRef="#br0" timeOffset="29842.153">12657 14028 955 0,'11'1'214'0,"-6"-1"63"16,-6-1-317-16,4-1 35 15,-3 1-34-15,1-2 1 16,21-5 18-16,60-67 8 16,-29 29 5-16,12-23 0 15,1-2 0-15,12-19 1 16,-4 2 3-16,17-15 0 16,-8 12 0-16,9-8 3 15,-10 16 0-15,3 0-2 16,-16 17 1-16,3 8-1 15,-16 18 1-15,-9 8 1 16,-16 11 1-16,-8 11 16 16,-15 3 13-16,-4 5 14 15,-2 2 5-15,-3 2 3 0,1-3-14 16,0 1-13-16,0 0-13 16,0 0-8-16,0 0-6 15,0 0-27-15,0 0-21 16,0 0-57-16,0 0-23 0,0 0-53 15,0-1-7 1,1 0-65-16,1 0 19 0</inkml:trace>
+  <inkml:trace contextRef="#ctx0" brushRef="#br0" timeOffset="30675.992">11729 15588 794 0,'6'6'94'0,"3"-12"106"15,7-10-233-15,17-18-11 16,11-8 31-16,17-23 12 15,2-3 1-15,18-22-1 16,-4 4 1-16,17-19 0 16,-5 9 2-16,8-16-3 15,-10 14 3-15,7-9 3 16,-18 19 3-16,0-1 10 0,-16 21 6 16,-6 10 20-1,-18 24 10-15,-9 4 15 0,-13 15-3 16,-5 3 13-1,-6 8-6-15,-1 0 4 0,-2 3-13 16,0 1 0-16,0 0-20 16,0 0-11-16,0 0-17 15,0 0-5-15,-1 0-4 16,0 0 0-16,0 0-1 0,1 0 0 16,0 0-1-16,0 0-2 15,0 0 0-15,0 0-2 16,0 0 0-16,0 0 0 15,0 0-1-15,0 0-1 16,0 0 0-16,0 0-5 16,0 0-7-16,0 0-28 15,0 0-19-15,0 0-43 16,0 0-13-16,0 0-27 16,0 0 5-16,0 0-49 15,0 0-5-15,0 0-43 16,0 0-29-16</inkml:trace>
+  <inkml:trace contextRef="#ctx0" brushRef="#br0" timeOffset="31379.487">11072 16481 412 0,'-2'6'159'0,"1"-6"-24"16,10-6-56-16,5-4-133 15,13-11 3-15,8-6 56 16,20-16 6-16,6-5 0 16,19-19 5-16,-3-5 10 15,20-21 3-15,-7 1-4 0,15-16 0 16,-9 8-3-16,11-12 18 15,-18 18 0 1,2-5 6-16,-20 17 9 0,3 4 27 16,-22 22-24-16,-7 9 15 15,-16 18 17-15,-10 10 10 16,-14 11 24-16,-2 5 26 16,-3 4-12-16,-1 0-13 15,1-1-20-15,0 0-47 16,-1-1-31-16,1 1-10 15,0 0-13-15,-1-1-25 16,1 1-25-16,0 0-70 16,0 0-52-16,0 0-155 15,0-1 12-15,1-2-81 16,15-8-58-16</inkml:trace>
+  <inkml:trace contextRef="#ctx0" brushRef="#br0" timeOffset="32670.748">11913 16887 716 0,'-3'-24'186'0,"-6"9"73"0,-11-5-182 15,2 2-30-15,-11 1 22 16,3 5 3-16,-14-1-17 16,4 9-11-16,-16-3-14 15,2 0-24-15,-13 0-12 16,-3 0-5-16,-16-4 3 15,1 3-1-15,-15-3 5 16,7-3 7-16,-15 4-4 16,11 5-4-16,-13-2-6 15,11 4-4-15,-10 1-11 16,14-2-11-16,-11-3-2 16,12 2 0-16,-12-12-18 15,12 1 8-15,-11-1 17 16,12 2 1-16,-11 2 7 15,13 12 24-15,-12 6 6 16,9 2 2-16,-15 9 13 0,12 1 2 16,-14 7 1-16,6 2 12 15,-14 6-3-15,10-1-12 16,-14 12-2-16,16-4-2 16,-20 7-16-16,20 0-2 15,-9 6 2-15,16-3 1 16,-15 5-2-16,19-11 1 0,-7 11 6 15,14-12-1 1,-6 5 0-16,19-6 0 0,1 6-1 16,11-8-6-16,-4 10-3 15,15-8-2-15,-1 11-9 16,11-5-3-16,8 9-17 16,14-2-7-16,4 13-13 15,13-5-5-15,10 12-23 16,9-7 8-16,17 1-1 15,6-11 14-15,12-3 11 16,2-6 28-16,14 0 8 16,-3-4 11-16,21 0 0 15,-3-2 2-15,19-5 0 16,-4-6 2-16,26-6-2 16,-12-9 1-16,21-5-1 15,-6-11 0-15,22-10-1 16,-19-4 1-16,22-10 1 0,-13-4 0 15,12-7-1-15,-22-1 2 16,19-8 1 0,-20 9 0-16,11-5 1 0,-17 7 1 15,16-5 0-15,-19 1 0 16,6-14-1-16,-18-2 0 16,13-13 1-16,-18 0 0 15,5-6 0-15,-16 5 1 16,6-3-3-16,-22 11 1 0,3-1-1 15,-13 13 1-15,-2 1-1 16,-18 11-1-16,-9 3 60 16,-16 10 33-16,-10 0 48 15,-7 2 16-15,-4-3 12 16,-1 0-60-16,0-5-37 16,0-6-49-16,12-17-178 15,11-6-172-15,13-17-1 16</inkml:trace>
+  <inkml:trace contextRef="#ctx0" brushRef="#br0" timeOffset="35808.974">25122 7104 623 0,'-10'1'196'0,"-1"-3"30"0,2-6-184 15,3 8-16-15,5-5-38 16,2 5-14-16,-1 0-5 15,0-1 2-15,2 0 5 16,4-4 6-16,27-10 14 16,50-25 0-16,-27 15-1 15,26-11 0-15,8-1 1 16,30-10 1-16,1 3 0 0,27-9 2 16,-10 6 0-1,20-9-1-15,-21 5 1 16,18-3 2-16,-26 9 2 0,2-2 5 15,-28 11 2-15,-4 3 12 16,-29 9 4-16,-4 2 18 16,-26 8-1-16,-8 5 5 15,-18 3-7-15,-4 4 11 16,-10 2-12-16,1 0 10 16,-4 0-1-16,3 0 12 15,0 0-12-15,-1 0 6 16,1 0-10-16,0 0-1 15,0 0-17-15,0 0-4 16,0 0-12-16,0 0-3 16,0 0-6-16,0 0-1 0,0 0-4 15,0 0-1 1,0 0-1-16,0 0-2 0,0 0-1 16,0 0 1-16,0 0 1 15,0 0 0-15,0-2 3 16,0 2 1-16,0 0-1 15,0 0 1-15,0 0-1 16,0 0-3-16,0 0-3 16,0 0 1-16,0 0 0 15,0 0 3-15,0 0 2 0,-1 0 4 16,1 0 1-16,0 0 1 16,0 0 0-16,0 0 1 15,0 0-2-15,0 0 0 16,0 0-1-16,0 0 1 15,0 0-2-15,0 0 1 16,0 0-1-16,0 0 2 16,0 0-2-16,0 0 1 15,0 0 0-15,0 0 1 16,0 0-2-16,0 0 0 16,0 0-1-16,0 0 2 15,0 0-1-15,0 0 1 16,0 0 0-16,0 0 1 15,0 0-1-15,0 0-1 0,0 0 0 16,0 0 0-16,0 0 0 16,0 0 0-16,0 0-1 15,0 0 2-15,0 0-2 16,0 0 2-16,0 0-1 16,0 0 1-16,0 0-2 15,0 0 1-15,0 0-1 16,0 0 0-16,0 0-1 0,0 0 1 15,0 0 0 1,0 0 1-16,0 0 1 0,0 0 0 16,0 0 0-16,0 0 1 15,0 0-2-15,0 0 0 16,-1 0-2-16,1 0-23 16,0 0-28-16,-1 0-74 15,1 0-76-15,0 0-122 16,0 0-35-16</inkml:trace>
+  <inkml:trace contextRef="#ctx0" brushRef="#br0" timeOffset="39210.209">25935 7479 1020 0,'-29'-3'178'0,"-7"-10"117"16,5-8-301-16,-7 2-7 15,-1 2 20-15,-13 0-1 16,-4 3-1-16,-16-2 0 16,5 3 6-16,-5 0 13 15,13 2 3-15,-5-2 1 16,14 1-1-16,-10-5-4 16,8 2-17-16,-13-2 10 15,7 4-2-15,-6-4 2 16,10 2 5-16,-14 0 2 15,7 4-14-15,-11-3-1 16,3 9-2-16,-12 2-9 16,10 2 0-16,-9 1-1 15,11 2 2-15,-6-2 1 0,11 0 1 16,-8 0 0-16,5-4 1 16,-4 1-1-16,4 1 1 15,-10-4 0-15,3-1 1 16,-10 0 0-16,4-1 1 15,-7-7 0-15,8 2-1 0,-14-3-1 16,8 5 0-16,-17 0-3 16,11 3 1-16,-11 2 0 15,12 4 0-15,-11-1 1 16,16-3 1-16,-7 4 0 16,9-3 1-16,-8-2-1 15,15-1 0-15,-17 1-1 16,7 4 0-16,-11 0-2 15,9 4 0-15,-16 5-1 16,11 2 1-16,-8 5 0 16,6 1-1-16,-18 2-1 15,15 1 2-15,-10 4-2 16,8-5 2-16,-19 6-1 16,19 0 2-16,-15 7-2 15,14-2 1-15,-6 7-1 16,18-5 3-16,-5 3-2 0,13-4 1 15,-7 2-1 1,12 1 0-16,-13 11-4 0,7 3 1 16,-11 10-1-16,7 0 0 15,-15 9 0-15,16-7 2 16,-10 5 0-16,17-9 3 16,0 1 0-16,12-7 0 15,1 4 0-15,17-8-1 16,-2 3-1-16,12-8-1 15,4 1-4-15,8-10 0 0,3 4-5 16,7-6-3-16,4 8-9 16,2-4-5-16,3 7-10 15,6-3 3-15,6 3-6 16,3-6 7-16,7 2 3 16,6-1 10-16,5-1 2 15,0-4 8-15,6 0 3 16,1-1 4-16,4-3-3 15,4-2 4-15,8 1-2 16,-2-3 1-16,13 4 0 16,-3-3 3-16,10 3-2 15,-5-2 1-15,17 1 1 16,-7-6-1-16,20 2 0 16,-9-8-1-16,15 1 0 0,-8-7 0 15,13 1 0-15,-12-5 1 16,13 2 0-16,-10-4 1 15,13-1-1-15,-8-2 2 16,12 0-3-16,-9-1 3 16,14-5 0-16,-11 0 0 15,11-3-2-15,-10-3 0 16,14-7 0-16,-11 2 0 16,11-3 0-16,-18 1 2 0,10 1 1 15,-14 5 1-15,13 0 0 16,-16 3 1-16,19-5-1 15,-9 4 0-15,23-4 0 16,-16 0-1-16,20-4 2 16,-16 2-2-16,14-2 1 15,-22 6 1-15,10 0-1 16,-15 5-1-16,13 0 1 16,-14 1 0-16,18-4-1 15,-12-1 1-15,15-4 0 16,-14 3 0-16,6 0 0 15,-15 5-1-15,5 3 1 16,-18 5-1-16,6 1 0 16,-12 4 0-16,11 1 1 15,-12-2 0-15,12 0 0 16,-13-3 1-16,10 2 0 0,-16-1-1 16,4 1 1-16,-18 1 0 15,0-2 0-15,-16 1 0 16,7 0 0-16,-11-2 0 15,10-2 0-15,0-4 0 16,10-8 2-16,-3-4 1 16,9-7 1-16,-8-3 0 15,-1-4-1-15,-13 10-1 0,-2-5 0 16,-14 9-1 0,-2 5 2-16,-8 6-1 0,6-5 0 15,-1-1 0-15,9-7-2 16,-1-5 0-16,4-4 0 15,-9 2 1-15,-4 6 27 16,-11 7 23-16,-3 4 30 16,-4 6 4-16,-6-7 1 15,0-2-27-15,-4-7-13 16,-3-2-28-16,-14-9 1 16,-1 2-1-16,-12-7 3 15,-3 4-5-15,-15-8-1 16,1 6-7-16,-9-7-2 15,1 4-6-15,-23-3-57 16,-8 10-307-16,-47 5 84 0</inkml:trace>
+  <inkml:trace contextRef="#ctx0" brushRef="#br0" timeOffset="49278.878">24448 9705 664 0,'-3'3'179'16,"8"-5"30"-16,18-7-162 16,8-4-76-16,23-9 3 15,11-4 22-15,23-7 3 16,-2 0-1-16,24-11 0 16,-7 0 0-16,21-9 0 15,-9 1 0-15,24-9 2 0,-13 9-1 16,15-6 6-16,-19 9 2 15,7-3 10-15,-22 11 3 16,2-5 3-16,-19 11-5 16,3-1-2-16,-18 12-9 15,-5 1-6-15,-14 10-14 16,-8 5-50-16,-19 5-52 0,-7 4-114 16,-14 5-26-1</inkml:trace>
+  <inkml:trace contextRef="#ctx0" brushRef="#br0" timeOffset="49671.502">25129 9716 690 0,'-8'6'223'15,"5"-6"18"-15,3-1-191 16,1 1-76-16,-1-1-11 16,1 0 1-16,16-4 12 0,20-6 17 15,60-23 17 1,-26 6 2-16,26-7 8 0,3-4 0 16,24-17 8-16,-8 2-1 15,24-13 13-15,-16 1 0 16,22-10 6-16,-8 14-5 15,19-8 1-15,-21 12-13 16,14-4-3-16,-25 11-9 16,-3-3-2-16,-24 15-5 15,4 3-1-15,-25 13-4 16,-3 6-1-16,-18 7-6 0,-3 6-45 16,-18 6-46-16,-3 6-211 15,-9 6 10-15</inkml:trace>
+  <inkml:trace contextRef="#ctx0" brushRef="#br0" timeOffset="60754.835">25275 9239 1150 0,'-17'9'236'16,"6"-10"106"-16,1-1-359 15,5 1-23-15,2 0-32 16,1-1-17-16,2 1-16 16,0 0 13-16,1 0 13 15,18-9 30-15,68-32 17 16,-26 16 23-16,28-6 5 16,5 2 3-16,10-6 12 15,-7 1 3-15,11-4 8 16,-21 5-1-16,1 4 1 0,-23 8-9 15,-3 5-4-15,-17 10-8 16,-6 4-16-16,-10 3-18 16,-4 6-81-16,-11 4-19 15,-17 5-69-15,-12 7-33 16,-30 11-11-16</inkml:trace>
+  <inkml:trace contextRef="#ctx0" brushRef="#br0" timeOffset="61336.874">25279 9565 618 0,'-25'15'152'16,"18"-16"41"-16,9 1-175 15,7-3-27-15,21-8 23 16,12-5 15-16,37-18 19 16,19-8 9-16,31-19 3 15,2-6-22-15,28-7-9 16,-17 9-13-16,13-2-2 15,-21 15 0-15,4 2 11 16,-33 9 0-16,-6 3 10 16,-31 10-1-16,-14 4-2 15,-25 9-13-15,-4 6 1 0,-17 5-8 16,-4 2 2-16,-4 3-3 16,0-1 1-1,0 0-5-15,0 0-3 0,-1 0-4 16,1 0 1-1,0 0 0-15,-1 0 4 0,1 0-1 16,-1 0 3-16,0 0-2 16,1 0 1-16,-2 0-4 15,2 0 0-15,0 0-3 16,0 0 1-16,0 0-2 16,0 0 1-16,0 0 0 0,0 0 1 15,0 0 1-15,0 0 1 16,0 0 1-16,0 0 1 15,0 0-1-15,0 0 4 16,0 0-2-16,0 0 3 16,0 0 0-16,0 0 1 15,0 0-1-15,0 0 2 16,0 0-2-16,0 0 1 16,0 0-3-16,0 0-1 15,0 0-3-15,0 0-1 16,0 0-2-16,-1 0-5 15,1 0-22-15,0 0-148 16,0 0-158-16,1 0-17 16</inkml:trace>
+  <inkml:trace contextRef="#ctx0" brushRef="#br0" timeOffset="63165.793">25013 11515 582 0,'2'-4'117'16,"12"-5"61"-16,8-5-168 15,16-10-5-15,9-8 10 16,26-18 17-16,8-4 4 16,36-19 11-16,6 0-3 15,27-14 6-15,1 2-12 0,17-11-3 16,-22 14-11-1,6-2 1-15,-23 14-9 0,-7 9-3 16,-26 17-2 0,-7 5 0-16,-24 10-3 0,-5 2-1 15,-17 10-6-15,-8-1-26 16,-13 7-30-16,-9 2-110 16,-8 6-78-16,-15 15-17 15,-12 11-105-15</inkml:trace>
+  <inkml:trace contextRef="#ctx0" brushRef="#br0" timeOffset="63479.979">25425 11651 496 0,'-56'43'118'0,"12"-11"52"0,22-19-146 15,8-4-17-15,12-6-10 16,14-4 7-16,12-7-3 15,23-10 16-15,13-9 17 16,40-17 21-16,7-9-1 16,30-16 6-16,-1-4-12 15,24-17 6-15,-22 4-12 16,30-9 8-16,-20 12-8 16,7-6 7-16,-19 12-5 0,10-3 4 15,-34 11-7-15,10-4-10 16,-18 15-11-16,4 5-5 15,-16 13-9-15,10 3-70 16,-12 9-58-16,23-13-182 16,-12-5-23-16</inkml:trace>
+  <inkml:trace contextRef="#ctx0" brushRef="#br0" timeOffset="77524.149">22940 9942 1030 0,'-24'16'180'0,"-2"-19"118"16,4-9-315-16,4 1 29 15,-4-1 0-15,1 3-1 16,-6-2-1-16,-6-1-7 16,-8 2-3-16,2 1 1 0,-9-3 2 15,3 5 3-15,-3-4 9 16,6-1 6-16,-7-2 12 15,0 0-2-15,-12-1-5 16,3 2-5-16,-16 0-3 16,2 3-12-16,-13 0 1 15,7 2-2-15,-20 5-1 16,6 3-5-16,-9 1 1 16,11 4-1-16,-18 0 0 15,12 0 0-15,-11 3 2 16,9 0-3-16,-19 8 1 15,14 0-2-15,-15 6 3 16,13 4-3-16,-23 4 2 16,17 1 1-16,-14 3 0 15,16-1-2-15,-13-3 3 0,23-4 0 16,-6-2 0-16,22-4-1 16,-4 2 0-1,20-3-2-15,-4 3-1 0,16-2-1 16,-6 11-4-16,9 1 0 15,-6 16-2-15,7 5 0 16,-6 15-2-16,11-4 3 16,0 12 0-16,10-9 1 15,5 7 1-15,8-6 1 0,6 11 1 16,7-11-3-16,5 2-2 16,7-15-3-16,6-2-2 15,6-16-2-15,11 6 3 16,5-3 4-16,13 8-3 15,5-2 2-15,24 5 0 16,3-8-2-16,28 2-1 16,3-11 5-16,34-1 0 15,-4-8 1-15,31 3-2 16,-5-5-1-16,27 2-6 16,-16-1-5-16,26 2-8 15,-23-8 2-15,25 2 1 16,-21-6 7-16,25-3 6 15,-19-6 8-15,28-5 1 16,-23-7 2-16,31-7 1 16,-24-1-1-16,26-5 3 0,-28 7 0 15,21-1-1-15,-34 6 0 16,15 0 0-16,-31 2 0 16,12-2 1-16,-26 0-1 15,18-5 1-15,-27-5 1 16,20-4 0-16,-22 1-1 0,11-6 2 15,-24 3-2-15,14-8 2 16,-25 0-1-16,19-10 1 16,-19 4-1-16,12-10 2 15,-19 5-2-15,12-4 2 16,-21 5-2-16,14-6 0 16,-13 6 0-16,17-12 0 15,-11 0 0-15,9-11 0 16,-20 4 1-16,-4-8 2 15,-27 16 2-15,-14 6 27 16,-28 14 23-16,-8 8 20 16,-12 10 15-16,-6-1 18 15,-3 2-24-15,-5-4-12 16,-5-5-18-16,-7-6-6 0,-3-1-20 16,-20-11-2-16,-7 1-12 15,-28-6-5-15,-10 6-11 16,-24-5-4-16,-1 9-1 15,-25 4 0-15,7 4-2 16,-28 2 3-16,7 5 2 16,-20-7 2-16,17-1 2 15,-18-5 3-15,29-4 2 16,-27-8 0-16,15 3-2 16,-11-4 6-16,17 6-3 15,-24 2-4-15,26 8-2 0,-24 4-1 16,10 10-4-16,-22 2-2 15,17 8 0-15,-22 6 1 16,26 1 0-16,-22 9 0 16,27 4 2-16,-15 7-31 15,16 7-18-15,-10 17-100 16,21 10-129-16,-12 33-111 16,25 0-75-16</inkml:trace>
+  <inkml:trace contextRef="#ctx0" brushRef="#br0" timeOffset="146633.411">7904 6920 1004 0,'-68'46'205'0,"24"-41"99"0,6 2-298 15,-4 1-2-15,3-2-1 16,0 3 3-16,2-1-3 15,-8 4-2-15,3-2 0 16,-3 3 3-16,0-1-1 16,-7 3 0-16,8-3 0 15,-9 7 1-15,6 0-4 16,-10 5-3-16,6 1 0 16,-5 8-1-16,8-3-3 0,-2 5-2 15,13-5-1 1,4 10-6-16,7-3-3 0,6 17-6 15,4 1 0-15,3 17-6 16,6-4 0-16,5 11-17 16,6-11 0-16,12 9-14 15,5-12 6-15,13 1 3 16,3-7 19-16,11 4 4 16,2-14 14-16,9 7 0 15,0-7 3-15,14-3-1 16,-7-7 2-16,18 5 1 15,-1-11 5-15,16 5-1 16,-8-4 3-16,22-1 3 16,-9-8-2-16,16 3-1 15,-10-7 2-15,23-2 1 16,-13-5-1-16,17-1 2 16,-16-5 1-16,20 1-1 0,-18 0 0 15,12 3 0-15,-17-1 0 16,18 0 0-16,-19 0 0 15,17-4 3-15,-11-3 1 16,22-7 2-16,-17 0 0 16,19-10 2-16,-17 1-4 15,17-5-1-15,-22 5-3 16,20-5 0-16,-14 2-1 0,15-2 0 16,-14 2 2-16,22-10 0 15,-19-3-1-15,16-6-1 16,-15-1 0-16,10-6 0 15,-22 6-1-15,8 1 0 16,-20 5 0-16,7-1 1 16,-18 7 0-16,8-4 3 15,-19 3-1-15,5-5 2 16,-15 5 0-16,2-6 3 16,-16 5-2-16,-3-3 3 15,-19 7 1-15,-11 2 4 16,-13 6 11-16,-9 4 61 15,-7 7 31-15,-4 4 45 16,-3-2 9-16,2-2-10 0,0 1-61 16,-2-1-33-16,-24-12-44 15,-44-22-9-15,31 18-3 16,-13-2 8-16,0 1-2 16,-15-5 8-16,3 2-5 15,-11-4 2-15,8 4-6 16,-20-4-1-16,10 3 1 15,-17-4 1-15,7 4-4 16,-19-7 0-16,15 6 0 16,-16 0-10-16,11 1 0 0,-13-6-2 15,15 6-5-15,-21-7-6 16,14 0-5-16,-16-3-6 16,9 3 2-16,-23-3 2 15,16 8 5-15,-17-2 4 16,7 6 7-16,-15 1-4 15,21 3 4-15,-14-4 1 16,15 1 2-16,-8 3 1 16,20 1 3-16,-10-3-1 15,13 7 0-15,-14-1-1 16,16 0-1-16,-8 2 1 16,11 3-2-16,-12-3 1 15,16 1 0-15,-10 1 4 16,9 1-3-16,-10-1 0 15,16 3 1-15,-11 2-1 16,14 1-3-16,-4-5 12 16,18 5 1-16,-7-7 0 0,13 0 0 15,-12-3-1-15,8 1-10 16,-9 0-2-16,16 4-3 16,-6 4-50-16,10 7-50 0,-8 16-306 15,10 4 38 1</inkml:trace>
 </inkml:ink>
 </file>
 
@@ -1401,7 +1642,7 @@
 </file>
 
 <file path=ppt/slideLayouts/slideLayout1.xml><?xml version="1.0" encoding="utf-8"?>
-<p:sldLayout xmlns:a="http://schemas.openxmlformats.org/drawingml/2006/main" xmlns:r="http://schemas.openxmlformats.org/officeDocument/2006/relationships" xmlns:p="http://schemas.openxmlformats.org/presentationml/2006/main" showMasterSp="0" type="title" preserve="1">
+<p:sldLayout xmlns:a="http://schemas.openxmlformats.org/drawingml/2006/main" xmlns:r="http://schemas.openxmlformats.org/officeDocument/2006/relationships" xmlns:p="http://schemas.openxmlformats.org/presentationml/2006/main" type="title" preserve="1">
   <p:cSld name="Title Slide">
     <p:spTree>
       <p:nvGrpSpPr>
@@ -2532,7 +2773,7 @@
 </file>
 
 <file path=ppt/slideLayouts/slideLayout3.xml><?xml version="1.0" encoding="utf-8"?>
-<p:sldLayout xmlns:a="http://schemas.openxmlformats.org/drawingml/2006/main" xmlns:r="http://schemas.openxmlformats.org/officeDocument/2006/relationships" xmlns:p="http://schemas.openxmlformats.org/presentationml/2006/main" showMasterSp="0" type="secHead" preserve="1">
+<p:sldLayout xmlns:a="http://schemas.openxmlformats.org/drawingml/2006/main" xmlns:r="http://schemas.openxmlformats.org/officeDocument/2006/relationships" xmlns:p="http://schemas.openxmlformats.org/presentationml/2006/main" type="secHead" preserve="1">
   <p:cSld name="Section Header">
     <p:spTree>
       <p:nvGrpSpPr>
@@ -4162,7 +4403,7 @@
 </file>
 
 <file path=ppt/slideLayouts/slideLayout8.xml><?xml version="1.0" encoding="utf-8"?>
-<p:sldLayout xmlns:a="http://schemas.openxmlformats.org/drawingml/2006/main" xmlns:r="http://schemas.openxmlformats.org/officeDocument/2006/relationships" xmlns:p="http://schemas.openxmlformats.org/presentationml/2006/main" showMasterSp="0" type="objTx" preserve="1">
+<p:sldLayout xmlns:a="http://schemas.openxmlformats.org/drawingml/2006/main" xmlns:r="http://schemas.openxmlformats.org/officeDocument/2006/relationships" xmlns:p="http://schemas.openxmlformats.org/presentationml/2006/main" type="objTx" preserve="1">
   <p:cSld name="Content with Caption">
     <p:spTree>
       <p:nvGrpSpPr>
@@ -4617,7 +4858,7 @@
 </file>
 
 <file path=ppt/slideLayouts/slideLayout9.xml><?xml version="1.0" encoding="utf-8"?>
-<p:sldLayout xmlns:a="http://schemas.openxmlformats.org/drawingml/2006/main" xmlns:r="http://schemas.openxmlformats.org/officeDocument/2006/relationships" xmlns:p="http://schemas.openxmlformats.org/presentationml/2006/main" showMasterSp="0" type="picTx" preserve="1">
+<p:sldLayout xmlns:a="http://schemas.openxmlformats.org/drawingml/2006/main" xmlns:r="http://schemas.openxmlformats.org/officeDocument/2006/relationships" xmlns:p="http://schemas.openxmlformats.org/presentationml/2006/main" type="picTx" preserve="1">
   <p:cSld name="Picture with Caption">
     <p:spTree>
       <p:nvGrpSpPr>
@@ -5064,9 +5305,12 @@
 <p:sldMaster xmlns:a="http://schemas.openxmlformats.org/drawingml/2006/main" xmlns:r="http://schemas.openxmlformats.org/officeDocument/2006/relationships" xmlns:p="http://schemas.openxmlformats.org/presentationml/2006/main">
   <p:cSld>
     <p:bg>
-      <p:bgRef idx="1001">
-        <a:schemeClr val="bg1"/>
-      </p:bgRef>
+      <p:bgPr>
+        <a:solidFill>
+          <a:schemeClr val="bg2"/>
+        </a:solidFill>
+        <a:effectLst/>
+      </p:bgPr>
     </p:bg>
     <p:spTree>
       <p:nvGrpSpPr>
@@ -5786,25 +6030,6 @@
 <file path=ppt/slides/slide1.xml><?xml version="1.0" encoding="utf-8"?>
 <p:sld xmlns:a="http://schemas.openxmlformats.org/drawingml/2006/main" xmlns:r="http://schemas.openxmlformats.org/officeDocument/2006/relationships" xmlns:p="http://schemas.openxmlformats.org/presentationml/2006/main">
   <p:cSld>
-    <p:bg>
-      <p:bgPr>
-        <a:blipFill rotWithShape="1">
-          <a:blip r:embed="rId2">
-            <a:duotone>
-              <a:schemeClr val="bg1">
-                <a:shade val="80000"/>
-                <a:lumMod val="80000"/>
-              </a:schemeClr>
-              <a:schemeClr val="bg1">
-                <a:tint val="98000"/>
-              </a:schemeClr>
-            </a:duotone>
-          </a:blip>
-          <a:stretch/>
-        </a:blipFill>
-        <a:effectLst/>
-      </p:bgPr>
-    </p:bg>
     <p:spTree>
       <p:nvGrpSpPr>
         <p:cNvPr id="1" name=""/>
@@ -5834,7 +6059,7 @@
           <p:nvPr/>
         </p:nvPicPr>
         <p:blipFill rotWithShape="1">
-          <a:blip r:embed="rId3"/>
+          <a:blip r:embed="rId2"/>
           <a:srcRect t="15730"/>
           <a:stretch/>
         </p:blipFill>
@@ -6039,7 +6264,7 @@
           <p:nvPr/>
         </p:nvPicPr>
         <p:blipFill>
-          <a:blip r:embed="rId4">
+          <a:blip r:embed="rId3">
             <a:extLst>
               <a:ext uri="{28A0092B-C50C-407E-A947-70E740481C1C}">
                 <a14:useLocalDpi xmlns:a14="http://schemas.microsoft.com/office/drawing/2010/main" val="0"/>
@@ -6095,7 +6320,7 @@
           <p:nvPr/>
         </p:nvPicPr>
         <p:blipFill>
-          <a:blip r:embed="rId4">
+          <a:blip r:embed="rId3">
             <a:extLst>
               <a:ext uri="{28A0092B-C50C-407E-A947-70E740481C1C}">
                 <a14:useLocalDpi xmlns:a14="http://schemas.microsoft.com/office/drawing/2010/main" val="0"/>
@@ -6151,7 +6376,7 @@
           <p:nvPr/>
         </p:nvPicPr>
         <p:blipFill>
-          <a:blip r:embed="rId4">
+          <a:blip r:embed="rId3">
             <a:extLst>
               <a:ext uri="{28A0092B-C50C-407E-A947-70E740481C1C}">
                 <a14:useLocalDpi xmlns:a14="http://schemas.microsoft.com/office/drawing/2010/main" val="0"/>
@@ -6370,7 +6595,7 @@
       </p:sp>
       <mc:AlternateContent xmlns:mc="http://schemas.openxmlformats.org/markup-compatibility/2006" xmlns:p14="http://schemas.microsoft.com/office/powerpoint/2010/main">
         <mc:Choice Requires="p14">
-          <p:contentPart p14:bwMode="auto" r:id="rId5">
+          <p:contentPart p14:bwMode="auto" r:id="rId4">
             <p14:nvContentPartPr>
               <p14:cNvPr id="8" name="Ink 7">
                 <a:extLst>
@@ -18902,12 +19127,41 @@
           <a:chExt cx="0" cy="0"/>
         </a:xfrm>
       </p:grpSpPr>
+      <p:pic>
+        <p:nvPicPr>
+          <p:cNvPr id="4" name="Picture 3">
+            <a:extLst>
+              <a:ext uri="{FF2B5EF4-FFF2-40B4-BE49-F238E27FC236}">
+                <a16:creationId xmlns:a16="http://schemas.microsoft.com/office/drawing/2014/main" id="{ADA63910-6E15-4E9E-BA3D-E96DE36B9B16}"/>
+              </a:ext>
+            </a:extLst>
+          </p:cNvPr>
+          <p:cNvPicPr>
+            <a:picLocks noChangeAspect="1"/>
+          </p:cNvPicPr>
+          <p:nvPr/>
+        </p:nvPicPr>
+        <p:blipFill rotWithShape="1">
+          <a:blip r:embed="rId2"/>
+          <a:srcRect t="15730"/>
+          <a:stretch/>
+        </p:blipFill>
+        <p:spPr>
+          <a:xfrm>
+            <a:off x="20" y="10"/>
+            <a:ext cx="12191980" cy="6857990"/>
+          </a:xfrm>
+          <a:prstGeom prst="rect">
+            <a:avLst/>
+          </a:prstGeom>
+        </p:spPr>
+      </p:pic>
       <p:sp>
         <p:nvSpPr>
           <p:cNvPr id="2" name="Title 1">
             <a:extLst>
               <a:ext uri="{FF2B5EF4-FFF2-40B4-BE49-F238E27FC236}">
-                <a16:creationId xmlns:a16="http://schemas.microsoft.com/office/drawing/2014/main" id="{2971229A-E609-4D19-94A6-A34829FC3BF8}"/>
+                <a16:creationId xmlns:a16="http://schemas.microsoft.com/office/drawing/2014/main" id="{7C2AA3B7-DEC9-44EB-86D7-548154C5230D}"/>
               </a:ext>
             </a:extLst>
           </p:cNvPr>
@@ -18915,69 +19169,16 @@
             <a:spLocks noGrp="1"/>
           </p:cNvSpPr>
           <p:nvPr>
-            <p:ph type="title"/>
-          </p:nvPr>
-        </p:nvSpPr>
-        <p:spPr>
-          <a:gradFill flip="none" rotWithShape="1">
-            <a:gsLst>
-              <a:gs pos="0">
-                <a:schemeClr val="accent1">
-                  <a:tint val="66000"/>
-                  <a:satMod val="160000"/>
-                </a:schemeClr>
-              </a:gs>
-              <a:gs pos="50000">
-                <a:schemeClr val="accent1">
-                  <a:tint val="44500"/>
-                  <a:satMod val="160000"/>
-                </a:schemeClr>
-              </a:gs>
-              <a:gs pos="100000">
-                <a:schemeClr val="accent1">
-                  <a:tint val="23500"/>
-                  <a:satMod val="160000"/>
-                </a:schemeClr>
-              </a:gs>
-            </a:gsLst>
-            <a:lin ang="13500000" scaled="1"/>
-            <a:tileRect/>
-          </a:gradFill>
-        </p:spPr>
-        <p:txBody>
-          <a:bodyPr/>
-          <a:lstStyle/>
-          <a:p>
-            <a:endParaRPr lang="en-IN" dirty="0"/>
-          </a:p>
-        </p:txBody>
-      </p:sp>
-      <p:sp>
-        <p:nvSpPr>
-          <p:cNvPr id="3" name="Content Placeholder 2">
-            <a:extLst>
-              <a:ext uri="{FF2B5EF4-FFF2-40B4-BE49-F238E27FC236}">
-                <a16:creationId xmlns:a16="http://schemas.microsoft.com/office/drawing/2014/main" id="{A38D8F68-8000-44FB-9164-92488D61D434}"/>
-              </a:ext>
-            </a:extLst>
-          </p:cNvPr>
-          <p:cNvSpPr>
-            <a:spLocks noGrp="1"/>
-          </p:cNvSpPr>
-          <p:nvPr>
-            <p:ph idx="1"/>
+            <p:ph type="ctrTitle"/>
           </p:nvPr>
         </p:nvSpPr>
         <p:spPr>
           <a:xfrm>
-            <a:off x="1066800" y="2103119"/>
-            <a:ext cx="10058400" cy="4307205"/>
+            <a:off x="142875" y="1828800"/>
+            <a:ext cx="5867400" cy="3952875"/>
           </a:xfrm>
           <a:solidFill>
-            <a:schemeClr val="accent3">
-              <a:lumMod val="60000"/>
-              <a:lumOff val="40000"/>
-            </a:schemeClr>
+            <a:schemeClr val="tx2"/>
           </a:solidFill>
         </p:spPr>
         <p:txBody>
@@ -18986,14 +19187,719 @@
           </a:bodyPr>
           <a:lstStyle/>
           <a:p>
-            <a:endParaRPr lang="en-IN" sz="2400" dirty="0"/>
+            <a:r>
+              <a:rPr lang="en-IN" sz="6000" b="1" dirty="0">
+                <a:solidFill>
+                  <a:srgbClr val="FF0000"/>
+                </a:solidFill>
+                <a:latin typeface="Algerian" panose="04020705040A02060702" pitchFamily="82" charset="0"/>
+              </a:rPr>
+              <a:t>Serialization</a:t>
+            </a:r>
+            <a:r>
+              <a:rPr lang="en-IN" sz="8000" b="1" dirty="0">
+                <a:solidFill>
+                  <a:srgbClr val="FF0000"/>
+                </a:solidFill>
+                <a:latin typeface="Algerian" panose="04020705040A02060702" pitchFamily="82" charset="0"/>
+              </a:rPr>
+              <a:t> in </a:t>
+            </a:r>
+            <a:r>
+              <a:rPr lang="en-IN" sz="8000" b="1" dirty="0">
+                <a:solidFill>
+                  <a:srgbClr val="00B050"/>
+                </a:solidFill>
+                <a:latin typeface="Algerian" panose="04020705040A02060702" pitchFamily="82" charset="0"/>
+              </a:rPr>
+              <a:t>java</a:t>
+            </a:r>
           </a:p>
         </p:txBody>
       </p:sp>
+      <p:sp>
+        <p:nvSpPr>
+          <p:cNvPr id="10" name="Title 1">
+            <a:extLst>
+              <a:ext uri="{FF2B5EF4-FFF2-40B4-BE49-F238E27FC236}">
+                <a16:creationId xmlns:a16="http://schemas.microsoft.com/office/drawing/2014/main" id="{DEAEA95A-E1E1-45C5-B6EB-D5701D8FB21B}"/>
+              </a:ext>
+            </a:extLst>
+          </p:cNvPr>
+          <p:cNvSpPr txBox="1">
+            <a:spLocks/>
+          </p:cNvSpPr>
+          <p:nvPr/>
+        </p:nvSpPr>
+        <p:spPr>
+          <a:xfrm>
+            <a:off x="1633538" y="88484"/>
+            <a:ext cx="7105650" cy="1289881"/>
+          </a:xfrm>
+          <a:prstGeom prst="rect">
+            <a:avLst/>
+          </a:prstGeom>
+          <a:solidFill>
+            <a:schemeClr val="bg2"/>
+          </a:solidFill>
+        </p:spPr>
+        <p:txBody>
+          <a:bodyPr vert="horz" lIns="91440" tIns="45720" rIns="91440" bIns="45720" rtlCol="0" anchor="ctr">
+            <a:normAutofit fontScale="92500" lnSpcReduction="10000"/>
+          </a:bodyPr>
+          <a:lstStyle>
+            <a:lvl1pPr algn="ctr" defTabSz="914400" rtl="0" eaLnBrk="1" latinLnBrk="0" hangingPunct="1">
+              <a:lnSpc>
+                <a:spcPct val="83000"/>
+              </a:lnSpc>
+              <a:spcBef>
+                <a:spcPct val="0"/>
+              </a:spcBef>
+              <a:buNone/>
+              <a:defRPr lang="en-US" sz="6800" b="0" kern="1200" cap="all" spc="-100" baseline="0" dirty="0">
+                <a:solidFill>
+                  <a:schemeClr val="tx1">
+                    <a:lumMod val="85000"/>
+                    <a:lumOff val="15000"/>
+                  </a:schemeClr>
+                </a:solidFill>
+                <a:effectLst/>
+                <a:latin typeface="+mj-lt"/>
+                <a:ea typeface="+mn-ea"/>
+                <a:cs typeface="+mn-cs"/>
+              </a:defRPr>
+            </a:lvl1pPr>
+          </a:lstStyle>
+          <a:p>
+            <a:r>
+              <a:rPr lang="en-IN" sz="3600" b="1" dirty="0">
+                <a:solidFill>
+                  <a:srgbClr val="0070C0"/>
+                </a:solidFill>
+                <a:latin typeface="Algerian" panose="04020705040A02060702" pitchFamily="82" charset="0"/>
+              </a:rPr>
+              <a:t>learning</a:t>
+            </a:r>
+            <a:r>
+              <a:rPr lang="en-IN" sz="3600" b="1" dirty="0">
+                <a:solidFill>
+                  <a:srgbClr val="00B050"/>
+                </a:solidFill>
+                <a:latin typeface="Algerian" panose="04020705040A02060702" pitchFamily="82" charset="0"/>
+              </a:rPr>
+              <a:t> Core java</a:t>
+            </a:r>
+          </a:p>
+          <a:p>
+            <a:r>
+              <a:rPr lang="en-IN" sz="3600" b="1" dirty="0">
+                <a:solidFill>
+                  <a:srgbClr val="7030A0"/>
+                </a:solidFill>
+                <a:latin typeface="Algerian" panose="04020705040A02060702" pitchFamily="82" charset="0"/>
+              </a:rPr>
+              <a:t>/</a:t>
+            </a:r>
+          </a:p>
+          <a:p>
+            <a:r>
+              <a:rPr lang="en-IN" sz="3600" b="1" dirty="0">
+                <a:solidFill>
+                  <a:srgbClr val="00B050"/>
+                </a:solidFill>
+                <a:latin typeface="Algerian" panose="04020705040A02060702" pitchFamily="82" charset="0"/>
+              </a:rPr>
+              <a:t>Java</a:t>
+            </a:r>
+            <a:r>
+              <a:rPr lang="en-IN" sz="3600" b="1" dirty="0">
+                <a:solidFill>
+                  <a:srgbClr val="0070C0"/>
+                </a:solidFill>
+                <a:latin typeface="Algerian" panose="04020705040A02060702" pitchFamily="82" charset="0"/>
+              </a:rPr>
+              <a:t> Interview guide</a:t>
+            </a:r>
+          </a:p>
+        </p:txBody>
+      </p:sp>
+      <p:pic>
+        <p:nvPicPr>
+          <p:cNvPr id="1026" name="Picture 2" descr="Image result for java">
+            <a:extLst>
+              <a:ext uri="{FF2B5EF4-FFF2-40B4-BE49-F238E27FC236}">
+                <a16:creationId xmlns:a16="http://schemas.microsoft.com/office/drawing/2014/main" id="{041F39EA-7829-41A9-8FCA-69A0A4B95801}"/>
+              </a:ext>
+            </a:extLst>
+          </p:cNvPr>
+          <p:cNvPicPr>
+            <a:picLocks noChangeAspect="1" noChangeArrowheads="1"/>
+          </p:cNvPicPr>
+          <p:nvPr/>
+        </p:nvPicPr>
+        <p:blipFill>
+          <a:blip r:embed="rId3">
+            <a:extLst>
+              <a:ext uri="{28A0092B-C50C-407E-A947-70E740481C1C}">
+                <a14:useLocalDpi xmlns:a14="http://schemas.microsoft.com/office/drawing/2010/main" val="0"/>
+              </a:ext>
+            </a:extLst>
+          </a:blip>
+          <a:srcRect/>
+          <a:stretch>
+            <a:fillRect/>
+          </a:stretch>
+        </p:blipFill>
+        <p:spPr bwMode="auto">
+          <a:xfrm>
+            <a:off x="4057651" y="1282738"/>
+            <a:ext cx="2257424" cy="1281111"/>
+          </a:xfrm>
+          <a:prstGeom prst="rect">
+            <a:avLst/>
+          </a:prstGeom>
+          <a:ln>
+            <a:noFill/>
+          </a:ln>
+          <a:effectLst>
+            <a:outerShdw blurRad="292100" dist="139700" dir="2700000" algn="tl" rotWithShape="0">
+              <a:srgbClr val="333333">
+                <a:alpha val="65000"/>
+              </a:srgbClr>
+            </a:outerShdw>
+          </a:effectLst>
+          <a:extLst>
+            <a:ext uri="{909E8E84-426E-40DD-AFC4-6F175D3DCCD1}">
+              <a14:hiddenFill xmlns:a14="http://schemas.microsoft.com/office/drawing/2010/main">
+                <a:solidFill>
+                  <a:srgbClr val="FFFFFF"/>
+                </a:solidFill>
+              </a14:hiddenFill>
+            </a:ext>
+          </a:extLst>
+        </p:spPr>
+      </p:pic>
+      <p:pic>
+        <p:nvPicPr>
+          <p:cNvPr id="15" name="Picture 2" descr="Image result for java">
+            <a:extLst>
+              <a:ext uri="{FF2B5EF4-FFF2-40B4-BE49-F238E27FC236}">
+                <a16:creationId xmlns:a16="http://schemas.microsoft.com/office/drawing/2014/main" id="{3475CEDD-4B18-40DE-985B-636BA98A1645}"/>
+              </a:ext>
+            </a:extLst>
+          </p:cNvPr>
+          <p:cNvPicPr>
+            <a:picLocks noChangeAspect="1" noChangeArrowheads="1"/>
+          </p:cNvPicPr>
+          <p:nvPr/>
+        </p:nvPicPr>
+        <p:blipFill>
+          <a:blip r:embed="rId3">
+            <a:extLst>
+              <a:ext uri="{28A0092B-C50C-407E-A947-70E740481C1C}">
+                <a14:useLocalDpi xmlns:a14="http://schemas.microsoft.com/office/drawing/2010/main" val="0"/>
+              </a:ext>
+            </a:extLst>
+          </a:blip>
+          <a:srcRect/>
+          <a:stretch>
+            <a:fillRect/>
+          </a:stretch>
+        </p:blipFill>
+        <p:spPr bwMode="auto">
+          <a:xfrm>
+            <a:off x="7700962" y="74511"/>
+            <a:ext cx="1704975" cy="757792"/>
+          </a:xfrm>
+          <a:prstGeom prst="rect">
+            <a:avLst/>
+          </a:prstGeom>
+          <a:ln>
+            <a:noFill/>
+          </a:ln>
+          <a:effectLst>
+            <a:outerShdw blurRad="292100" dist="139700" dir="2700000" algn="tl" rotWithShape="0">
+              <a:srgbClr val="333333">
+                <a:alpha val="65000"/>
+              </a:srgbClr>
+            </a:outerShdw>
+          </a:effectLst>
+          <a:extLst>
+            <a:ext uri="{909E8E84-426E-40DD-AFC4-6F175D3DCCD1}">
+              <a14:hiddenFill xmlns:a14="http://schemas.microsoft.com/office/drawing/2010/main">
+                <a:solidFill>
+                  <a:srgbClr val="FFFFFF"/>
+                </a:solidFill>
+              </a14:hiddenFill>
+            </a:ext>
+          </a:extLst>
+        </p:spPr>
+      </p:pic>
+      <p:sp>
+        <p:nvSpPr>
+          <p:cNvPr id="16" name="Rectangle 15">
+            <a:extLst>
+              <a:ext uri="{FF2B5EF4-FFF2-40B4-BE49-F238E27FC236}">
+                <a16:creationId xmlns:a16="http://schemas.microsoft.com/office/drawing/2014/main" id="{EBDE29B3-F52F-43FF-A8A6-8AE3930A0A0E}"/>
+              </a:ext>
+            </a:extLst>
+          </p:cNvPr>
+          <p:cNvSpPr/>
+          <p:nvPr/>
+        </p:nvSpPr>
+        <p:spPr>
+          <a:xfrm>
+            <a:off x="6562974" y="6146270"/>
+            <a:ext cx="1137988" cy="254061"/>
+          </a:xfrm>
+          <a:prstGeom prst="rect">
+            <a:avLst/>
+          </a:prstGeom>
+          <a:solidFill>
+            <a:srgbClr val="92D050"/>
+          </a:solidFill>
+        </p:spPr>
+        <p:style>
+          <a:lnRef idx="1">
+            <a:schemeClr val="accent6"/>
+          </a:lnRef>
+          <a:fillRef idx="3">
+            <a:schemeClr val="accent6"/>
+          </a:fillRef>
+          <a:effectRef idx="2">
+            <a:schemeClr val="accent6"/>
+          </a:effectRef>
+          <a:fontRef idx="minor">
+            <a:schemeClr val="lt1"/>
+          </a:fontRef>
+        </p:style>
+        <p:txBody>
+          <a:bodyPr rtlCol="0" anchor="ctr"/>
+          <a:lstStyle/>
+          <a:p>
+            <a:pPr algn="ctr"/>
+            <a:r>
+              <a:rPr lang="en-IN" sz="2000" dirty="0" err="1">
+                <a:solidFill>
+                  <a:srgbClr val="FF0000"/>
+                </a:solidFill>
+                <a:latin typeface="Algerian" panose="04020705040A02060702" pitchFamily="82" charset="0"/>
+              </a:rPr>
+              <a:t>arvind</a:t>
+            </a:r>
+            <a:endParaRPr lang="en-IN" sz="1600" dirty="0">
+              <a:solidFill>
+                <a:srgbClr val="FF0000"/>
+              </a:solidFill>
+              <a:latin typeface="Algerian" panose="04020705040A02060702" pitchFamily="82" charset="0"/>
+            </a:endParaRPr>
+          </a:p>
+        </p:txBody>
+      </p:sp>
+      <p:sp>
+        <p:nvSpPr>
+          <p:cNvPr id="17" name="Rectangle: Diagonal Corners Snipped 16">
+            <a:extLst>
+              <a:ext uri="{FF2B5EF4-FFF2-40B4-BE49-F238E27FC236}">
+                <a16:creationId xmlns:a16="http://schemas.microsoft.com/office/drawing/2014/main" id="{BBF2AF94-F3FB-468E-9DAE-E1E8E6A2E1A3}"/>
+              </a:ext>
+            </a:extLst>
+          </p:cNvPr>
+          <p:cNvSpPr/>
+          <p:nvPr/>
+        </p:nvSpPr>
+        <p:spPr>
+          <a:xfrm>
+            <a:off x="5776912" y="5339051"/>
+            <a:ext cx="1924050" cy="807219"/>
+          </a:xfrm>
+          <a:prstGeom prst="snip2DiagRect">
+            <a:avLst/>
+          </a:prstGeom>
+          <a:solidFill>
+            <a:srgbClr val="92D050"/>
+          </a:solidFill>
+        </p:spPr>
+        <p:style>
+          <a:lnRef idx="2">
+            <a:schemeClr val="accent1">
+              <a:shade val="50000"/>
+            </a:schemeClr>
+          </a:lnRef>
+          <a:fillRef idx="1">
+            <a:schemeClr val="accent1"/>
+          </a:fillRef>
+          <a:effectRef idx="0">
+            <a:schemeClr val="accent1"/>
+          </a:effectRef>
+          <a:fontRef idx="minor">
+            <a:schemeClr val="lt1"/>
+          </a:fontRef>
+        </p:style>
+        <p:txBody>
+          <a:bodyPr rtlCol="0" anchor="ctr"/>
+          <a:lstStyle/>
+          <a:p>
+            <a:pPr algn="ctr"/>
+            <a:r>
+              <a:rPr lang="en-IN" sz="2400" dirty="0">
+                <a:latin typeface="Algerian" panose="04020705040A02060702" pitchFamily="82" charset="0"/>
+              </a:rPr>
+              <a:t>GREEN LEARNER</a:t>
+            </a:r>
+          </a:p>
+        </p:txBody>
+      </p:sp>
+      <p:sp>
+        <p:nvSpPr>
+          <p:cNvPr id="18" name="Rectangle 17">
+            <a:extLst>
+              <a:ext uri="{FF2B5EF4-FFF2-40B4-BE49-F238E27FC236}">
+                <a16:creationId xmlns:a16="http://schemas.microsoft.com/office/drawing/2014/main" id="{EE25F39C-7C22-4DD8-B333-D27A97F76559}"/>
+              </a:ext>
+            </a:extLst>
+          </p:cNvPr>
+          <p:cNvSpPr/>
+          <p:nvPr/>
+        </p:nvSpPr>
+        <p:spPr>
+          <a:xfrm>
+            <a:off x="10944226" y="18873"/>
+            <a:ext cx="1247754" cy="514527"/>
+          </a:xfrm>
+          <a:prstGeom prst="rect">
+            <a:avLst/>
+          </a:prstGeom>
+          <a:solidFill>
+            <a:srgbClr val="92D050"/>
+          </a:solidFill>
+        </p:spPr>
+        <p:style>
+          <a:lnRef idx="1">
+            <a:schemeClr val="accent6"/>
+          </a:lnRef>
+          <a:fillRef idx="3">
+            <a:schemeClr val="accent6"/>
+          </a:fillRef>
+          <a:effectRef idx="2">
+            <a:schemeClr val="accent6"/>
+          </a:effectRef>
+          <a:fontRef idx="minor">
+            <a:schemeClr val="lt1"/>
+          </a:fontRef>
+        </p:style>
+        <p:txBody>
+          <a:bodyPr rtlCol="0" anchor="ctr"/>
+          <a:lstStyle/>
+          <a:p>
+            <a:pPr algn="ctr"/>
+            <a:r>
+              <a:rPr lang="en-IN" sz="4400" dirty="0">
+                <a:solidFill>
+                  <a:schemeClr val="bg1"/>
+                </a:solidFill>
+                <a:latin typeface="Algerian" panose="04020705040A02060702" pitchFamily="82" charset="0"/>
+              </a:rPr>
+              <a:t>#12</a:t>
+            </a:r>
+            <a:endParaRPr lang="en-IN" sz="3600" dirty="0">
+              <a:solidFill>
+                <a:schemeClr val="bg1"/>
+              </a:solidFill>
+              <a:latin typeface="Algerian" panose="04020705040A02060702" pitchFamily="82" charset="0"/>
+            </a:endParaRPr>
+          </a:p>
+        </p:txBody>
+      </p:sp>
+      <p:sp>
+        <p:nvSpPr>
+          <p:cNvPr id="3" name="Rectangle 2">
+            <a:extLst>
+              <a:ext uri="{FF2B5EF4-FFF2-40B4-BE49-F238E27FC236}">
+                <a16:creationId xmlns:a16="http://schemas.microsoft.com/office/drawing/2014/main" id="{7EEA959E-7F10-4656-90EC-4B0FDE93FE03}"/>
+              </a:ext>
+            </a:extLst>
+          </p:cNvPr>
+          <p:cNvSpPr/>
+          <p:nvPr/>
+        </p:nvSpPr>
+        <p:spPr>
+          <a:xfrm>
+            <a:off x="7553326" y="498300"/>
+            <a:ext cx="4638654" cy="6147642"/>
+          </a:xfrm>
+          <a:prstGeom prst="rect">
+            <a:avLst/>
+          </a:prstGeom>
+        </p:spPr>
+        <p:style>
+          <a:lnRef idx="2">
+            <a:schemeClr val="accent1">
+              <a:shade val="50000"/>
+            </a:schemeClr>
+          </a:lnRef>
+          <a:fillRef idx="1">
+            <a:schemeClr val="accent1"/>
+          </a:fillRef>
+          <a:effectRef idx="0">
+            <a:schemeClr val="accent1"/>
+          </a:effectRef>
+          <a:fontRef idx="minor">
+            <a:schemeClr val="lt1"/>
+          </a:fontRef>
+        </p:style>
+        <p:txBody>
+          <a:bodyPr rtlCol="0" anchor="ctr"/>
+          <a:lstStyle/>
+          <a:p>
+            <a:pPr marL="685800" indent="-685800" algn="ctr">
+              <a:buFont typeface="Wingdings" panose="05000000000000000000" pitchFamily="2" charset="2"/>
+              <a:buChar char="§"/>
+            </a:pPr>
+            <a:r>
+              <a:rPr lang="en-IN" sz="2400" b="1" dirty="0">
+                <a:solidFill>
+                  <a:srgbClr val="00B050"/>
+                </a:solidFill>
+              </a:rPr>
+              <a:t>Question list</a:t>
+            </a:r>
+          </a:p>
+          <a:p>
+            <a:pPr marL="685800" indent="-685800" algn="ctr">
+              <a:buFont typeface="Wingdings" panose="05000000000000000000" pitchFamily="2" charset="2"/>
+              <a:buChar char="§"/>
+            </a:pPr>
+            <a:r>
+              <a:rPr lang="en-IN" sz="2400" b="1" dirty="0">
+                <a:solidFill>
+                  <a:srgbClr val="00B050"/>
+                </a:solidFill>
+              </a:rPr>
+              <a:t>What/Why/How</a:t>
+            </a:r>
+          </a:p>
+          <a:p>
+            <a:pPr marL="685800" indent="-685800" algn="ctr">
+              <a:buFont typeface="Wingdings" panose="05000000000000000000" pitchFamily="2" charset="2"/>
+              <a:buChar char="§"/>
+            </a:pPr>
+            <a:r>
+              <a:rPr lang="en-IN" sz="2400" b="1" dirty="0">
+                <a:solidFill>
+                  <a:srgbClr val="00B050"/>
+                </a:solidFill>
+              </a:rPr>
+              <a:t>Program-1</a:t>
+            </a:r>
+          </a:p>
+          <a:p>
+            <a:pPr marL="685800" indent="-685800" algn="ctr">
+              <a:buFont typeface="Wingdings" panose="05000000000000000000" pitchFamily="2" charset="2"/>
+              <a:buChar char="§"/>
+            </a:pPr>
+            <a:r>
+              <a:rPr lang="en-IN" sz="2400" b="1" dirty="0">
+                <a:solidFill>
+                  <a:srgbClr val="00B050"/>
+                </a:solidFill>
+              </a:rPr>
+              <a:t>Program-2 Static &amp; transient</a:t>
+            </a:r>
+          </a:p>
+          <a:p>
+            <a:pPr marL="685800" indent="-685800" algn="ctr">
+              <a:buFont typeface="Wingdings" panose="05000000000000000000" pitchFamily="2" charset="2"/>
+              <a:buChar char="§"/>
+            </a:pPr>
+            <a:r>
+              <a:rPr lang="en-IN" sz="2400" b="1" dirty="0">
+                <a:solidFill>
+                  <a:srgbClr val="00B050"/>
+                </a:solidFill>
+              </a:rPr>
+              <a:t>Inheritance and composition while Serialization</a:t>
+            </a:r>
+          </a:p>
+          <a:p>
+            <a:pPr marL="685800" indent="-685800" algn="ctr">
+              <a:buFont typeface="Wingdings" panose="05000000000000000000" pitchFamily="2" charset="2"/>
+              <a:buChar char="§"/>
+            </a:pPr>
+            <a:r>
+              <a:rPr lang="en-IN" sz="2400" b="1" dirty="0">
+                <a:solidFill>
+                  <a:srgbClr val="00B050"/>
+                </a:solidFill>
+              </a:rPr>
+              <a:t>Collections and array</a:t>
+            </a:r>
+          </a:p>
+          <a:p>
+            <a:pPr marL="685800" indent="-685800" algn="ctr">
+              <a:buFont typeface="Wingdings" panose="05000000000000000000" pitchFamily="2" charset="2"/>
+              <a:buChar char="§"/>
+            </a:pPr>
+            <a:r>
+              <a:rPr lang="en-IN" sz="2400" b="1" dirty="0">
+                <a:solidFill>
+                  <a:srgbClr val="00B050"/>
+                </a:solidFill>
+              </a:rPr>
+              <a:t>Custom serialization-deserialization</a:t>
+            </a:r>
+          </a:p>
+          <a:p>
+            <a:pPr marL="685800" indent="-685800" algn="ctr">
+              <a:buFont typeface="Wingdings" panose="05000000000000000000" pitchFamily="2" charset="2"/>
+              <a:buChar char="§"/>
+            </a:pPr>
+            <a:r>
+              <a:rPr lang="en-IN" sz="2400" b="1" dirty="0">
+                <a:solidFill>
+                  <a:srgbClr val="00B050"/>
+                </a:solidFill>
+              </a:rPr>
+              <a:t>Externalizable Interface</a:t>
+            </a:r>
+          </a:p>
+          <a:p>
+            <a:pPr marL="685800" indent="-685800" algn="ctr">
+              <a:buFont typeface="Wingdings" panose="05000000000000000000" pitchFamily="2" charset="2"/>
+              <a:buChar char="§"/>
+            </a:pPr>
+            <a:r>
+              <a:rPr lang="en-IN" sz="2400" b="1" dirty="0">
+                <a:solidFill>
+                  <a:srgbClr val="00B050"/>
+                </a:solidFill>
+              </a:rPr>
+              <a:t>Serializable vs Externalizable</a:t>
+            </a:r>
+          </a:p>
+          <a:p>
+            <a:pPr marL="685800" indent="-685800" algn="ctr">
+              <a:buFont typeface="Wingdings" panose="05000000000000000000" pitchFamily="2" charset="2"/>
+              <a:buChar char="§"/>
+            </a:pPr>
+            <a:r>
+              <a:rPr lang="en-IN" sz="2400" b="1" dirty="0">
+                <a:solidFill>
+                  <a:srgbClr val="00B050"/>
+                </a:solidFill>
+              </a:rPr>
+              <a:t>Object construction while ser &amp; de-ser</a:t>
+            </a:r>
+          </a:p>
+          <a:p>
+            <a:pPr marL="685800" indent="-685800" algn="ctr">
+              <a:buFont typeface="Wingdings" panose="05000000000000000000" pitchFamily="2" charset="2"/>
+              <a:buChar char="§"/>
+            </a:pPr>
+            <a:r>
+              <a:rPr lang="en-IN" sz="2400" b="1" dirty="0" err="1">
+                <a:solidFill>
+                  <a:srgbClr val="00B050"/>
+                </a:solidFill>
+              </a:rPr>
+              <a:t>serialVersionUID</a:t>
+            </a:r>
+            <a:endParaRPr lang="en-IN" sz="2400" b="1" dirty="0">
+              <a:solidFill>
+                <a:srgbClr val="00B050"/>
+              </a:solidFill>
+            </a:endParaRPr>
+          </a:p>
+          <a:p>
+            <a:pPr marL="685800" indent="-685800" algn="ctr">
+              <a:buFont typeface="Wingdings" panose="05000000000000000000" pitchFamily="2" charset="2"/>
+              <a:buChar char="§"/>
+            </a:pPr>
+            <a:r>
+              <a:rPr lang="en-IN" sz="2400" b="1" dirty="0">
+                <a:solidFill>
+                  <a:srgbClr val="FFFF00"/>
+                </a:solidFill>
+              </a:rPr>
+              <a:t>Q &amp; A</a:t>
+            </a:r>
+          </a:p>
+          <a:p>
+            <a:pPr marL="685800" indent="-685800" algn="ctr">
+              <a:buFont typeface="Wingdings" panose="05000000000000000000" pitchFamily="2" charset="2"/>
+              <a:buChar char="§"/>
+            </a:pPr>
+            <a:r>
+              <a:rPr lang="en-IN" sz="2400" b="1" dirty="0">
+                <a:solidFill>
+                  <a:srgbClr val="FFFF00"/>
+                </a:solidFill>
+              </a:rPr>
+              <a:t>What next??</a:t>
+            </a:r>
+            <a:endParaRPr lang="en-IN" sz="4000" b="1" dirty="0">
+              <a:solidFill>
+                <a:srgbClr val="FFFF00"/>
+              </a:solidFill>
+            </a:endParaRPr>
+          </a:p>
+        </p:txBody>
+      </p:sp>
+      <mc:AlternateContent xmlns:mc="http://schemas.openxmlformats.org/markup-compatibility/2006">
+        <mc:Choice xmlns:p14="http://schemas.microsoft.com/office/powerpoint/2010/main" Requires="p14">
+          <p:contentPart p14:bwMode="auto" r:id="rId4">
+            <p14:nvContentPartPr>
+              <p14:cNvPr id="5" name="Ink 4">
+                <a:extLst>
+                  <a:ext uri="{FF2B5EF4-FFF2-40B4-BE49-F238E27FC236}">
+                    <a16:creationId xmlns:a16="http://schemas.microsoft.com/office/drawing/2014/main" id="{81653C5D-E5D3-4047-ABD3-6269825D1B98}"/>
+                  </a:ext>
+                </a:extLst>
+              </p14:cNvPr>
+              <p14:cNvContentPartPr/>
+              <p14:nvPr/>
+            </p14:nvContentPartPr>
+            <p14:xfrm>
+              <a:off x="4450680" y="30600"/>
+              <a:ext cx="7744320" cy="6829560"/>
+            </p14:xfrm>
+          </p:contentPart>
+        </mc:Choice>
+        <mc:Fallback>
+          <p:pic>
+            <p:nvPicPr>
+              <p:cNvPr id="5" name="Ink 4">
+                <a:extLst>
+                  <a:ext uri="{FF2B5EF4-FFF2-40B4-BE49-F238E27FC236}">
+                    <a16:creationId xmlns:a16="http://schemas.microsoft.com/office/drawing/2014/main" id="{81653C5D-E5D3-4047-ABD3-6269825D1B98}"/>
+                  </a:ext>
+                </a:extLst>
+              </p:cNvPr>
+              <p:cNvPicPr/>
+              <p:nvPr/>
+            </p:nvPicPr>
+            <p:blipFill>
+              <a:blip r:embed="rId5"/>
+              <a:stretch>
+                <a:fillRect/>
+              </a:stretch>
+            </p:blipFill>
+            <p:spPr>
+              <a:xfrm>
+                <a:off x="4441320" y="21240"/>
+                <a:ext cx="7763040" cy="6848280"/>
+              </a:xfrm>
+              <a:prstGeom prst="rect">
+                <a:avLst/>
+              </a:prstGeom>
+            </p:spPr>
+          </p:pic>
+        </mc:Fallback>
+      </mc:AlternateContent>
     </p:spTree>
     <p:extLst>
       <p:ext uri="{BB962C8B-B14F-4D97-AF65-F5344CB8AC3E}">
-        <p14:creationId xmlns:p14="http://schemas.microsoft.com/office/powerpoint/2010/main" val="2978615940"/>
+        <p14:creationId xmlns:p14="http://schemas.microsoft.com/office/powerpoint/2010/main" val="2735715926"/>
       </p:ext>
     </p:extLst>
   </p:cSld>
@@ -19350,7 +20256,10 @@
           <a:bodyPr/>
           <a:lstStyle/>
           <a:p>
-            <a:endParaRPr lang="en-IN" dirty="0"/>
+            <a:r>
+              <a:rPr lang="en-IN" dirty="0"/>
+              <a:t>Questions</a:t>
+            </a:r>
           </a:p>
         </p:txBody>
       </p:sp>
@@ -19384,18 +20293,137 @@
         </p:spPr>
         <p:txBody>
           <a:bodyPr>
-            <a:normAutofit/>
+            <a:normAutofit fontScale="92500" lnSpcReduction="10000"/>
           </a:bodyPr>
           <a:lstStyle/>
           <a:p>
+            <a:r>
+              <a:rPr lang="en-IN" sz="2400" dirty="0"/>
+              <a:t>What is serialization??</a:t>
+            </a:r>
+          </a:p>
+          <a:p>
+            <a:r>
+              <a:rPr lang="en-IN" sz="2400" dirty="0"/>
+              <a:t>Why do we need it??</a:t>
+            </a:r>
+          </a:p>
+          <a:p>
+            <a:r>
+              <a:rPr lang="en-IN" sz="2400" dirty="0"/>
+              <a:t>What purpose it serves?</a:t>
+            </a:r>
+          </a:p>
+          <a:p>
+            <a:r>
+              <a:rPr lang="en-IN" sz="2400" dirty="0"/>
+              <a:t>What problem is solved by serialization in java?</a:t>
+            </a:r>
+          </a:p>
+          <a:p>
+            <a:r>
+              <a:rPr lang="en-IN" sz="2400" dirty="0"/>
+              <a:t>How to make a class serializable?</a:t>
+            </a:r>
+          </a:p>
+          <a:p>
+            <a:r>
+              <a:rPr lang="en-IN" sz="2400" dirty="0"/>
+              <a:t>Write the program to show serialization.</a:t>
+            </a:r>
+          </a:p>
+          <a:p>
+            <a:r>
+              <a:rPr lang="en-IN" sz="2400" dirty="0"/>
+              <a:t>How many methods are there in Serializable interface?</a:t>
+            </a:r>
+          </a:p>
+          <a:p>
+            <a:r>
+              <a:rPr lang="en-IN" sz="2400" dirty="0"/>
+              <a:t>What is </a:t>
+            </a:r>
+            <a:r>
+              <a:rPr lang="en-IN" sz="2400" dirty="0" err="1"/>
+              <a:t>serialVersionUID</a:t>
+            </a:r>
+            <a:r>
+              <a:rPr lang="en-IN" sz="2400" dirty="0"/>
+              <a:t>?</a:t>
+            </a:r>
+          </a:p>
+          <a:p>
+            <a:r>
+              <a:rPr lang="en-IN" sz="2400" dirty="0"/>
+              <a:t>Is there any alternative to serialization in java?</a:t>
+            </a:r>
+          </a:p>
+          <a:p>
+            <a:r>
+              <a:rPr lang="en-IN" sz="2400" dirty="0"/>
+              <a:t>How to skip serialization for particular field?</a:t>
+            </a:r>
+          </a:p>
+          <a:p>
             <a:endParaRPr lang="en-IN" sz="2400" dirty="0"/>
           </a:p>
         </p:txBody>
       </p:sp>
+      <mc:AlternateContent xmlns:mc="http://schemas.openxmlformats.org/markup-compatibility/2006">
+        <mc:Choice xmlns:p14="http://schemas.microsoft.com/office/powerpoint/2010/main" Requires="p14">
+          <p:contentPart p14:bwMode="auto" r:id="rId2">
+            <p14:nvContentPartPr>
+              <p14:cNvPr id="5" name="Ink 4">
+                <a:extLst>
+                  <a:ext uri="{FF2B5EF4-FFF2-40B4-BE49-F238E27FC236}">
+                    <a16:creationId xmlns:a16="http://schemas.microsoft.com/office/drawing/2014/main" id="{5BC74B7B-FE02-43C0-A446-FF91F03A340A}"/>
+                  </a:ext>
+                </a:extLst>
+              </p14:cNvPr>
+              <p14:cNvContentPartPr/>
+              <p14:nvPr/>
+            </p14:nvContentPartPr>
+            <p14:xfrm>
+              <a:off x="3609000" y="1961280"/>
+              <a:ext cx="3954240" cy="4394880"/>
+            </p14:xfrm>
+          </p:contentPart>
+        </mc:Choice>
+        <mc:Fallback>
+          <p:pic>
+            <p:nvPicPr>
+              <p:cNvPr id="5" name="Ink 4">
+                <a:extLst>
+                  <a:ext uri="{FF2B5EF4-FFF2-40B4-BE49-F238E27FC236}">
+                    <a16:creationId xmlns:a16="http://schemas.microsoft.com/office/drawing/2014/main" id="{5BC74B7B-FE02-43C0-A446-FF91F03A340A}"/>
+                  </a:ext>
+                </a:extLst>
+              </p:cNvPr>
+              <p:cNvPicPr/>
+              <p:nvPr/>
+            </p:nvPicPr>
+            <p:blipFill>
+              <a:blip r:embed="rId3"/>
+              <a:stretch>
+                <a:fillRect/>
+              </a:stretch>
+            </p:blipFill>
+            <p:spPr>
+              <a:xfrm>
+                <a:off x="3599640" y="1951920"/>
+                <a:ext cx="3972960" cy="4413600"/>
+              </a:xfrm>
+              <a:prstGeom prst="rect">
+                <a:avLst/>
+              </a:prstGeom>
+            </p:spPr>
+          </p:pic>
+        </mc:Fallback>
+      </mc:AlternateContent>
     </p:spTree>
     <p:extLst>
       <p:ext uri="{BB962C8B-B14F-4D97-AF65-F5344CB8AC3E}">
-        <p14:creationId xmlns:p14="http://schemas.microsoft.com/office/powerpoint/2010/main" val="739284800"/>
+        <p14:creationId xmlns:p14="http://schemas.microsoft.com/office/powerpoint/2010/main" val="2680929005"/>
       </p:ext>
     </p:extLst>
   </p:cSld>
@@ -19480,7 +20508,282 @@
           <a:bodyPr/>
           <a:lstStyle/>
           <a:p>
-            <a:endParaRPr lang="en-IN" dirty="0"/>
+            <a:r>
+              <a:rPr lang="en-IN" dirty="0"/>
+              <a:t>Questions</a:t>
+            </a:r>
+          </a:p>
+        </p:txBody>
+      </p:sp>
+      <p:sp>
+        <p:nvSpPr>
+          <p:cNvPr id="3" name="Content Placeholder 2">
+            <a:extLst>
+              <a:ext uri="{FF2B5EF4-FFF2-40B4-BE49-F238E27FC236}">
+                <a16:creationId xmlns:a16="http://schemas.microsoft.com/office/drawing/2014/main" id="{A38D8F68-8000-44FB-9164-92488D61D434}"/>
+              </a:ext>
+            </a:extLst>
+          </p:cNvPr>
+          <p:cNvSpPr>
+            <a:spLocks noGrp="1"/>
+          </p:cNvSpPr>
+          <p:nvPr>
+            <p:ph idx="1"/>
+          </p:nvPr>
+        </p:nvSpPr>
+        <p:spPr>
+          <a:xfrm>
+            <a:off x="1066800" y="2103119"/>
+            <a:ext cx="10058400" cy="4307205"/>
+          </a:xfrm>
+          <a:solidFill>
+            <a:schemeClr val="accent3">
+              <a:lumMod val="60000"/>
+              <a:lumOff val="40000"/>
+            </a:schemeClr>
+          </a:solidFill>
+        </p:spPr>
+        <p:txBody>
+          <a:bodyPr>
+            <a:normAutofit fontScale="92500" lnSpcReduction="10000"/>
+          </a:bodyPr>
+          <a:lstStyle/>
+          <a:p>
+            <a:r>
+              <a:rPr lang="en-IN" sz="2400" dirty="0"/>
+              <a:t>What happens to the reference object of the class that you are serializing?</a:t>
+            </a:r>
+          </a:p>
+          <a:p>
+            <a:pPr lvl="1"/>
+            <a:r>
+              <a:rPr lang="en-IN" sz="2200" dirty="0"/>
+              <a:t>If reference is serializable</a:t>
+            </a:r>
+          </a:p>
+          <a:p>
+            <a:pPr lvl="1"/>
+            <a:r>
+              <a:rPr lang="en-IN" sz="2200" dirty="0"/>
+              <a:t>If reference is not serializable</a:t>
+            </a:r>
+          </a:p>
+          <a:p>
+            <a:r>
+              <a:rPr lang="en-IN" sz="2400" dirty="0"/>
+              <a:t>What about the static fields during serialization?</a:t>
+            </a:r>
+          </a:p>
+          <a:p>
+            <a:r>
+              <a:rPr lang="en-IN" sz="2400" dirty="0"/>
+              <a:t>What is transient keyword?</a:t>
+            </a:r>
+          </a:p>
+          <a:p>
+            <a:pPr lvl="1"/>
+            <a:r>
+              <a:rPr lang="en-IN" sz="2200" dirty="0"/>
+              <a:t>Where to use?</a:t>
+            </a:r>
+          </a:p>
+          <a:p>
+            <a:pPr lvl="1"/>
+            <a:r>
+              <a:rPr lang="en-IN" sz="2200" dirty="0"/>
+              <a:t>What value it gets?</a:t>
+            </a:r>
+          </a:p>
+          <a:p>
+            <a:r>
+              <a:rPr lang="en-IN" sz="2400" dirty="0"/>
+              <a:t>Is there anyway to customize the serialization process?</a:t>
+            </a:r>
+          </a:p>
+          <a:p>
+            <a:r>
+              <a:rPr lang="en-IN" sz="2400" dirty="0"/>
+              <a:t>Do you know about </a:t>
+            </a:r>
+            <a:r>
+              <a:rPr lang="en-IN" sz="2400" dirty="0" err="1"/>
+              <a:t>writeObject</a:t>
+            </a:r>
+            <a:r>
+              <a:rPr lang="en-IN" sz="2400" dirty="0"/>
+              <a:t>() or </a:t>
+            </a:r>
+            <a:r>
+              <a:rPr lang="en-IN" sz="2400" dirty="0" err="1"/>
+              <a:t>readObject</a:t>
+            </a:r>
+            <a:r>
+              <a:rPr lang="en-IN" sz="2400" dirty="0"/>
+              <a:t>()</a:t>
+            </a:r>
+          </a:p>
+          <a:p>
+            <a:pPr lvl="1"/>
+            <a:r>
+              <a:rPr lang="en-IN" sz="2200" dirty="0"/>
+              <a:t>Where do they belong?</a:t>
+            </a:r>
+          </a:p>
+          <a:p>
+            <a:pPr lvl="1"/>
+            <a:r>
+              <a:rPr lang="en-IN" sz="2200" dirty="0"/>
+              <a:t>How to use them?</a:t>
+            </a:r>
+          </a:p>
+          <a:p>
+            <a:endParaRPr lang="en-IN" sz="2400" dirty="0"/>
+          </a:p>
+        </p:txBody>
+      </p:sp>
+      <mc:AlternateContent xmlns:mc="http://schemas.openxmlformats.org/markup-compatibility/2006">
+        <mc:Choice xmlns:p14="http://schemas.microsoft.com/office/powerpoint/2010/main" Requires="p14">
+          <p:contentPart p14:bwMode="auto" r:id="rId2">
+            <p14:nvContentPartPr>
+              <p14:cNvPr id="5" name="Ink 4">
+                <a:extLst>
+                  <a:ext uri="{FF2B5EF4-FFF2-40B4-BE49-F238E27FC236}">
+                    <a16:creationId xmlns:a16="http://schemas.microsoft.com/office/drawing/2014/main" id="{B3211EA5-803A-404C-B3AF-ED76796CD853}"/>
+                  </a:ext>
+                </a:extLst>
+              </p14:cNvPr>
+              <p14:cNvContentPartPr/>
+              <p14:nvPr/>
+            </p14:nvContentPartPr>
+            <p14:xfrm>
+              <a:off x="3393720" y="2467800"/>
+              <a:ext cx="5522040" cy="3767760"/>
+            </p14:xfrm>
+          </p:contentPart>
+        </mc:Choice>
+        <mc:Fallback>
+          <p:pic>
+            <p:nvPicPr>
+              <p:cNvPr id="5" name="Ink 4">
+                <a:extLst>
+                  <a:ext uri="{FF2B5EF4-FFF2-40B4-BE49-F238E27FC236}">
+                    <a16:creationId xmlns:a16="http://schemas.microsoft.com/office/drawing/2014/main" id="{B3211EA5-803A-404C-B3AF-ED76796CD853}"/>
+                  </a:ext>
+                </a:extLst>
+              </p:cNvPr>
+              <p:cNvPicPr/>
+              <p:nvPr/>
+            </p:nvPicPr>
+            <p:blipFill>
+              <a:blip r:embed="rId3"/>
+              <a:stretch>
+                <a:fillRect/>
+              </a:stretch>
+            </p:blipFill>
+            <p:spPr>
+              <a:xfrm>
+                <a:off x="3384360" y="2458440"/>
+                <a:ext cx="5540760" cy="3786480"/>
+              </a:xfrm>
+              <a:prstGeom prst="rect">
+                <a:avLst/>
+              </a:prstGeom>
+            </p:spPr>
+          </p:pic>
+        </mc:Fallback>
+      </mc:AlternateContent>
+    </p:spTree>
+    <p:extLst>
+      <p:ext uri="{BB962C8B-B14F-4D97-AF65-F5344CB8AC3E}">
+        <p14:creationId xmlns:p14="http://schemas.microsoft.com/office/powerpoint/2010/main" val="1283091620"/>
+      </p:ext>
+    </p:extLst>
+  </p:cSld>
+  <p:clrMapOvr>
+    <a:masterClrMapping/>
+  </p:clrMapOvr>
+  <mc:AlternateContent xmlns:mc="http://schemas.openxmlformats.org/markup-compatibility/2006" xmlns:p14="http://schemas.microsoft.com/office/powerpoint/2010/main">
+    <mc:Choice Requires="p14">
+      <p:transition spd="slow">
+        <p14:vortex dir="r"/>
+      </p:transition>
+    </mc:Choice>
+    <mc:Fallback xmlns="">
+      <p:transition spd="slow">
+        <p:fade/>
+      </p:transition>
+    </mc:Fallback>
+  </mc:AlternateContent>
+</p:sld>
+</file>
+
+<file path=ppt/slides/slide32.xml><?xml version="1.0" encoding="utf-8"?>
+<p:sld xmlns:a="http://schemas.openxmlformats.org/drawingml/2006/main" xmlns:r="http://schemas.openxmlformats.org/officeDocument/2006/relationships" xmlns:p="http://schemas.openxmlformats.org/presentationml/2006/main">
+  <p:cSld>
+    <p:spTree>
+      <p:nvGrpSpPr>
+        <p:cNvPr id="1" name=""/>
+        <p:cNvGrpSpPr/>
+        <p:nvPr/>
+      </p:nvGrpSpPr>
+      <p:grpSpPr>
+        <a:xfrm>
+          <a:off x="0" y="0"/>
+          <a:ext cx="0" cy="0"/>
+          <a:chOff x="0" y="0"/>
+          <a:chExt cx="0" cy="0"/>
+        </a:xfrm>
+      </p:grpSpPr>
+      <p:sp>
+        <p:nvSpPr>
+          <p:cNvPr id="2" name="Title 1">
+            <a:extLst>
+              <a:ext uri="{FF2B5EF4-FFF2-40B4-BE49-F238E27FC236}">
+                <a16:creationId xmlns:a16="http://schemas.microsoft.com/office/drawing/2014/main" id="{2971229A-E609-4D19-94A6-A34829FC3BF8}"/>
+              </a:ext>
+            </a:extLst>
+          </p:cNvPr>
+          <p:cNvSpPr>
+            <a:spLocks noGrp="1"/>
+          </p:cNvSpPr>
+          <p:nvPr>
+            <p:ph type="title"/>
+          </p:nvPr>
+        </p:nvSpPr>
+        <p:spPr>
+          <a:gradFill flip="none" rotWithShape="1">
+            <a:gsLst>
+              <a:gs pos="0">
+                <a:schemeClr val="accent1">
+                  <a:tint val="66000"/>
+                  <a:satMod val="160000"/>
+                </a:schemeClr>
+              </a:gs>
+              <a:gs pos="50000">
+                <a:schemeClr val="accent1">
+                  <a:tint val="44500"/>
+                  <a:satMod val="160000"/>
+                </a:schemeClr>
+              </a:gs>
+              <a:gs pos="100000">
+                <a:schemeClr val="accent1">
+                  <a:tint val="23500"/>
+                  <a:satMod val="160000"/>
+                </a:schemeClr>
+              </a:gs>
+            </a:gsLst>
+            <a:lin ang="13500000" scaled="1"/>
+            <a:tileRect/>
+          </a:gradFill>
+        </p:spPr>
+        <p:txBody>
+          <a:bodyPr/>
+          <a:lstStyle/>
+          <a:p>
+            <a:r>
+              <a:rPr lang="en-IN" dirty="0"/>
+              <a:t>Questions</a:t>
+            </a:r>
           </a:p>
         </p:txBody>
       </p:sp>
@@ -19518,6 +20821,983 @@
           </a:bodyPr>
           <a:lstStyle/>
           <a:p>
+            <a:r>
+              <a:rPr lang="en-IN" sz="2400" dirty="0"/>
+              <a:t>What is affect of serialization in case of inheritance?</a:t>
+            </a:r>
+          </a:p>
+          <a:p>
+            <a:r>
+              <a:rPr lang="en-IN" sz="2400" dirty="0"/>
+              <a:t>What is Externalizable interface?</a:t>
+            </a:r>
+          </a:p>
+          <a:p>
+            <a:r>
+              <a:rPr lang="en-IN" sz="2400" dirty="0"/>
+              <a:t>Difference between serializable and externalizable interface?</a:t>
+            </a:r>
+          </a:p>
+          <a:p>
+            <a:r>
+              <a:rPr lang="en-IN" sz="2400" dirty="0"/>
+              <a:t>How serialization works?</a:t>
+            </a:r>
+          </a:p>
+          <a:p>
+            <a:r>
+              <a:rPr lang="en-IN" sz="2400" dirty="0"/>
+              <a:t>Can we override the serialization process?</a:t>
+            </a:r>
+          </a:p>
+          <a:p>
+            <a:r>
+              <a:rPr lang="en-IN" sz="2400" dirty="0"/>
+              <a:t>What if the class that was used to serialize the object, later class is changed and this same class is being used to deserialize?</a:t>
+            </a:r>
+          </a:p>
+          <a:p>
+            <a:r>
+              <a:rPr lang="en-IN" sz="2400" dirty="0"/>
+              <a:t>Can we send the serialized object over network?</a:t>
+            </a:r>
+          </a:p>
+          <a:p>
+            <a:r>
+              <a:rPr lang="en-IN" sz="2400" dirty="0"/>
+              <a:t>What are the different exceptions thrown during serialization?</a:t>
+            </a:r>
+          </a:p>
+          <a:p>
+            <a:endParaRPr lang="en-IN" sz="2400" dirty="0"/>
+          </a:p>
+          <a:p>
+            <a:endParaRPr lang="en-IN" sz="2400" dirty="0"/>
+          </a:p>
+          <a:p>
+            <a:endParaRPr lang="en-IN" sz="2400" dirty="0"/>
+          </a:p>
+        </p:txBody>
+      </p:sp>
+      <mc:AlternateContent xmlns:mc="http://schemas.openxmlformats.org/markup-compatibility/2006">
+        <mc:Choice xmlns:p14="http://schemas.microsoft.com/office/powerpoint/2010/main" Requires="p14">
+          <p:contentPart p14:bwMode="auto" r:id="rId2">
+            <p14:nvContentPartPr>
+              <p14:cNvPr id="5" name="Ink 4">
+                <a:extLst>
+                  <a:ext uri="{FF2B5EF4-FFF2-40B4-BE49-F238E27FC236}">
+                    <a16:creationId xmlns:a16="http://schemas.microsoft.com/office/drawing/2014/main" id="{3FEF3E56-1F99-4AF6-96D5-9A37009A820E}"/>
+                  </a:ext>
+                </a:extLst>
+              </p14:cNvPr>
+              <p14:cNvContentPartPr/>
+              <p14:nvPr/>
+            </p14:nvContentPartPr>
+            <p14:xfrm>
+              <a:off x="4012920" y="2572920"/>
+              <a:ext cx="6355080" cy="3821040"/>
+            </p14:xfrm>
+          </p:contentPart>
+        </mc:Choice>
+        <mc:Fallback>
+          <p:pic>
+            <p:nvPicPr>
+              <p:cNvPr id="5" name="Ink 4">
+                <a:extLst>
+                  <a:ext uri="{FF2B5EF4-FFF2-40B4-BE49-F238E27FC236}">
+                    <a16:creationId xmlns:a16="http://schemas.microsoft.com/office/drawing/2014/main" id="{3FEF3E56-1F99-4AF6-96D5-9A37009A820E}"/>
+                  </a:ext>
+                </a:extLst>
+              </p:cNvPr>
+              <p:cNvPicPr/>
+              <p:nvPr/>
+            </p:nvPicPr>
+            <p:blipFill>
+              <a:blip r:embed="rId3"/>
+              <a:stretch>
+                <a:fillRect/>
+              </a:stretch>
+            </p:blipFill>
+            <p:spPr>
+              <a:xfrm>
+                <a:off x="4003560" y="2563560"/>
+                <a:ext cx="6373800" cy="3839760"/>
+              </a:xfrm>
+              <a:prstGeom prst="rect">
+                <a:avLst/>
+              </a:prstGeom>
+            </p:spPr>
+          </p:pic>
+        </mc:Fallback>
+      </mc:AlternateContent>
+    </p:spTree>
+    <p:extLst>
+      <p:ext uri="{BB962C8B-B14F-4D97-AF65-F5344CB8AC3E}">
+        <p14:creationId xmlns:p14="http://schemas.microsoft.com/office/powerpoint/2010/main" val="3096286989"/>
+      </p:ext>
+    </p:extLst>
+  </p:cSld>
+  <p:clrMapOvr>
+    <a:masterClrMapping/>
+  </p:clrMapOvr>
+  <mc:AlternateContent xmlns:mc="http://schemas.openxmlformats.org/markup-compatibility/2006" xmlns:p14="http://schemas.microsoft.com/office/powerpoint/2010/main">
+    <mc:Choice Requires="p14">
+      <p:transition spd="slow">
+        <p14:vortex dir="r"/>
+      </p:transition>
+    </mc:Choice>
+    <mc:Fallback xmlns="">
+      <p:transition spd="slow">
+        <p:fade/>
+      </p:transition>
+    </mc:Fallback>
+  </mc:AlternateContent>
+</p:sld>
+</file>
+
+<file path=ppt/slides/slide33.xml><?xml version="1.0" encoding="utf-8"?>
+<p:sld xmlns:a="http://schemas.openxmlformats.org/drawingml/2006/main" xmlns:r="http://schemas.openxmlformats.org/officeDocument/2006/relationships" xmlns:p="http://schemas.openxmlformats.org/presentationml/2006/main">
+  <p:cSld>
+    <p:spTree>
+      <p:nvGrpSpPr>
+        <p:cNvPr id="1" name=""/>
+        <p:cNvGrpSpPr/>
+        <p:nvPr/>
+      </p:nvGrpSpPr>
+      <p:grpSpPr>
+        <a:xfrm>
+          <a:off x="0" y="0"/>
+          <a:ext cx="0" cy="0"/>
+          <a:chOff x="0" y="0"/>
+          <a:chExt cx="0" cy="0"/>
+        </a:xfrm>
+      </p:grpSpPr>
+      <p:sp>
+        <p:nvSpPr>
+          <p:cNvPr id="2" name="Title 1">
+            <a:extLst>
+              <a:ext uri="{FF2B5EF4-FFF2-40B4-BE49-F238E27FC236}">
+                <a16:creationId xmlns:a16="http://schemas.microsoft.com/office/drawing/2014/main" id="{2971229A-E609-4D19-94A6-A34829FC3BF8}"/>
+              </a:ext>
+            </a:extLst>
+          </p:cNvPr>
+          <p:cNvSpPr>
+            <a:spLocks noGrp="1"/>
+          </p:cNvSpPr>
+          <p:nvPr>
+            <p:ph type="title"/>
+          </p:nvPr>
+        </p:nvSpPr>
+        <p:spPr>
+          <a:gradFill flip="none" rotWithShape="1">
+            <a:gsLst>
+              <a:gs pos="0">
+                <a:schemeClr val="accent1">
+                  <a:tint val="66000"/>
+                  <a:satMod val="160000"/>
+                </a:schemeClr>
+              </a:gs>
+              <a:gs pos="50000">
+                <a:schemeClr val="accent1">
+                  <a:tint val="44500"/>
+                  <a:satMod val="160000"/>
+                </a:schemeClr>
+              </a:gs>
+              <a:gs pos="100000">
+                <a:schemeClr val="accent1">
+                  <a:tint val="23500"/>
+                  <a:satMod val="160000"/>
+                </a:schemeClr>
+              </a:gs>
+            </a:gsLst>
+            <a:lin ang="13500000" scaled="1"/>
+            <a:tileRect/>
+          </a:gradFill>
+        </p:spPr>
+        <p:txBody>
+          <a:bodyPr/>
+          <a:lstStyle/>
+          <a:p>
+            <a:r>
+              <a:rPr lang="en-IN" dirty="0"/>
+              <a:t>Questions</a:t>
+            </a:r>
+          </a:p>
+        </p:txBody>
+      </p:sp>
+      <p:sp>
+        <p:nvSpPr>
+          <p:cNvPr id="3" name="Content Placeholder 2">
+            <a:extLst>
+              <a:ext uri="{FF2B5EF4-FFF2-40B4-BE49-F238E27FC236}">
+                <a16:creationId xmlns:a16="http://schemas.microsoft.com/office/drawing/2014/main" id="{A38D8F68-8000-44FB-9164-92488D61D434}"/>
+              </a:ext>
+            </a:extLst>
+          </p:cNvPr>
+          <p:cNvSpPr>
+            <a:spLocks noGrp="1"/>
+          </p:cNvSpPr>
+          <p:nvPr>
+            <p:ph idx="1"/>
+          </p:nvPr>
+        </p:nvSpPr>
+        <p:spPr>
+          <a:xfrm>
+            <a:off x="1066800" y="2103119"/>
+            <a:ext cx="10058400" cy="4307205"/>
+          </a:xfrm>
+          <a:solidFill>
+            <a:schemeClr val="accent3">
+              <a:lumMod val="60000"/>
+              <a:lumOff val="40000"/>
+            </a:schemeClr>
+          </a:solidFill>
+        </p:spPr>
+        <p:txBody>
+          <a:bodyPr>
+            <a:normAutofit/>
+          </a:bodyPr>
+          <a:lstStyle/>
+          <a:p>
+            <a:r>
+              <a:rPr lang="en-IN" sz="2400" dirty="0"/>
+              <a:t>What is the role input stream classes during serialization-deserialization?</a:t>
+            </a:r>
+          </a:p>
+          <a:p>
+            <a:r>
+              <a:rPr lang="en-IN" sz="2400" dirty="0"/>
+              <a:t>What is the role output stream classes during serialization-deserialization?</a:t>
+            </a:r>
+          </a:p>
+        </p:txBody>
+      </p:sp>
+      <mc:AlternateContent xmlns:mc="http://schemas.openxmlformats.org/markup-compatibility/2006">
+        <mc:Choice xmlns:p14="http://schemas.microsoft.com/office/powerpoint/2010/main" Requires="p14">
+          <p:contentPart p14:bwMode="auto" r:id="rId2">
+            <p14:nvContentPartPr>
+              <p14:cNvPr id="5" name="Ink 4">
+                <a:extLst>
+                  <a:ext uri="{FF2B5EF4-FFF2-40B4-BE49-F238E27FC236}">
+                    <a16:creationId xmlns:a16="http://schemas.microsoft.com/office/drawing/2014/main" id="{73A62D5D-43D2-4514-A451-65745615DA13}"/>
+                  </a:ext>
+                </a:extLst>
+              </p14:cNvPr>
+              <p14:cNvContentPartPr/>
+              <p14:nvPr/>
+            </p14:nvContentPartPr>
+            <p14:xfrm>
+              <a:off x="5424120" y="2512440"/>
+              <a:ext cx="3345480" cy="642600"/>
+            </p14:xfrm>
+          </p:contentPart>
+        </mc:Choice>
+        <mc:Fallback>
+          <p:pic>
+            <p:nvPicPr>
+              <p:cNvPr id="5" name="Ink 4">
+                <a:extLst>
+                  <a:ext uri="{FF2B5EF4-FFF2-40B4-BE49-F238E27FC236}">
+                    <a16:creationId xmlns:a16="http://schemas.microsoft.com/office/drawing/2014/main" id="{73A62D5D-43D2-4514-A451-65745615DA13}"/>
+                  </a:ext>
+                </a:extLst>
+              </p:cNvPr>
+              <p:cNvPicPr/>
+              <p:nvPr/>
+            </p:nvPicPr>
+            <p:blipFill>
+              <a:blip r:embed="rId3"/>
+              <a:stretch>
+                <a:fillRect/>
+              </a:stretch>
+            </p:blipFill>
+            <p:spPr>
+              <a:xfrm>
+                <a:off x="5414760" y="2503080"/>
+                <a:ext cx="3364200" cy="661320"/>
+              </a:xfrm>
+              <a:prstGeom prst="rect">
+                <a:avLst/>
+              </a:prstGeom>
+            </p:spPr>
+          </p:pic>
+        </mc:Fallback>
+      </mc:AlternateContent>
+    </p:spTree>
+    <p:extLst>
+      <p:ext uri="{BB962C8B-B14F-4D97-AF65-F5344CB8AC3E}">
+        <p14:creationId xmlns:p14="http://schemas.microsoft.com/office/powerpoint/2010/main" val="1951573403"/>
+      </p:ext>
+    </p:extLst>
+  </p:cSld>
+  <p:clrMapOvr>
+    <a:masterClrMapping/>
+  </p:clrMapOvr>
+  <mc:AlternateContent xmlns:mc="http://schemas.openxmlformats.org/markup-compatibility/2006" xmlns:p14="http://schemas.microsoft.com/office/powerpoint/2010/main">
+    <mc:Choice Requires="p14">
+      <p:transition spd="slow">
+        <p14:vortex dir="r"/>
+      </p:transition>
+    </mc:Choice>
+    <mc:Fallback xmlns="">
+      <p:transition spd="slow">
+        <p:fade/>
+      </p:transition>
+    </mc:Fallback>
+  </mc:AlternateContent>
+</p:sld>
+</file>
+
+<file path=ppt/slides/slide34.xml><?xml version="1.0" encoding="utf-8"?>
+<p:sld xmlns:a="http://schemas.openxmlformats.org/drawingml/2006/main" xmlns:r="http://schemas.openxmlformats.org/officeDocument/2006/relationships" xmlns:p="http://schemas.openxmlformats.org/presentationml/2006/main">
+  <p:cSld>
+    <p:spTree>
+      <p:nvGrpSpPr>
+        <p:cNvPr id="1" name=""/>
+        <p:cNvGrpSpPr/>
+        <p:nvPr/>
+      </p:nvGrpSpPr>
+      <p:grpSpPr>
+        <a:xfrm>
+          <a:off x="0" y="0"/>
+          <a:ext cx="0" cy="0"/>
+          <a:chOff x="0" y="0"/>
+          <a:chExt cx="0" cy="0"/>
+        </a:xfrm>
+      </p:grpSpPr>
+      <p:sp>
+        <p:nvSpPr>
+          <p:cNvPr id="2" name="Title 1">
+            <a:extLst>
+              <a:ext uri="{FF2B5EF4-FFF2-40B4-BE49-F238E27FC236}">
+                <a16:creationId xmlns:a16="http://schemas.microsoft.com/office/drawing/2014/main" id="{2971229A-E609-4D19-94A6-A34829FC3BF8}"/>
+              </a:ext>
+            </a:extLst>
+          </p:cNvPr>
+          <p:cNvSpPr>
+            <a:spLocks noGrp="1"/>
+          </p:cNvSpPr>
+          <p:nvPr>
+            <p:ph type="title"/>
+          </p:nvPr>
+        </p:nvSpPr>
+        <p:spPr>
+          <a:gradFill flip="none" rotWithShape="1">
+            <a:gsLst>
+              <a:gs pos="0">
+                <a:schemeClr val="accent1">
+                  <a:tint val="66000"/>
+                  <a:satMod val="160000"/>
+                </a:schemeClr>
+              </a:gs>
+              <a:gs pos="50000">
+                <a:schemeClr val="accent1">
+                  <a:tint val="44500"/>
+                  <a:satMod val="160000"/>
+                </a:schemeClr>
+              </a:gs>
+              <a:gs pos="100000">
+                <a:schemeClr val="accent1">
+                  <a:tint val="23500"/>
+                  <a:satMod val="160000"/>
+                </a:schemeClr>
+              </a:gs>
+            </a:gsLst>
+            <a:lin ang="13500000" scaled="1"/>
+            <a:tileRect/>
+          </a:gradFill>
+        </p:spPr>
+        <p:txBody>
+          <a:bodyPr/>
+          <a:lstStyle/>
+          <a:p>
+            <a:pPr algn="ctr"/>
+            <a:r>
+              <a:rPr lang="en-IN" dirty="0"/>
+              <a:t>What next??</a:t>
+            </a:r>
+          </a:p>
+        </p:txBody>
+      </p:sp>
+      <p:sp>
+        <p:nvSpPr>
+          <p:cNvPr id="3" name="Content Placeholder 2">
+            <a:extLst>
+              <a:ext uri="{FF2B5EF4-FFF2-40B4-BE49-F238E27FC236}">
+                <a16:creationId xmlns:a16="http://schemas.microsoft.com/office/drawing/2014/main" id="{A38D8F68-8000-44FB-9164-92488D61D434}"/>
+              </a:ext>
+            </a:extLst>
+          </p:cNvPr>
+          <p:cNvSpPr>
+            <a:spLocks noGrp="1"/>
+          </p:cNvSpPr>
+          <p:nvPr>
+            <p:ph idx="1"/>
+          </p:nvPr>
+        </p:nvSpPr>
+        <p:spPr>
+          <a:xfrm>
+            <a:off x="1066800" y="2103119"/>
+            <a:ext cx="4581525" cy="4307205"/>
+          </a:xfrm>
+          <a:solidFill>
+            <a:schemeClr val="accent3">
+              <a:lumMod val="60000"/>
+              <a:lumOff val="40000"/>
+            </a:schemeClr>
+          </a:solidFill>
+        </p:spPr>
+        <p:txBody>
+          <a:bodyPr>
+            <a:normAutofit/>
+          </a:bodyPr>
+          <a:lstStyle/>
+          <a:p>
+            <a:pPr algn="ctr"/>
+            <a:r>
+              <a:rPr lang="en-IN" sz="2400" dirty="0"/>
+              <a:t>Serialization</a:t>
+            </a:r>
+          </a:p>
+          <a:p>
+            <a:pPr algn="ctr"/>
+            <a:r>
+              <a:rPr lang="en-IN" sz="2400" dirty="0"/>
+              <a:t>Annotations</a:t>
+            </a:r>
+          </a:p>
+          <a:p>
+            <a:pPr algn="ctr"/>
+            <a:r>
+              <a:rPr lang="en-IN" sz="2400" dirty="0"/>
+              <a:t>Reflection API</a:t>
+            </a:r>
+          </a:p>
+          <a:p>
+            <a:pPr algn="ctr"/>
+            <a:r>
+              <a:rPr lang="en-IN" sz="2400" dirty="0"/>
+              <a:t>Class &amp; Objects</a:t>
+            </a:r>
+          </a:p>
+          <a:p>
+            <a:pPr algn="ctr"/>
+            <a:r>
+              <a:rPr lang="en-IN" sz="2400" dirty="0"/>
+              <a:t>Core Java General Concepts</a:t>
+            </a:r>
+          </a:p>
+          <a:p>
+            <a:pPr algn="ctr"/>
+            <a:r>
+              <a:rPr lang="en-IN" sz="2400" dirty="0"/>
+              <a:t>Exception handling</a:t>
+            </a:r>
+          </a:p>
+          <a:p>
+            <a:pPr algn="ctr"/>
+            <a:r>
+              <a:rPr lang="en-IN" sz="2400" dirty="0"/>
+              <a:t>String in java</a:t>
+            </a:r>
+          </a:p>
+          <a:p>
+            <a:pPr algn="ctr"/>
+            <a:r>
+              <a:rPr lang="en-IN" sz="2400" dirty="0"/>
+              <a:t>Java I/O</a:t>
+            </a:r>
+          </a:p>
+          <a:p>
+            <a:pPr algn="ctr"/>
+            <a:r>
+              <a:rPr lang="en-IN" sz="2400" dirty="0"/>
+              <a:t>Java NIO</a:t>
+            </a:r>
+          </a:p>
+          <a:p>
+            <a:pPr algn="ctr"/>
+            <a:endParaRPr lang="en-IN" sz="2400" dirty="0"/>
+          </a:p>
+          <a:p>
+            <a:pPr algn="ctr"/>
+            <a:endParaRPr lang="en-IN" sz="2400" dirty="0"/>
+          </a:p>
+          <a:p>
+            <a:pPr algn="ctr"/>
+            <a:endParaRPr lang="en-IN" sz="2400" dirty="0"/>
+          </a:p>
+        </p:txBody>
+      </p:sp>
+      <p:sp>
+        <p:nvSpPr>
+          <p:cNvPr id="4" name="Content Placeholder 2">
+            <a:extLst>
+              <a:ext uri="{FF2B5EF4-FFF2-40B4-BE49-F238E27FC236}">
+                <a16:creationId xmlns:a16="http://schemas.microsoft.com/office/drawing/2014/main" id="{9D183B77-3199-469B-A3A2-DBA92E8EED7E}"/>
+              </a:ext>
+            </a:extLst>
+          </p:cNvPr>
+          <p:cNvSpPr txBox="1">
+            <a:spLocks/>
+          </p:cNvSpPr>
+          <p:nvPr/>
+        </p:nvSpPr>
+        <p:spPr>
+          <a:xfrm>
+            <a:off x="5867400" y="2103119"/>
+            <a:ext cx="4581525" cy="4307205"/>
+          </a:xfrm>
+          <a:prstGeom prst="rect">
+            <a:avLst/>
+          </a:prstGeom>
+          <a:solidFill>
+            <a:schemeClr val="accent3">
+              <a:lumMod val="60000"/>
+              <a:lumOff val="40000"/>
+            </a:schemeClr>
+          </a:solidFill>
+        </p:spPr>
+        <p:txBody>
+          <a:bodyPr vert="horz" lIns="91440" tIns="45720" rIns="91440" bIns="45720" rtlCol="0">
+            <a:normAutofit/>
+          </a:bodyPr>
+          <a:lstStyle>
+            <a:lvl1pPr marL="182880" indent="-182880" algn="l" defTabSz="914400" rtl="0" eaLnBrk="1" latinLnBrk="0" hangingPunct="1">
+              <a:lnSpc>
+                <a:spcPct val="100000"/>
+              </a:lnSpc>
+              <a:spcBef>
+                <a:spcPts val="900"/>
+              </a:spcBef>
+              <a:spcAft>
+                <a:spcPts val="0"/>
+              </a:spcAft>
+              <a:buClr>
+                <a:schemeClr val="tx1">
+                  <a:lumMod val="85000"/>
+                  <a:lumOff val="15000"/>
+                </a:schemeClr>
+              </a:buClr>
+              <a:buFont typeface="Garamond" pitchFamily="18" charset="0"/>
+              <a:buChar char="◦"/>
+              <a:defRPr sz="1800" kern="1200">
+                <a:solidFill>
+                  <a:schemeClr val="tx1"/>
+                </a:solidFill>
+                <a:latin typeface="+mn-lt"/>
+                <a:ea typeface="+mn-ea"/>
+                <a:cs typeface="+mn-cs"/>
+              </a:defRPr>
+            </a:lvl1pPr>
+            <a:lvl2pPr marL="457200" indent="-182880" algn="l" defTabSz="914400" rtl="0" eaLnBrk="1" latinLnBrk="0" hangingPunct="1">
+              <a:lnSpc>
+                <a:spcPct val="100000"/>
+              </a:lnSpc>
+              <a:spcBef>
+                <a:spcPts val="500"/>
+              </a:spcBef>
+              <a:buClr>
+                <a:schemeClr val="tx1">
+                  <a:lumMod val="85000"/>
+                  <a:lumOff val="15000"/>
+                </a:schemeClr>
+              </a:buClr>
+              <a:buFont typeface="Garamond" pitchFamily="18" charset="0"/>
+              <a:buChar char="◦"/>
+              <a:defRPr sz="1600" kern="1200">
+                <a:solidFill>
+                  <a:schemeClr val="tx1"/>
+                </a:solidFill>
+                <a:latin typeface="+mn-lt"/>
+                <a:ea typeface="+mn-ea"/>
+                <a:cs typeface="+mn-cs"/>
+              </a:defRPr>
+            </a:lvl2pPr>
+            <a:lvl3pPr marL="731520" indent="-182880" algn="l" defTabSz="914400" rtl="0" eaLnBrk="1" latinLnBrk="0" hangingPunct="1">
+              <a:lnSpc>
+                <a:spcPct val="100000"/>
+              </a:lnSpc>
+              <a:spcBef>
+                <a:spcPts val="500"/>
+              </a:spcBef>
+              <a:buClr>
+                <a:schemeClr val="tx1">
+                  <a:lumMod val="85000"/>
+                  <a:lumOff val="15000"/>
+                </a:schemeClr>
+              </a:buClr>
+              <a:buFont typeface="Garamond" pitchFamily="18" charset="0"/>
+              <a:buChar char="◦"/>
+              <a:defRPr sz="1400" kern="1200">
+                <a:solidFill>
+                  <a:schemeClr val="tx1"/>
+                </a:solidFill>
+                <a:latin typeface="+mn-lt"/>
+                <a:ea typeface="+mn-ea"/>
+                <a:cs typeface="+mn-cs"/>
+              </a:defRPr>
+            </a:lvl3pPr>
+            <a:lvl4pPr marL="1005840" indent="-182880" algn="l" defTabSz="914400" rtl="0" eaLnBrk="1" latinLnBrk="0" hangingPunct="1">
+              <a:lnSpc>
+                <a:spcPct val="100000"/>
+              </a:lnSpc>
+              <a:spcBef>
+                <a:spcPts val="500"/>
+              </a:spcBef>
+              <a:buClr>
+                <a:schemeClr val="tx1">
+                  <a:lumMod val="85000"/>
+                  <a:lumOff val="15000"/>
+                </a:schemeClr>
+              </a:buClr>
+              <a:buFont typeface="Garamond" pitchFamily="18" charset="0"/>
+              <a:buChar char="◦"/>
+              <a:defRPr sz="1400" kern="1200">
+                <a:solidFill>
+                  <a:schemeClr val="tx1"/>
+                </a:solidFill>
+                <a:latin typeface="+mn-lt"/>
+                <a:ea typeface="+mn-ea"/>
+                <a:cs typeface="+mn-cs"/>
+              </a:defRPr>
+            </a:lvl4pPr>
+            <a:lvl5pPr marL="1280160" indent="-182880" algn="l" defTabSz="914400" rtl="0" eaLnBrk="1" latinLnBrk="0" hangingPunct="1">
+              <a:lnSpc>
+                <a:spcPct val="100000"/>
+              </a:lnSpc>
+              <a:spcBef>
+                <a:spcPts val="500"/>
+              </a:spcBef>
+              <a:buClr>
+                <a:schemeClr val="tx1">
+                  <a:lumMod val="85000"/>
+                  <a:lumOff val="15000"/>
+                </a:schemeClr>
+              </a:buClr>
+              <a:buFont typeface="Garamond" pitchFamily="18" charset="0"/>
+              <a:buChar char="◦"/>
+              <a:defRPr sz="1400" kern="1200">
+                <a:solidFill>
+                  <a:schemeClr val="tx1"/>
+                </a:solidFill>
+                <a:latin typeface="+mn-lt"/>
+                <a:ea typeface="+mn-ea"/>
+                <a:cs typeface="+mn-cs"/>
+              </a:defRPr>
+            </a:lvl5pPr>
+            <a:lvl6pPr marL="1600000" indent="-228600" algn="l" defTabSz="914400" rtl="0" eaLnBrk="1" latinLnBrk="0" hangingPunct="1">
+              <a:lnSpc>
+                <a:spcPct val="100000"/>
+              </a:lnSpc>
+              <a:spcBef>
+                <a:spcPts val="500"/>
+              </a:spcBef>
+              <a:buClr>
+                <a:schemeClr val="tx1">
+                  <a:lumMod val="85000"/>
+                  <a:lumOff val="15000"/>
+                </a:schemeClr>
+              </a:buClr>
+              <a:buFont typeface="Garamond" pitchFamily="18" charset="0"/>
+              <a:buChar char="◦"/>
+              <a:defRPr sz="1400" kern="1200">
+                <a:solidFill>
+                  <a:schemeClr val="tx1"/>
+                </a:solidFill>
+                <a:latin typeface="+mn-lt"/>
+                <a:ea typeface="+mn-ea"/>
+                <a:cs typeface="+mn-cs"/>
+              </a:defRPr>
+            </a:lvl6pPr>
+            <a:lvl7pPr marL="1900000" indent="-228600" algn="l" defTabSz="914400" rtl="0" eaLnBrk="1" latinLnBrk="0" hangingPunct="1">
+              <a:lnSpc>
+                <a:spcPct val="100000"/>
+              </a:lnSpc>
+              <a:spcBef>
+                <a:spcPts val="500"/>
+              </a:spcBef>
+              <a:buClr>
+                <a:schemeClr val="tx1">
+                  <a:lumMod val="85000"/>
+                  <a:lumOff val="15000"/>
+                </a:schemeClr>
+              </a:buClr>
+              <a:buFont typeface="Garamond" pitchFamily="18" charset="0"/>
+              <a:buChar char="◦"/>
+              <a:defRPr sz="1400" kern="1200">
+                <a:solidFill>
+                  <a:schemeClr val="tx1"/>
+                </a:solidFill>
+                <a:latin typeface="+mn-lt"/>
+                <a:ea typeface="+mn-ea"/>
+                <a:cs typeface="+mn-cs"/>
+              </a:defRPr>
+            </a:lvl7pPr>
+            <a:lvl8pPr marL="2200000" indent="-228600" algn="l" defTabSz="914400" rtl="0" eaLnBrk="1" latinLnBrk="0" hangingPunct="1">
+              <a:lnSpc>
+                <a:spcPct val="100000"/>
+              </a:lnSpc>
+              <a:spcBef>
+                <a:spcPts val="500"/>
+              </a:spcBef>
+              <a:buClr>
+                <a:schemeClr val="tx1">
+                  <a:lumMod val="85000"/>
+                  <a:lumOff val="15000"/>
+                </a:schemeClr>
+              </a:buClr>
+              <a:buFont typeface="Garamond" pitchFamily="18" charset="0"/>
+              <a:buChar char="◦"/>
+              <a:defRPr sz="1400" kern="1200">
+                <a:solidFill>
+                  <a:schemeClr val="tx1"/>
+                </a:solidFill>
+                <a:latin typeface="+mn-lt"/>
+                <a:ea typeface="+mn-ea"/>
+                <a:cs typeface="+mn-cs"/>
+              </a:defRPr>
+            </a:lvl8pPr>
+            <a:lvl9pPr marL="2500000" indent="-228600" algn="l" defTabSz="914400" rtl="0" eaLnBrk="1" latinLnBrk="0" hangingPunct="1">
+              <a:lnSpc>
+                <a:spcPct val="100000"/>
+              </a:lnSpc>
+              <a:spcBef>
+                <a:spcPts val="500"/>
+              </a:spcBef>
+              <a:buClr>
+                <a:schemeClr val="tx1">
+                  <a:lumMod val="85000"/>
+                  <a:lumOff val="15000"/>
+                </a:schemeClr>
+              </a:buClr>
+              <a:buFont typeface="Garamond" pitchFamily="18" charset="0"/>
+              <a:buChar char="◦"/>
+              <a:defRPr sz="1400" kern="1200">
+                <a:solidFill>
+                  <a:schemeClr val="tx1"/>
+                </a:solidFill>
+                <a:latin typeface="+mn-lt"/>
+                <a:ea typeface="+mn-ea"/>
+                <a:cs typeface="+mn-cs"/>
+              </a:defRPr>
+            </a:lvl9pPr>
+          </a:lstStyle>
+          <a:p>
+            <a:pPr algn="ctr"/>
+            <a:r>
+              <a:rPr lang="en-IN" sz="2400" dirty="0"/>
+              <a:t>Collection API</a:t>
+            </a:r>
+          </a:p>
+          <a:p>
+            <a:pPr algn="ctr"/>
+            <a:r>
+              <a:rPr lang="en-IN" sz="2400" dirty="0"/>
+              <a:t>Java 8 features</a:t>
+            </a:r>
+          </a:p>
+          <a:p>
+            <a:pPr algn="ctr"/>
+            <a:r>
+              <a:rPr lang="en-IN" sz="2400" dirty="0"/>
+              <a:t>Java JDBC</a:t>
+            </a:r>
+          </a:p>
+          <a:p>
+            <a:pPr algn="ctr"/>
+            <a:r>
+              <a:rPr lang="en-IN" sz="2400" dirty="0"/>
+              <a:t>Java 11 features</a:t>
+            </a:r>
+          </a:p>
+          <a:p>
+            <a:pPr algn="ctr"/>
+            <a:endParaRPr lang="en-IN" sz="2400" dirty="0"/>
+          </a:p>
+          <a:p>
+            <a:pPr algn="ctr"/>
+            <a:endParaRPr lang="en-IN" sz="2400" dirty="0"/>
+          </a:p>
+        </p:txBody>
+      </p:sp>
+      <mc:AlternateContent xmlns:mc="http://schemas.openxmlformats.org/markup-compatibility/2006">
+        <mc:Choice xmlns:p14="http://schemas.microsoft.com/office/powerpoint/2010/main" Requires="p14">
+          <p:contentPart p14:bwMode="auto" r:id="rId2">
+            <p14:nvContentPartPr>
+              <p14:cNvPr id="5" name="Ink 4">
+                <a:extLst>
+                  <a:ext uri="{FF2B5EF4-FFF2-40B4-BE49-F238E27FC236}">
+                    <a16:creationId xmlns:a16="http://schemas.microsoft.com/office/drawing/2014/main" id="{A22F826E-5FC6-4080-8D3A-6386B6AFB639}"/>
+                  </a:ext>
+                </a:extLst>
+              </p14:cNvPr>
+              <p14:cNvContentPartPr/>
+              <p14:nvPr/>
+            </p14:nvContentPartPr>
+            <p14:xfrm>
+              <a:off x="2314800" y="1852560"/>
+              <a:ext cx="7731360" cy="4794840"/>
+            </p14:xfrm>
+          </p:contentPart>
+        </mc:Choice>
+        <mc:Fallback>
+          <p:pic>
+            <p:nvPicPr>
+              <p:cNvPr id="5" name="Ink 4">
+                <a:extLst>
+                  <a:ext uri="{FF2B5EF4-FFF2-40B4-BE49-F238E27FC236}">
+                    <a16:creationId xmlns:a16="http://schemas.microsoft.com/office/drawing/2014/main" id="{A22F826E-5FC6-4080-8D3A-6386B6AFB639}"/>
+                  </a:ext>
+                </a:extLst>
+              </p:cNvPr>
+              <p:cNvPicPr/>
+              <p:nvPr/>
+            </p:nvPicPr>
+            <p:blipFill>
+              <a:blip r:embed="rId3"/>
+              <a:stretch>
+                <a:fillRect/>
+              </a:stretch>
+            </p:blipFill>
+            <p:spPr>
+              <a:xfrm>
+                <a:off x="2305440" y="1843200"/>
+                <a:ext cx="7750080" cy="4813560"/>
+              </a:xfrm>
+              <a:prstGeom prst="rect">
+                <a:avLst/>
+              </a:prstGeom>
+            </p:spPr>
+          </p:pic>
+        </mc:Fallback>
+      </mc:AlternateContent>
+    </p:spTree>
+    <p:extLst>
+      <p:ext uri="{BB962C8B-B14F-4D97-AF65-F5344CB8AC3E}">
+        <p14:creationId xmlns:p14="http://schemas.microsoft.com/office/powerpoint/2010/main" val="739284800"/>
+      </p:ext>
+    </p:extLst>
+  </p:cSld>
+  <p:clrMapOvr>
+    <a:masterClrMapping/>
+  </p:clrMapOvr>
+  <mc:AlternateContent xmlns:mc="http://schemas.openxmlformats.org/markup-compatibility/2006" xmlns:p14="http://schemas.microsoft.com/office/powerpoint/2010/main">
+    <mc:Choice Requires="p14">
+      <p:transition spd="slow">
+        <p14:vortex dir="r"/>
+      </p:transition>
+    </mc:Choice>
+    <mc:Fallback xmlns="">
+      <p:transition spd="slow">
+        <p:fade/>
+      </p:transition>
+    </mc:Fallback>
+  </mc:AlternateContent>
+</p:sld>
+</file>
+
+<file path=ppt/slides/slide35.xml><?xml version="1.0" encoding="utf-8"?>
+<p:sld xmlns:a="http://schemas.openxmlformats.org/drawingml/2006/main" xmlns:r="http://schemas.openxmlformats.org/officeDocument/2006/relationships" xmlns:p="http://schemas.openxmlformats.org/presentationml/2006/main">
+  <p:cSld>
+    <p:spTree>
+      <p:nvGrpSpPr>
+        <p:cNvPr id="1" name=""/>
+        <p:cNvGrpSpPr/>
+        <p:nvPr/>
+      </p:nvGrpSpPr>
+      <p:grpSpPr>
+        <a:xfrm>
+          <a:off x="0" y="0"/>
+          <a:ext cx="0" cy="0"/>
+          <a:chOff x="0" y="0"/>
+          <a:chExt cx="0" cy="0"/>
+        </a:xfrm>
+      </p:grpSpPr>
+      <p:sp>
+        <p:nvSpPr>
+          <p:cNvPr id="2" name="Title 1">
+            <a:extLst>
+              <a:ext uri="{FF2B5EF4-FFF2-40B4-BE49-F238E27FC236}">
+                <a16:creationId xmlns:a16="http://schemas.microsoft.com/office/drawing/2014/main" id="{2971229A-E609-4D19-94A6-A34829FC3BF8}"/>
+              </a:ext>
+            </a:extLst>
+          </p:cNvPr>
+          <p:cNvSpPr>
+            <a:spLocks noGrp="1"/>
+          </p:cNvSpPr>
+          <p:nvPr>
+            <p:ph type="title"/>
+          </p:nvPr>
+        </p:nvSpPr>
+        <p:spPr>
+          <a:gradFill flip="none" rotWithShape="1">
+            <a:gsLst>
+              <a:gs pos="0">
+                <a:schemeClr val="accent1">
+                  <a:tint val="66000"/>
+                  <a:satMod val="160000"/>
+                </a:schemeClr>
+              </a:gs>
+              <a:gs pos="50000">
+                <a:schemeClr val="accent1">
+                  <a:tint val="44500"/>
+                  <a:satMod val="160000"/>
+                </a:schemeClr>
+              </a:gs>
+              <a:gs pos="100000">
+                <a:schemeClr val="accent1">
+                  <a:tint val="23500"/>
+                  <a:satMod val="160000"/>
+                </a:schemeClr>
+              </a:gs>
+            </a:gsLst>
+            <a:lin ang="13500000" scaled="1"/>
+            <a:tileRect/>
+          </a:gradFill>
+        </p:spPr>
+        <p:txBody>
+          <a:bodyPr/>
+          <a:lstStyle/>
+          <a:p>
+            <a:endParaRPr lang="en-IN" dirty="0"/>
+          </a:p>
+        </p:txBody>
+      </p:sp>
+      <p:sp>
+        <p:nvSpPr>
+          <p:cNvPr id="3" name="Content Placeholder 2">
+            <a:extLst>
+              <a:ext uri="{FF2B5EF4-FFF2-40B4-BE49-F238E27FC236}">
+                <a16:creationId xmlns:a16="http://schemas.microsoft.com/office/drawing/2014/main" id="{A38D8F68-8000-44FB-9164-92488D61D434}"/>
+              </a:ext>
+            </a:extLst>
+          </p:cNvPr>
+          <p:cNvSpPr>
+            <a:spLocks noGrp="1"/>
+          </p:cNvSpPr>
+          <p:nvPr>
+            <p:ph idx="1"/>
+          </p:nvPr>
+        </p:nvSpPr>
+        <p:spPr>
+          <a:xfrm>
+            <a:off x="1066800" y="2103119"/>
+            <a:ext cx="10058400" cy="4307205"/>
+          </a:xfrm>
+          <a:solidFill>
+            <a:schemeClr val="accent3">
+              <a:lumMod val="60000"/>
+              <a:lumOff val="40000"/>
+            </a:schemeClr>
+          </a:solidFill>
+        </p:spPr>
+        <p:txBody>
+          <a:bodyPr>
+            <a:normAutofit/>
+          </a:bodyPr>
+          <a:lstStyle/>
+          <a:p>
             <a:endParaRPr lang="en-IN" sz="2400" dirty="0"/>
           </a:p>
         </p:txBody>
@@ -19547,7 +21827,7 @@
 </p:sld>
 </file>
 
-<file path=ppt/slides/slide32.xml><?xml version="1.0" encoding="utf-8"?>
+<file path=ppt/slides/slide36.xml><?xml version="1.0" encoding="utf-8"?>
 <p:sld xmlns:a="http://schemas.openxmlformats.org/drawingml/2006/main" xmlns:r="http://schemas.openxmlformats.org/officeDocument/2006/relationships" xmlns:p="http://schemas.openxmlformats.org/presentationml/2006/main">
   <p:cSld>
     <p:spTree>

</xml_diff>